<commit_message>
update after messing up
</commit_message>
<xml_diff>
--- a/ppt_graphics/01_dist_Chp1_JoseLastra_general_progress_20241003.pptx
+++ b/ppt_graphics/01_dist_Chp1_JoseLastra_general_progress_20241003.pptx
@@ -7,7 +7,8 @@
   <p:sldIdLst>
     <p:sldId id="256" r:id="rId2"/>
     <p:sldId id="257" r:id="rId3"/>
-    <p:sldId id="258" r:id="rId4"/>
+    <p:sldId id="259" r:id="rId4"/>
+    <p:sldId id="258" r:id="rId5"/>
   </p:sldIdLst>
   <p:sldSz cx="12192000" cy="6858000"/>
   <p:notesSz cx="6858000" cy="9144000"/>
@@ -1728,7 +1729,1494 @@
 </dgm:colorsDef>
 </file>
 
+<file path=ppt/diagrams/colors3.xml><?xml version="1.0" encoding="utf-8"?>
+<dgm:colorsDef xmlns:dgm="http://schemas.openxmlformats.org/drawingml/2006/diagram" xmlns:a="http://schemas.openxmlformats.org/drawingml/2006/main" uniqueId="urn:microsoft.com/office/officeart/2005/8/colors/accent0_1">
+  <dgm:title val=""/>
+  <dgm:desc val=""/>
+  <dgm:catLst>
+    <dgm:cat type="mainScheme" pri="10100"/>
+  </dgm:catLst>
+  <dgm:styleLbl name="node0">
+    <dgm:fillClrLst meth="repeat">
+      <a:schemeClr val="lt1"/>
+    </dgm:fillClrLst>
+    <dgm:linClrLst meth="repeat">
+      <a:schemeClr val="dk1">
+        <a:shade val="80000"/>
+      </a:schemeClr>
+    </dgm:linClrLst>
+    <dgm:effectClrLst/>
+    <dgm:txLinClrLst/>
+    <dgm:txFillClrLst meth="repeat">
+      <a:schemeClr val="dk1"/>
+    </dgm:txFillClrLst>
+    <dgm:txEffectClrLst/>
+  </dgm:styleLbl>
+  <dgm:styleLbl name="node1">
+    <dgm:fillClrLst meth="repeat">
+      <a:schemeClr val="lt1"/>
+    </dgm:fillClrLst>
+    <dgm:linClrLst meth="repeat">
+      <a:schemeClr val="dk1">
+        <a:shade val="80000"/>
+      </a:schemeClr>
+    </dgm:linClrLst>
+    <dgm:effectClrLst/>
+    <dgm:txLinClrLst/>
+    <dgm:txFillClrLst meth="repeat">
+      <a:schemeClr val="dk1"/>
+    </dgm:txFillClrLst>
+    <dgm:txEffectClrLst/>
+  </dgm:styleLbl>
+  <dgm:styleLbl name="alignNode1">
+    <dgm:fillClrLst meth="repeat">
+      <a:schemeClr val="lt1"/>
+    </dgm:fillClrLst>
+    <dgm:linClrLst meth="repeat">
+      <a:schemeClr val="dk1">
+        <a:shade val="80000"/>
+      </a:schemeClr>
+    </dgm:linClrLst>
+    <dgm:effectClrLst/>
+    <dgm:txLinClrLst/>
+    <dgm:txFillClrLst meth="repeat">
+      <a:schemeClr val="dk1"/>
+    </dgm:txFillClrLst>
+    <dgm:txEffectClrLst/>
+  </dgm:styleLbl>
+  <dgm:styleLbl name="lnNode1">
+    <dgm:fillClrLst meth="repeat">
+      <a:schemeClr val="lt1"/>
+    </dgm:fillClrLst>
+    <dgm:linClrLst meth="repeat">
+      <a:schemeClr val="dk1">
+        <a:shade val="80000"/>
+      </a:schemeClr>
+    </dgm:linClrLst>
+    <dgm:effectClrLst/>
+    <dgm:txLinClrLst/>
+    <dgm:txFillClrLst meth="repeat">
+      <a:schemeClr val="dk1"/>
+    </dgm:txFillClrLst>
+    <dgm:txEffectClrLst/>
+  </dgm:styleLbl>
+  <dgm:styleLbl name="vennNode1">
+    <dgm:fillClrLst meth="repeat">
+      <a:schemeClr val="lt1">
+        <a:alpha val="50000"/>
+      </a:schemeClr>
+    </dgm:fillClrLst>
+    <dgm:linClrLst meth="repeat">
+      <a:schemeClr val="dk1">
+        <a:shade val="80000"/>
+      </a:schemeClr>
+    </dgm:linClrLst>
+    <dgm:effectClrLst/>
+    <dgm:txLinClrLst/>
+    <dgm:txFillClrLst/>
+    <dgm:txEffectClrLst/>
+  </dgm:styleLbl>
+  <dgm:styleLbl name="node2">
+    <dgm:fillClrLst meth="repeat">
+      <a:schemeClr val="lt1"/>
+    </dgm:fillClrLst>
+    <dgm:linClrLst meth="repeat">
+      <a:schemeClr val="dk1">
+        <a:shade val="80000"/>
+      </a:schemeClr>
+    </dgm:linClrLst>
+    <dgm:effectClrLst/>
+    <dgm:txLinClrLst/>
+    <dgm:txFillClrLst meth="repeat">
+      <a:schemeClr val="dk1"/>
+    </dgm:txFillClrLst>
+    <dgm:txEffectClrLst/>
+  </dgm:styleLbl>
+  <dgm:styleLbl name="node3">
+    <dgm:fillClrLst meth="repeat">
+      <a:schemeClr val="lt1"/>
+    </dgm:fillClrLst>
+    <dgm:linClrLst meth="repeat">
+      <a:schemeClr val="dk1">
+        <a:shade val="80000"/>
+      </a:schemeClr>
+    </dgm:linClrLst>
+    <dgm:effectClrLst/>
+    <dgm:txLinClrLst/>
+    <dgm:txFillClrLst meth="repeat">
+      <a:schemeClr val="dk1"/>
+    </dgm:txFillClrLst>
+    <dgm:txEffectClrLst/>
+  </dgm:styleLbl>
+  <dgm:styleLbl name="node4">
+    <dgm:fillClrLst meth="repeat">
+      <a:schemeClr val="lt1"/>
+    </dgm:fillClrLst>
+    <dgm:linClrLst meth="repeat">
+      <a:schemeClr val="dk1">
+        <a:shade val="80000"/>
+      </a:schemeClr>
+    </dgm:linClrLst>
+    <dgm:effectClrLst/>
+    <dgm:txLinClrLst/>
+    <dgm:txFillClrLst meth="repeat">
+      <a:schemeClr val="dk1"/>
+    </dgm:txFillClrLst>
+    <dgm:txEffectClrLst/>
+  </dgm:styleLbl>
+  <dgm:styleLbl name="fgImgPlace1">
+    <dgm:fillClrLst meth="repeat">
+      <a:schemeClr val="dk1">
+        <a:tint val="40000"/>
+      </a:schemeClr>
+    </dgm:fillClrLst>
+    <dgm:linClrLst meth="repeat">
+      <a:schemeClr val="dk1">
+        <a:shade val="80000"/>
+      </a:schemeClr>
+    </dgm:linClrLst>
+    <dgm:effectClrLst/>
+    <dgm:txLinClrLst/>
+    <dgm:txFillClrLst meth="repeat">
+      <a:schemeClr val="lt1"/>
+    </dgm:txFillClrLst>
+    <dgm:txEffectClrLst/>
+  </dgm:styleLbl>
+  <dgm:styleLbl name="alignImgPlace1">
+    <dgm:fillClrLst meth="repeat">
+      <a:schemeClr val="dk1">
+        <a:tint val="40000"/>
+      </a:schemeClr>
+    </dgm:fillClrLst>
+    <dgm:linClrLst meth="repeat">
+      <a:schemeClr val="dk1">
+        <a:shade val="80000"/>
+      </a:schemeClr>
+    </dgm:linClrLst>
+    <dgm:effectClrLst/>
+    <dgm:txLinClrLst/>
+    <dgm:txFillClrLst meth="repeat">
+      <a:schemeClr val="lt1"/>
+    </dgm:txFillClrLst>
+    <dgm:txEffectClrLst/>
+  </dgm:styleLbl>
+  <dgm:styleLbl name="bgImgPlace1">
+    <dgm:fillClrLst meth="repeat">
+      <a:schemeClr val="dk1">
+        <a:tint val="40000"/>
+      </a:schemeClr>
+    </dgm:fillClrLst>
+    <dgm:linClrLst meth="repeat">
+      <a:schemeClr val="dk1">
+        <a:shade val="80000"/>
+      </a:schemeClr>
+    </dgm:linClrLst>
+    <dgm:effectClrLst/>
+    <dgm:txLinClrLst/>
+    <dgm:txFillClrLst meth="repeat">
+      <a:schemeClr val="lt1"/>
+    </dgm:txFillClrLst>
+    <dgm:txEffectClrLst/>
+  </dgm:styleLbl>
+  <dgm:styleLbl name="sibTrans2D1">
+    <dgm:fillClrLst meth="repeat">
+      <a:schemeClr val="dk1">
+        <a:tint val="60000"/>
+      </a:schemeClr>
+    </dgm:fillClrLst>
+    <dgm:linClrLst meth="repeat">
+      <a:schemeClr val="dk1">
+        <a:tint val="60000"/>
+      </a:schemeClr>
+    </dgm:linClrLst>
+    <dgm:effectClrLst/>
+    <dgm:txLinClrLst/>
+    <dgm:txFillClrLst meth="repeat">
+      <a:schemeClr val="dk1"/>
+    </dgm:txFillClrLst>
+    <dgm:txEffectClrLst/>
+  </dgm:styleLbl>
+  <dgm:styleLbl name="fgSibTrans2D1">
+    <dgm:fillClrLst meth="repeat">
+      <a:schemeClr val="dk1">
+        <a:tint val="60000"/>
+      </a:schemeClr>
+    </dgm:fillClrLst>
+    <dgm:linClrLst meth="repeat">
+      <a:schemeClr val="dk1">
+        <a:tint val="60000"/>
+      </a:schemeClr>
+    </dgm:linClrLst>
+    <dgm:effectClrLst/>
+    <dgm:txLinClrLst/>
+    <dgm:txFillClrLst meth="repeat">
+      <a:schemeClr val="dk1"/>
+    </dgm:txFillClrLst>
+    <dgm:txEffectClrLst/>
+  </dgm:styleLbl>
+  <dgm:styleLbl name="bgSibTrans2D1">
+    <dgm:fillClrLst meth="repeat">
+      <a:schemeClr val="dk1">
+        <a:tint val="60000"/>
+      </a:schemeClr>
+    </dgm:fillClrLst>
+    <dgm:linClrLst meth="repeat">
+      <a:schemeClr val="dk1">
+        <a:tint val="60000"/>
+      </a:schemeClr>
+    </dgm:linClrLst>
+    <dgm:effectClrLst/>
+    <dgm:txLinClrLst/>
+    <dgm:txFillClrLst meth="repeat">
+      <a:schemeClr val="dk1"/>
+    </dgm:txFillClrLst>
+    <dgm:txEffectClrLst/>
+  </dgm:styleLbl>
+  <dgm:styleLbl name="sibTrans1D1">
+    <dgm:fillClrLst meth="repeat">
+      <a:schemeClr val="dk1"/>
+    </dgm:fillClrLst>
+    <dgm:linClrLst meth="repeat">
+      <a:schemeClr val="dk1"/>
+    </dgm:linClrLst>
+    <dgm:effectClrLst/>
+    <dgm:txLinClrLst/>
+    <dgm:txFillClrLst meth="repeat">
+      <a:schemeClr val="tx1"/>
+    </dgm:txFillClrLst>
+    <dgm:txEffectClrLst/>
+  </dgm:styleLbl>
+  <dgm:styleLbl name="callout">
+    <dgm:fillClrLst meth="repeat">
+      <a:schemeClr val="dk1"/>
+    </dgm:fillClrLst>
+    <dgm:linClrLst meth="repeat">
+      <a:schemeClr val="dk1"/>
+    </dgm:linClrLst>
+    <dgm:effectClrLst/>
+    <dgm:txLinClrLst/>
+    <dgm:txFillClrLst meth="repeat">
+      <a:schemeClr val="tx1"/>
+    </dgm:txFillClrLst>
+    <dgm:txEffectClrLst/>
+  </dgm:styleLbl>
+  <dgm:styleLbl name="asst0">
+    <dgm:fillClrLst meth="repeat">
+      <a:schemeClr val="lt1"/>
+    </dgm:fillClrLst>
+    <dgm:linClrLst meth="repeat">
+      <a:schemeClr val="dk1">
+        <a:shade val="80000"/>
+      </a:schemeClr>
+    </dgm:linClrLst>
+    <dgm:effectClrLst/>
+    <dgm:txLinClrLst/>
+    <dgm:txFillClrLst meth="repeat">
+      <a:schemeClr val="dk1"/>
+    </dgm:txFillClrLst>
+    <dgm:txEffectClrLst/>
+  </dgm:styleLbl>
+  <dgm:styleLbl name="asst1">
+    <dgm:fillClrLst meth="repeat">
+      <a:schemeClr val="lt1"/>
+    </dgm:fillClrLst>
+    <dgm:linClrLst meth="repeat">
+      <a:schemeClr val="dk1">
+        <a:shade val="80000"/>
+      </a:schemeClr>
+    </dgm:linClrLst>
+    <dgm:effectClrLst/>
+    <dgm:txLinClrLst/>
+    <dgm:txFillClrLst meth="repeat">
+      <a:schemeClr val="dk1"/>
+    </dgm:txFillClrLst>
+    <dgm:txEffectClrLst/>
+  </dgm:styleLbl>
+  <dgm:styleLbl name="asst2">
+    <dgm:fillClrLst meth="repeat">
+      <a:schemeClr val="lt1"/>
+    </dgm:fillClrLst>
+    <dgm:linClrLst meth="repeat">
+      <a:schemeClr val="dk1">
+        <a:shade val="80000"/>
+      </a:schemeClr>
+    </dgm:linClrLst>
+    <dgm:effectClrLst/>
+    <dgm:txLinClrLst/>
+    <dgm:txFillClrLst meth="repeat">
+      <a:schemeClr val="dk1"/>
+    </dgm:txFillClrLst>
+    <dgm:txEffectClrLst/>
+  </dgm:styleLbl>
+  <dgm:styleLbl name="asst3">
+    <dgm:fillClrLst meth="repeat">
+      <a:schemeClr val="lt1"/>
+    </dgm:fillClrLst>
+    <dgm:linClrLst meth="repeat">
+      <a:schemeClr val="dk1">
+        <a:shade val="80000"/>
+      </a:schemeClr>
+    </dgm:linClrLst>
+    <dgm:effectClrLst/>
+    <dgm:txLinClrLst/>
+    <dgm:txFillClrLst meth="repeat">
+      <a:schemeClr val="dk1"/>
+    </dgm:txFillClrLst>
+    <dgm:txEffectClrLst/>
+  </dgm:styleLbl>
+  <dgm:styleLbl name="asst4">
+    <dgm:fillClrLst meth="repeat">
+      <a:schemeClr val="lt1"/>
+    </dgm:fillClrLst>
+    <dgm:linClrLst meth="repeat">
+      <a:schemeClr val="dk1">
+        <a:shade val="80000"/>
+      </a:schemeClr>
+    </dgm:linClrLst>
+    <dgm:effectClrLst/>
+    <dgm:txLinClrLst/>
+    <dgm:txFillClrLst meth="repeat">
+      <a:schemeClr val="dk1"/>
+    </dgm:txFillClrLst>
+    <dgm:txEffectClrLst/>
+  </dgm:styleLbl>
+  <dgm:styleLbl name="parChTrans2D1">
+    <dgm:fillClrLst meth="repeat">
+      <a:schemeClr val="dk1">
+        <a:tint val="60000"/>
+      </a:schemeClr>
+    </dgm:fillClrLst>
+    <dgm:linClrLst meth="repeat">
+      <a:schemeClr val="dk1">
+        <a:tint val="60000"/>
+      </a:schemeClr>
+    </dgm:linClrLst>
+    <dgm:effectClrLst/>
+    <dgm:txLinClrLst/>
+    <dgm:txFillClrLst/>
+    <dgm:txEffectClrLst/>
+  </dgm:styleLbl>
+  <dgm:styleLbl name="parChTrans2D2">
+    <dgm:fillClrLst meth="repeat">
+      <a:schemeClr val="dk1"/>
+    </dgm:fillClrLst>
+    <dgm:linClrLst meth="repeat">
+      <a:schemeClr val="dk1"/>
+    </dgm:linClrLst>
+    <dgm:effectClrLst/>
+    <dgm:txLinClrLst/>
+    <dgm:txFillClrLst/>
+    <dgm:txEffectClrLst/>
+  </dgm:styleLbl>
+  <dgm:styleLbl name="parChTrans2D3">
+    <dgm:fillClrLst meth="repeat">
+      <a:schemeClr val="dk1"/>
+    </dgm:fillClrLst>
+    <dgm:linClrLst meth="repeat">
+      <a:schemeClr val="dk1"/>
+    </dgm:linClrLst>
+    <dgm:effectClrLst/>
+    <dgm:txLinClrLst/>
+    <dgm:txFillClrLst/>
+    <dgm:txEffectClrLst/>
+  </dgm:styleLbl>
+  <dgm:styleLbl name="parChTrans2D4">
+    <dgm:fillClrLst meth="repeat">
+      <a:schemeClr val="dk1"/>
+    </dgm:fillClrLst>
+    <dgm:linClrLst meth="repeat">
+      <a:schemeClr val="dk1"/>
+    </dgm:linClrLst>
+    <dgm:effectClrLst/>
+    <dgm:txLinClrLst/>
+    <dgm:txFillClrLst meth="repeat">
+      <a:schemeClr val="lt1"/>
+    </dgm:txFillClrLst>
+    <dgm:txEffectClrLst/>
+  </dgm:styleLbl>
+  <dgm:styleLbl name="parChTrans1D1">
+    <dgm:fillClrLst meth="repeat">
+      <a:schemeClr val="dk1"/>
+    </dgm:fillClrLst>
+    <dgm:linClrLst meth="repeat">
+      <a:schemeClr val="dk1">
+        <a:shade val="60000"/>
+      </a:schemeClr>
+    </dgm:linClrLst>
+    <dgm:effectClrLst/>
+    <dgm:txLinClrLst/>
+    <dgm:txFillClrLst meth="repeat">
+      <a:schemeClr val="tx1"/>
+    </dgm:txFillClrLst>
+    <dgm:txEffectClrLst/>
+  </dgm:styleLbl>
+  <dgm:styleLbl name="parChTrans1D2">
+    <dgm:fillClrLst meth="repeat">
+      <a:schemeClr val="dk1"/>
+    </dgm:fillClrLst>
+    <dgm:linClrLst meth="repeat">
+      <a:schemeClr val="dk1">
+        <a:shade val="60000"/>
+      </a:schemeClr>
+    </dgm:linClrLst>
+    <dgm:effectClrLst/>
+    <dgm:txLinClrLst/>
+    <dgm:txFillClrLst meth="repeat">
+      <a:schemeClr val="tx1"/>
+    </dgm:txFillClrLst>
+    <dgm:txEffectClrLst/>
+  </dgm:styleLbl>
+  <dgm:styleLbl name="parChTrans1D3">
+    <dgm:fillClrLst meth="repeat">
+      <a:schemeClr val="dk1"/>
+    </dgm:fillClrLst>
+    <dgm:linClrLst meth="repeat">
+      <a:schemeClr val="dk1">
+        <a:shade val="80000"/>
+      </a:schemeClr>
+    </dgm:linClrLst>
+    <dgm:effectClrLst/>
+    <dgm:txLinClrLst/>
+    <dgm:txFillClrLst meth="repeat">
+      <a:schemeClr val="tx1"/>
+    </dgm:txFillClrLst>
+    <dgm:txEffectClrLst/>
+  </dgm:styleLbl>
+  <dgm:styleLbl name="parChTrans1D4">
+    <dgm:fillClrLst meth="repeat">
+      <a:schemeClr val="dk1"/>
+    </dgm:fillClrLst>
+    <dgm:linClrLst meth="repeat">
+      <a:schemeClr val="dk1">
+        <a:shade val="80000"/>
+      </a:schemeClr>
+    </dgm:linClrLst>
+    <dgm:effectClrLst/>
+    <dgm:txLinClrLst/>
+    <dgm:txFillClrLst meth="repeat">
+      <a:schemeClr val="tx1"/>
+    </dgm:txFillClrLst>
+    <dgm:txEffectClrLst/>
+  </dgm:styleLbl>
+  <dgm:styleLbl name="fgAcc1">
+    <dgm:fillClrLst meth="repeat">
+      <a:schemeClr val="dk1">
+        <a:alpha val="90000"/>
+        <a:tint val="40000"/>
+      </a:schemeClr>
+    </dgm:fillClrLst>
+    <dgm:linClrLst meth="repeat">
+      <a:schemeClr val="dk1"/>
+    </dgm:linClrLst>
+    <dgm:effectClrLst/>
+    <dgm:txLinClrLst/>
+    <dgm:txFillClrLst meth="repeat">
+      <a:schemeClr val="dk1"/>
+    </dgm:txFillClrLst>
+    <dgm:txEffectClrLst/>
+  </dgm:styleLbl>
+  <dgm:styleLbl name="conFgAcc1">
+    <dgm:fillClrLst meth="repeat">
+      <a:schemeClr val="dk1">
+        <a:alpha val="90000"/>
+        <a:tint val="40000"/>
+      </a:schemeClr>
+    </dgm:fillClrLst>
+    <dgm:linClrLst meth="repeat">
+      <a:schemeClr val="dk1"/>
+    </dgm:linClrLst>
+    <dgm:effectClrLst/>
+    <dgm:txLinClrLst/>
+    <dgm:txFillClrLst meth="repeat">
+      <a:schemeClr val="dk1"/>
+    </dgm:txFillClrLst>
+    <dgm:txEffectClrLst/>
+  </dgm:styleLbl>
+  <dgm:styleLbl name="alignAcc1">
+    <dgm:fillClrLst meth="repeat">
+      <a:schemeClr val="dk1">
+        <a:alpha val="90000"/>
+        <a:tint val="40000"/>
+      </a:schemeClr>
+    </dgm:fillClrLst>
+    <dgm:linClrLst meth="repeat">
+      <a:schemeClr val="dk1"/>
+    </dgm:linClrLst>
+    <dgm:effectClrLst/>
+    <dgm:txLinClrLst/>
+    <dgm:txFillClrLst meth="repeat">
+      <a:schemeClr val="dk1"/>
+    </dgm:txFillClrLst>
+    <dgm:txEffectClrLst/>
+  </dgm:styleLbl>
+  <dgm:styleLbl name="trAlignAcc1">
+    <dgm:fillClrLst meth="repeat">
+      <a:schemeClr val="dk1">
+        <a:alpha val="40000"/>
+        <a:tint val="40000"/>
+      </a:schemeClr>
+    </dgm:fillClrLst>
+    <dgm:linClrLst meth="repeat">
+      <a:schemeClr val="dk1"/>
+    </dgm:linClrLst>
+    <dgm:effectClrLst/>
+    <dgm:txLinClrLst/>
+    <dgm:txFillClrLst meth="repeat">
+      <a:schemeClr val="dk1"/>
+    </dgm:txFillClrLst>
+    <dgm:txEffectClrLst/>
+  </dgm:styleLbl>
+  <dgm:styleLbl name="bgAcc1">
+    <dgm:fillClrLst meth="repeat">
+      <a:schemeClr val="dk1">
+        <a:alpha val="90000"/>
+        <a:tint val="40000"/>
+      </a:schemeClr>
+    </dgm:fillClrLst>
+    <dgm:linClrLst meth="repeat">
+      <a:schemeClr val="dk1"/>
+    </dgm:linClrLst>
+    <dgm:effectClrLst/>
+    <dgm:txLinClrLst/>
+    <dgm:txFillClrLst meth="repeat">
+      <a:schemeClr val="dk1"/>
+    </dgm:txFillClrLst>
+    <dgm:txEffectClrLst/>
+  </dgm:styleLbl>
+  <dgm:styleLbl name="solidFgAcc1">
+    <dgm:fillClrLst meth="repeat">
+      <a:schemeClr val="lt1"/>
+    </dgm:fillClrLst>
+    <dgm:linClrLst meth="repeat">
+      <a:schemeClr val="dk1"/>
+    </dgm:linClrLst>
+    <dgm:effectClrLst/>
+    <dgm:txLinClrLst/>
+    <dgm:txFillClrLst meth="repeat">
+      <a:schemeClr val="dk1"/>
+    </dgm:txFillClrLst>
+    <dgm:txEffectClrLst/>
+  </dgm:styleLbl>
+  <dgm:styleLbl name="solidAlignAcc1">
+    <dgm:fillClrLst meth="repeat">
+      <a:schemeClr val="lt1"/>
+    </dgm:fillClrLst>
+    <dgm:linClrLst meth="repeat">
+      <a:schemeClr val="dk1"/>
+    </dgm:linClrLst>
+    <dgm:effectClrLst/>
+    <dgm:txLinClrLst/>
+    <dgm:txFillClrLst meth="repeat">
+      <a:schemeClr val="dk1"/>
+    </dgm:txFillClrLst>
+    <dgm:txEffectClrLst/>
+  </dgm:styleLbl>
+  <dgm:styleLbl name="solidBgAcc1">
+    <dgm:fillClrLst meth="repeat">
+      <a:schemeClr val="lt1"/>
+    </dgm:fillClrLst>
+    <dgm:linClrLst meth="repeat">
+      <a:schemeClr val="dk1"/>
+    </dgm:linClrLst>
+    <dgm:effectClrLst/>
+    <dgm:txLinClrLst/>
+    <dgm:txFillClrLst meth="repeat">
+      <a:schemeClr val="dk1"/>
+    </dgm:txFillClrLst>
+    <dgm:txEffectClrLst/>
+  </dgm:styleLbl>
+  <dgm:styleLbl name="fgAccFollowNode1">
+    <dgm:fillClrLst meth="repeat">
+      <a:schemeClr val="lt1">
+        <a:alpha val="90000"/>
+        <a:tint val="40000"/>
+      </a:schemeClr>
+    </dgm:fillClrLst>
+    <dgm:linClrLst meth="repeat">
+      <a:schemeClr val="dk1">
+        <a:alpha val="90000"/>
+      </a:schemeClr>
+    </dgm:linClrLst>
+    <dgm:effectClrLst/>
+    <dgm:txLinClrLst/>
+    <dgm:txFillClrLst meth="repeat">
+      <a:schemeClr val="dk1"/>
+    </dgm:txFillClrLst>
+    <dgm:txEffectClrLst/>
+  </dgm:styleLbl>
+  <dgm:styleLbl name="alignAccFollowNode1">
+    <dgm:fillClrLst meth="repeat">
+      <a:schemeClr val="lt1">
+        <a:alpha val="90000"/>
+        <a:tint val="40000"/>
+      </a:schemeClr>
+    </dgm:fillClrLst>
+    <dgm:linClrLst meth="repeat">
+      <a:schemeClr val="dk1">
+        <a:alpha val="90000"/>
+      </a:schemeClr>
+    </dgm:linClrLst>
+    <dgm:effectClrLst/>
+    <dgm:txLinClrLst/>
+    <dgm:txFillClrLst meth="repeat">
+      <a:schemeClr val="dk1"/>
+    </dgm:txFillClrLst>
+    <dgm:txEffectClrLst/>
+  </dgm:styleLbl>
+  <dgm:styleLbl name="bgAccFollowNode1">
+    <dgm:fillClrLst meth="repeat">
+      <a:schemeClr val="lt1">
+        <a:alpha val="90000"/>
+        <a:tint val="40000"/>
+      </a:schemeClr>
+    </dgm:fillClrLst>
+    <dgm:linClrLst meth="repeat">
+      <a:schemeClr val="dk1">
+        <a:alpha val="90000"/>
+      </a:schemeClr>
+    </dgm:linClrLst>
+    <dgm:effectClrLst/>
+    <dgm:txLinClrLst/>
+    <dgm:txFillClrLst meth="repeat">
+      <a:schemeClr val="dk1"/>
+    </dgm:txFillClrLst>
+    <dgm:txEffectClrLst/>
+  </dgm:styleLbl>
+  <dgm:styleLbl name="fgAcc0">
+    <dgm:fillClrLst meth="repeat">
+      <a:schemeClr val="dk1">
+        <a:alpha val="90000"/>
+        <a:tint val="40000"/>
+      </a:schemeClr>
+    </dgm:fillClrLst>
+    <dgm:linClrLst meth="repeat">
+      <a:schemeClr val="dk1"/>
+    </dgm:linClrLst>
+    <dgm:effectClrLst/>
+    <dgm:txLinClrLst/>
+    <dgm:txFillClrLst meth="repeat">
+      <a:schemeClr val="dk1"/>
+    </dgm:txFillClrLst>
+    <dgm:txEffectClrLst/>
+  </dgm:styleLbl>
+  <dgm:styleLbl name="fgAcc2">
+    <dgm:fillClrLst meth="repeat">
+      <a:schemeClr val="dk1">
+        <a:alpha val="90000"/>
+        <a:tint val="40000"/>
+      </a:schemeClr>
+    </dgm:fillClrLst>
+    <dgm:linClrLst meth="repeat">
+      <a:schemeClr val="dk1"/>
+    </dgm:linClrLst>
+    <dgm:effectClrLst/>
+    <dgm:txLinClrLst/>
+    <dgm:txFillClrLst meth="repeat">
+      <a:schemeClr val="dk1"/>
+    </dgm:txFillClrLst>
+    <dgm:txEffectClrLst/>
+  </dgm:styleLbl>
+  <dgm:styleLbl name="fgAcc3">
+    <dgm:fillClrLst meth="repeat">
+      <a:schemeClr val="dk1">
+        <a:alpha val="90000"/>
+        <a:tint val="40000"/>
+      </a:schemeClr>
+    </dgm:fillClrLst>
+    <dgm:linClrLst meth="repeat">
+      <a:schemeClr val="dk1"/>
+    </dgm:linClrLst>
+    <dgm:effectClrLst/>
+    <dgm:txLinClrLst/>
+    <dgm:txFillClrLst meth="repeat">
+      <a:schemeClr val="dk1"/>
+    </dgm:txFillClrLst>
+    <dgm:txEffectClrLst/>
+  </dgm:styleLbl>
+  <dgm:styleLbl name="fgAcc4">
+    <dgm:fillClrLst meth="repeat">
+      <a:schemeClr val="dk1">
+        <a:alpha val="90000"/>
+        <a:tint val="40000"/>
+      </a:schemeClr>
+    </dgm:fillClrLst>
+    <dgm:linClrLst meth="repeat">
+      <a:schemeClr val="dk1"/>
+    </dgm:linClrLst>
+    <dgm:effectClrLst/>
+    <dgm:txLinClrLst/>
+    <dgm:txFillClrLst meth="repeat">
+      <a:schemeClr val="dk1"/>
+    </dgm:txFillClrLst>
+    <dgm:txEffectClrLst/>
+  </dgm:styleLbl>
+  <dgm:styleLbl name="bgShp">
+    <dgm:fillClrLst meth="repeat">
+      <a:schemeClr val="dk1">
+        <a:tint val="40000"/>
+      </a:schemeClr>
+    </dgm:fillClrLst>
+    <dgm:linClrLst meth="repeat">
+      <a:schemeClr val="dk1"/>
+    </dgm:linClrLst>
+    <dgm:effectClrLst/>
+    <dgm:txLinClrLst/>
+    <dgm:txFillClrLst meth="repeat">
+      <a:schemeClr val="dk1"/>
+    </dgm:txFillClrLst>
+    <dgm:txEffectClrLst/>
+  </dgm:styleLbl>
+  <dgm:styleLbl name="dkBgShp">
+    <dgm:fillClrLst meth="repeat">
+      <a:schemeClr val="dk1">
+        <a:shade val="80000"/>
+      </a:schemeClr>
+    </dgm:fillClrLst>
+    <dgm:linClrLst meth="repeat">
+      <a:schemeClr val="dk1"/>
+    </dgm:linClrLst>
+    <dgm:effectClrLst/>
+    <dgm:txLinClrLst/>
+    <dgm:txFillClrLst meth="repeat">
+      <a:schemeClr val="lt1"/>
+    </dgm:txFillClrLst>
+    <dgm:txEffectClrLst/>
+  </dgm:styleLbl>
+  <dgm:styleLbl name="trBgShp">
+    <dgm:fillClrLst meth="repeat">
+      <a:schemeClr val="dk1">
+        <a:tint val="50000"/>
+        <a:alpha val="40000"/>
+      </a:schemeClr>
+    </dgm:fillClrLst>
+    <dgm:linClrLst meth="repeat">
+      <a:schemeClr val="dk1"/>
+    </dgm:linClrLst>
+    <dgm:effectClrLst/>
+    <dgm:txLinClrLst/>
+    <dgm:txFillClrLst meth="repeat">
+      <a:schemeClr val="lt1"/>
+    </dgm:txFillClrLst>
+    <dgm:txEffectClrLst/>
+  </dgm:styleLbl>
+  <dgm:styleLbl name="fgShp">
+    <dgm:fillClrLst meth="repeat">
+      <a:schemeClr val="dk1">
+        <a:tint val="60000"/>
+      </a:schemeClr>
+    </dgm:fillClrLst>
+    <dgm:linClrLst meth="repeat">
+      <a:schemeClr val="lt1"/>
+    </dgm:linClrLst>
+    <dgm:effectClrLst/>
+    <dgm:txLinClrLst/>
+    <dgm:txFillClrLst meth="repeat">
+      <a:schemeClr val="dk1"/>
+    </dgm:txFillClrLst>
+    <dgm:txEffectClrLst/>
+  </dgm:styleLbl>
+  <dgm:styleLbl name="revTx">
+    <dgm:fillClrLst meth="repeat">
+      <a:schemeClr val="lt1">
+        <a:alpha val="0"/>
+      </a:schemeClr>
+    </dgm:fillClrLst>
+    <dgm:linClrLst meth="repeat">
+      <a:schemeClr val="dk1">
+        <a:alpha val="0"/>
+      </a:schemeClr>
+    </dgm:linClrLst>
+    <dgm:effectClrLst/>
+    <dgm:txLinClrLst/>
+    <dgm:txFillClrLst meth="repeat">
+      <a:schemeClr val="tx1"/>
+    </dgm:txFillClrLst>
+    <dgm:txEffectClrLst/>
+  </dgm:styleLbl>
+</dgm:colorsDef>
+</file>
+
 <file path=ppt/diagrams/data1.xml><?xml version="1.0" encoding="utf-8"?>
+<dgm:dataModel xmlns:dgm="http://schemas.openxmlformats.org/drawingml/2006/diagram" xmlns:a="http://schemas.openxmlformats.org/drawingml/2006/main">
+  <dgm:ptLst>
+    <dgm:pt modelId="{1087B84F-C02F-4698-94D1-CE459D9E6948}" type="doc">
+      <dgm:prSet loTypeId="urn:microsoft.com/office/officeart/2005/8/layout/process4" loCatId="process" qsTypeId="urn:microsoft.com/office/officeart/2005/8/quickstyle/simple1" qsCatId="simple" csTypeId="urn:microsoft.com/office/officeart/2005/8/colors/accent0_1" csCatId="mainScheme" phldr="1"/>
+      <dgm:spPr/>
+      <dgm:t>
+        <a:bodyPr/>
+        <a:lstStyle/>
+        <a:p>
+          <a:endParaRPr lang="en-US"/>
+        </a:p>
+      </dgm:t>
+    </dgm:pt>
+    <dgm:pt modelId="{39E16D4F-DFB6-4B93-8E54-EE965454A374}">
+      <dgm:prSet phldrT="[Text]" custT="1"/>
+      <dgm:spPr/>
+      <dgm:t>
+        <a:bodyPr/>
+        <a:lstStyle/>
+        <a:p>
+          <a:r>
+            <a:rPr lang="en-US" sz="2000" dirty="0">
+              <a:latin typeface="Bahnschrift Condensed" panose="020B0502040204020203" pitchFamily="34" charset="0"/>
+            </a:rPr>
+            <a:t>Forest distribution identification</a:t>
+          </a:r>
+        </a:p>
+      </dgm:t>
+    </dgm:pt>
+    <dgm:pt modelId="{A1459550-4691-40FA-94D8-6073F5012234}" type="parTrans" cxnId="{5914226E-A6CB-4A0D-9BB8-97CC1F78391F}">
+      <dgm:prSet/>
+      <dgm:spPr/>
+      <dgm:t>
+        <a:bodyPr/>
+        <a:lstStyle/>
+        <a:p>
+          <a:endParaRPr lang="en-US" sz="1200">
+            <a:latin typeface="Bahnschrift Condensed" panose="020B0502040204020203" pitchFamily="34" charset="0"/>
+          </a:endParaRPr>
+        </a:p>
+      </dgm:t>
+    </dgm:pt>
+    <dgm:pt modelId="{C61A4FEF-0796-4F85-AEB0-43AC2AB29DD3}" type="sibTrans" cxnId="{5914226E-A6CB-4A0D-9BB8-97CC1F78391F}">
+      <dgm:prSet/>
+      <dgm:spPr/>
+      <dgm:t>
+        <a:bodyPr/>
+        <a:lstStyle/>
+        <a:p>
+          <a:endParaRPr lang="en-US" sz="1200">
+            <a:latin typeface="Bahnschrift Condensed" panose="020B0502040204020203" pitchFamily="34" charset="0"/>
+          </a:endParaRPr>
+        </a:p>
+      </dgm:t>
+    </dgm:pt>
+    <dgm:pt modelId="{91A7BBE7-84AC-422A-9537-72EAE861AEEB}">
+      <dgm:prSet phldrT="[Text]" custT="1"/>
+      <dgm:spPr/>
+      <dgm:t>
+        <a:bodyPr/>
+        <a:lstStyle/>
+        <a:p>
+          <a:r>
+            <a:rPr lang="en-US" sz="1400" dirty="0">
+              <a:latin typeface="Bahnschrift Condensed" panose="020B0502040204020203" pitchFamily="34" charset="0"/>
+            </a:rPr>
+            <a:t>Native vegetation resources cadaster (National Forestry Corporation, CONAF)</a:t>
+          </a:r>
+        </a:p>
+      </dgm:t>
+    </dgm:pt>
+    <dgm:pt modelId="{65ED73B2-4920-49BB-8848-527016A17E58}" type="parTrans" cxnId="{EFD1ACD6-D7D2-40EC-A8AC-0480B694C84A}">
+      <dgm:prSet/>
+      <dgm:spPr/>
+      <dgm:t>
+        <a:bodyPr/>
+        <a:lstStyle/>
+        <a:p>
+          <a:endParaRPr lang="en-US" sz="1200">
+            <a:latin typeface="Bahnschrift Condensed" panose="020B0502040204020203" pitchFamily="34" charset="0"/>
+          </a:endParaRPr>
+        </a:p>
+      </dgm:t>
+    </dgm:pt>
+    <dgm:pt modelId="{198CDB15-06CE-4944-ADA9-02D3FF8F9102}" type="sibTrans" cxnId="{EFD1ACD6-D7D2-40EC-A8AC-0480B694C84A}">
+      <dgm:prSet/>
+      <dgm:spPr/>
+      <dgm:t>
+        <a:bodyPr/>
+        <a:lstStyle/>
+        <a:p>
+          <a:endParaRPr lang="en-US" sz="1200">
+            <a:latin typeface="Bahnschrift Condensed" panose="020B0502040204020203" pitchFamily="34" charset="0"/>
+          </a:endParaRPr>
+        </a:p>
+      </dgm:t>
+    </dgm:pt>
+    <dgm:pt modelId="{BC09EBE8-FA92-41B2-8CA0-28D929E4556D}">
+      <dgm:prSet phldrT="[Text]" custT="1"/>
+      <dgm:spPr/>
+      <dgm:t>
+        <a:bodyPr/>
+        <a:lstStyle/>
+        <a:p>
+          <a:r>
+            <a:rPr lang="en-US" sz="2000" dirty="0">
+              <a:latin typeface="Bahnschrift Condensed" panose="020B0502040204020203" pitchFamily="34" charset="0"/>
+            </a:rPr>
+            <a:t>Area filtering criteria</a:t>
+          </a:r>
+        </a:p>
+      </dgm:t>
+    </dgm:pt>
+    <dgm:pt modelId="{38B38864-59A6-4987-9D4F-CB61C44FC8EA}" type="parTrans" cxnId="{980D2403-B081-46C8-8826-7EE0D611097F}">
+      <dgm:prSet/>
+      <dgm:spPr/>
+      <dgm:t>
+        <a:bodyPr/>
+        <a:lstStyle/>
+        <a:p>
+          <a:endParaRPr lang="en-US" sz="1200">
+            <a:latin typeface="Bahnschrift Condensed" panose="020B0502040204020203" pitchFamily="34" charset="0"/>
+          </a:endParaRPr>
+        </a:p>
+      </dgm:t>
+    </dgm:pt>
+    <dgm:pt modelId="{21DE3602-C588-4824-A31D-01EC453235DA}" type="sibTrans" cxnId="{980D2403-B081-46C8-8826-7EE0D611097F}">
+      <dgm:prSet/>
+      <dgm:spPr/>
+      <dgm:t>
+        <a:bodyPr/>
+        <a:lstStyle/>
+        <a:p>
+          <a:endParaRPr lang="en-US" sz="1200">
+            <a:latin typeface="Bahnschrift Condensed" panose="020B0502040204020203" pitchFamily="34" charset="0"/>
+          </a:endParaRPr>
+        </a:p>
+      </dgm:t>
+    </dgm:pt>
+    <dgm:pt modelId="{9B842720-5BC2-4191-9B55-96FC50970C51}">
+      <dgm:prSet phldrT="[Text]" custT="1"/>
+      <dgm:spPr/>
+      <dgm:t>
+        <a:bodyPr/>
+        <a:lstStyle/>
+        <a:p>
+          <a:r>
+            <a:rPr lang="en-US" sz="1400" dirty="0">
+              <a:latin typeface="Bahnschrift Condensed" panose="020B0502040204020203" pitchFamily="34" charset="0"/>
+            </a:rPr>
+            <a:t>Forest type</a:t>
+          </a:r>
+        </a:p>
+      </dgm:t>
+    </dgm:pt>
+    <dgm:pt modelId="{92E3AB77-A4BA-4A26-95D3-B0BA36719974}" type="parTrans" cxnId="{A2BDE669-929E-4606-B99F-0F19FFDE5163}">
+      <dgm:prSet/>
+      <dgm:spPr/>
+      <dgm:t>
+        <a:bodyPr/>
+        <a:lstStyle/>
+        <a:p>
+          <a:endParaRPr lang="en-US" sz="1200">
+            <a:latin typeface="Bahnschrift Condensed" panose="020B0502040204020203" pitchFamily="34" charset="0"/>
+          </a:endParaRPr>
+        </a:p>
+      </dgm:t>
+    </dgm:pt>
+    <dgm:pt modelId="{1922CCE8-A111-42CD-A398-80B367770097}" type="sibTrans" cxnId="{A2BDE669-929E-4606-B99F-0F19FFDE5163}">
+      <dgm:prSet/>
+      <dgm:spPr/>
+      <dgm:t>
+        <a:bodyPr/>
+        <a:lstStyle/>
+        <a:p>
+          <a:endParaRPr lang="en-US" sz="1200">
+            <a:latin typeface="Bahnschrift Condensed" panose="020B0502040204020203" pitchFamily="34" charset="0"/>
+          </a:endParaRPr>
+        </a:p>
+      </dgm:t>
+    </dgm:pt>
+    <dgm:pt modelId="{7CEFE328-F7D5-4D61-AC08-178634CDC37C}">
+      <dgm:prSet phldrT="[Text]" custT="1"/>
+      <dgm:spPr/>
+      <dgm:t>
+        <a:bodyPr/>
+        <a:lstStyle/>
+        <a:p>
+          <a:r>
+            <a:rPr lang="en-US" sz="2000" dirty="0">
+              <a:latin typeface="Bahnschrift Condensed" panose="020B0502040204020203" pitchFamily="34" charset="0"/>
+            </a:rPr>
+            <a:t>Standardization and normalization of data</a:t>
+          </a:r>
+        </a:p>
+      </dgm:t>
+    </dgm:pt>
+    <dgm:pt modelId="{D6A2278D-5DBC-46A7-AD97-B9D4895E7FF3}" type="parTrans" cxnId="{BAA1B258-8A2F-4253-95F7-4A3E4AAB2FBC}">
+      <dgm:prSet/>
+      <dgm:spPr/>
+      <dgm:t>
+        <a:bodyPr/>
+        <a:lstStyle/>
+        <a:p>
+          <a:endParaRPr lang="en-US" sz="1200">
+            <a:latin typeface="Bahnschrift Condensed" panose="020B0502040204020203" pitchFamily="34" charset="0"/>
+          </a:endParaRPr>
+        </a:p>
+      </dgm:t>
+    </dgm:pt>
+    <dgm:pt modelId="{782D162B-824C-4BDB-AFB9-61E7BA7B39DE}" type="sibTrans" cxnId="{BAA1B258-8A2F-4253-95F7-4A3E4AAB2FBC}">
+      <dgm:prSet/>
+      <dgm:spPr/>
+      <dgm:t>
+        <a:bodyPr/>
+        <a:lstStyle/>
+        <a:p>
+          <a:endParaRPr lang="en-US" sz="1200">
+            <a:latin typeface="Bahnschrift Condensed" panose="020B0502040204020203" pitchFamily="34" charset="0"/>
+          </a:endParaRPr>
+        </a:p>
+      </dgm:t>
+    </dgm:pt>
+    <dgm:pt modelId="{819CB0EF-B1C5-4DA9-8D08-15F240D32855}">
+      <dgm:prSet phldrT="[Text]" custT="1"/>
+      <dgm:spPr/>
+      <dgm:t>
+        <a:bodyPr/>
+        <a:lstStyle/>
+        <a:p>
+          <a:r>
+            <a:rPr lang="en-GB" sz="1400" dirty="0">
+              <a:latin typeface="Bahnschrift Condensed" panose="020B0502040204020203" pitchFamily="34" charset="0"/>
+            </a:rPr>
+            <a:t>Merge regions</a:t>
+          </a:r>
+          <a:endParaRPr lang="en-US" sz="1400" dirty="0">
+            <a:latin typeface="Bahnschrift Condensed" panose="020B0502040204020203" pitchFamily="34" charset="0"/>
+          </a:endParaRPr>
+        </a:p>
+      </dgm:t>
+    </dgm:pt>
+    <dgm:pt modelId="{FD533074-4AAD-4454-A860-A424627A9D24}" type="parTrans" cxnId="{D8F877B9-BE6B-49F5-9673-4B89B7300CED}">
+      <dgm:prSet/>
+      <dgm:spPr/>
+      <dgm:t>
+        <a:bodyPr/>
+        <a:lstStyle/>
+        <a:p>
+          <a:endParaRPr lang="en-US" sz="1200">
+            <a:latin typeface="Bahnschrift Condensed" panose="020B0502040204020203" pitchFamily="34" charset="0"/>
+          </a:endParaRPr>
+        </a:p>
+      </dgm:t>
+    </dgm:pt>
+    <dgm:pt modelId="{5DCAF122-439B-4926-83E1-536B35E8E52A}" type="sibTrans" cxnId="{D8F877B9-BE6B-49F5-9673-4B89B7300CED}">
+      <dgm:prSet/>
+      <dgm:spPr/>
+      <dgm:t>
+        <a:bodyPr/>
+        <a:lstStyle/>
+        <a:p>
+          <a:endParaRPr lang="en-US" sz="1200">
+            <a:latin typeface="Bahnschrift Condensed" panose="020B0502040204020203" pitchFamily="34" charset="0"/>
+          </a:endParaRPr>
+        </a:p>
+      </dgm:t>
+    </dgm:pt>
+    <dgm:pt modelId="{6C2F3640-533E-4124-9645-B002B64453C3}">
+      <dgm:prSet phldrT="[Text]" custT="1"/>
+      <dgm:spPr/>
+      <dgm:t>
+        <a:bodyPr/>
+        <a:lstStyle/>
+        <a:p>
+          <a:r>
+            <a:rPr lang="en-US" sz="1400" dirty="0">
+              <a:latin typeface="Bahnschrift Condensed" panose="020B0502040204020203" pitchFamily="34" charset="0"/>
+            </a:rPr>
+            <a:t>Cover</a:t>
+          </a:r>
+        </a:p>
+      </dgm:t>
+    </dgm:pt>
+    <dgm:pt modelId="{9558092B-10EC-4DE9-8081-6F86B460E40B}" type="parTrans" cxnId="{B9B3CDD9-6E7C-460C-B612-D0DCB1BDB37C}">
+      <dgm:prSet/>
+      <dgm:spPr/>
+      <dgm:t>
+        <a:bodyPr/>
+        <a:lstStyle/>
+        <a:p>
+          <a:endParaRPr lang="en-US" sz="1200">
+            <a:latin typeface="Bahnschrift Condensed" panose="020B0502040204020203" pitchFamily="34" charset="0"/>
+          </a:endParaRPr>
+        </a:p>
+      </dgm:t>
+    </dgm:pt>
+    <dgm:pt modelId="{E565A1AF-9AFB-415E-B055-EA0AFB4C641A}" type="sibTrans" cxnId="{B9B3CDD9-6E7C-460C-B612-D0DCB1BDB37C}">
+      <dgm:prSet/>
+      <dgm:spPr/>
+      <dgm:t>
+        <a:bodyPr/>
+        <a:lstStyle/>
+        <a:p>
+          <a:endParaRPr lang="en-US" sz="1200">
+            <a:latin typeface="Bahnschrift Condensed" panose="020B0502040204020203" pitchFamily="34" charset="0"/>
+          </a:endParaRPr>
+        </a:p>
+      </dgm:t>
+    </dgm:pt>
+    <dgm:pt modelId="{DBDB76C4-48AF-47B9-B67E-EAA8A7080607}">
+      <dgm:prSet phldrT="[Text]" custT="1"/>
+      <dgm:spPr/>
+      <dgm:t>
+        <a:bodyPr/>
+        <a:lstStyle/>
+        <a:p>
+          <a:r>
+            <a:rPr lang="en-US" sz="1400" dirty="0">
+              <a:latin typeface="Bahnschrift Condensed" panose="020B0502040204020203" pitchFamily="34" charset="0"/>
+            </a:rPr>
+            <a:t>Dominant species</a:t>
+          </a:r>
+        </a:p>
+      </dgm:t>
+    </dgm:pt>
+    <dgm:pt modelId="{A42EC9F1-091F-405B-9373-2679D57C5DB9}" type="parTrans" cxnId="{CA8BA92A-5AE9-4E13-A302-43E90698EF34}">
+      <dgm:prSet/>
+      <dgm:spPr/>
+      <dgm:t>
+        <a:bodyPr/>
+        <a:lstStyle/>
+        <a:p>
+          <a:endParaRPr lang="en-US" sz="1200">
+            <a:latin typeface="Bahnschrift Condensed" panose="020B0502040204020203" pitchFamily="34" charset="0"/>
+          </a:endParaRPr>
+        </a:p>
+      </dgm:t>
+    </dgm:pt>
+    <dgm:pt modelId="{8A9AA200-5F5D-4393-B817-7CEAE01F6849}" type="sibTrans" cxnId="{CA8BA92A-5AE9-4E13-A302-43E90698EF34}">
+      <dgm:prSet/>
+      <dgm:spPr/>
+      <dgm:t>
+        <a:bodyPr/>
+        <a:lstStyle/>
+        <a:p>
+          <a:endParaRPr lang="en-US" sz="1200">
+            <a:latin typeface="Bahnschrift Condensed" panose="020B0502040204020203" pitchFamily="34" charset="0"/>
+          </a:endParaRPr>
+        </a:p>
+      </dgm:t>
+    </dgm:pt>
+    <dgm:pt modelId="{0EEC1720-D859-4C50-8C59-F7E82CA883C5}">
+      <dgm:prSet phldrT="[Text]" custT="1"/>
+      <dgm:spPr/>
+      <dgm:t>
+        <a:bodyPr/>
+        <a:lstStyle/>
+        <a:p>
+          <a:r>
+            <a:rPr lang="en-US" sz="1400" dirty="0">
+              <a:latin typeface="Bahnschrift Condensed" panose="020B0502040204020203" pitchFamily="34" charset="0"/>
+            </a:rPr>
+            <a:t>Database homologation</a:t>
+          </a:r>
+        </a:p>
+      </dgm:t>
+    </dgm:pt>
+    <dgm:pt modelId="{6B7AA54A-5F17-4D8A-BCBE-6FCF2A6DBBEB}" type="parTrans" cxnId="{4B08E6E6-4F63-47BA-A222-874AA9F84975}">
+      <dgm:prSet/>
+      <dgm:spPr/>
+      <dgm:t>
+        <a:bodyPr/>
+        <a:lstStyle/>
+        <a:p>
+          <a:endParaRPr lang="en-US" sz="1200">
+            <a:latin typeface="Bahnschrift Condensed" panose="020B0502040204020203" pitchFamily="34" charset="0"/>
+          </a:endParaRPr>
+        </a:p>
+      </dgm:t>
+    </dgm:pt>
+    <dgm:pt modelId="{2622ED38-9D48-40DB-94E3-B4BE2D4FFD69}" type="sibTrans" cxnId="{4B08E6E6-4F63-47BA-A222-874AA9F84975}">
+      <dgm:prSet/>
+      <dgm:spPr/>
+      <dgm:t>
+        <a:bodyPr/>
+        <a:lstStyle/>
+        <a:p>
+          <a:endParaRPr lang="en-US" sz="1200">
+            <a:latin typeface="Bahnschrift Condensed" panose="020B0502040204020203" pitchFamily="34" charset="0"/>
+          </a:endParaRPr>
+        </a:p>
+      </dgm:t>
+    </dgm:pt>
+    <dgm:pt modelId="{C8A334F4-33FC-44F0-A1D0-79EC944F0B18}">
+      <dgm:prSet phldrT="[Text]" custT="1"/>
+      <dgm:spPr/>
+      <dgm:t>
+        <a:bodyPr/>
+        <a:lstStyle/>
+        <a:p>
+          <a:r>
+            <a:rPr lang="en-GB" sz="1400" dirty="0">
+              <a:latin typeface="Bahnschrift Condensed" panose="020B0502040204020203" pitchFamily="34" charset="0"/>
+            </a:rPr>
+            <a:t>Summary Statistics</a:t>
+          </a:r>
+          <a:endParaRPr lang="en-US" sz="1400" dirty="0">
+            <a:latin typeface="Bahnschrift Condensed" panose="020B0502040204020203" pitchFamily="34" charset="0"/>
+          </a:endParaRPr>
+        </a:p>
+      </dgm:t>
+    </dgm:pt>
+    <dgm:pt modelId="{8A46D847-7C91-4D8A-9C73-CAE0A1B84595}" type="parTrans" cxnId="{32DEF137-067A-4C67-B0A6-71DA03A2CF76}">
+      <dgm:prSet/>
+      <dgm:spPr/>
+      <dgm:t>
+        <a:bodyPr/>
+        <a:lstStyle/>
+        <a:p>
+          <a:endParaRPr lang="en-US" sz="1200">
+            <a:latin typeface="Bahnschrift Condensed" panose="020B0502040204020203" pitchFamily="34" charset="0"/>
+          </a:endParaRPr>
+        </a:p>
+      </dgm:t>
+    </dgm:pt>
+    <dgm:pt modelId="{36277F7E-BA3C-482F-8CF2-3F4A612C78BA}" type="sibTrans" cxnId="{32DEF137-067A-4C67-B0A6-71DA03A2CF76}">
+      <dgm:prSet/>
+      <dgm:spPr/>
+      <dgm:t>
+        <a:bodyPr/>
+        <a:lstStyle/>
+        <a:p>
+          <a:endParaRPr lang="en-US" sz="1200">
+            <a:latin typeface="Bahnschrift Condensed" panose="020B0502040204020203" pitchFamily="34" charset="0"/>
+          </a:endParaRPr>
+        </a:p>
+      </dgm:t>
+    </dgm:pt>
+    <dgm:pt modelId="{437BD411-236D-4A62-99AC-AA7663C092D1}">
+      <dgm:prSet phldrT="[Text]" custT="1"/>
+      <dgm:spPr/>
+      <dgm:t>
+        <a:bodyPr/>
+        <a:lstStyle/>
+        <a:p>
+          <a:r>
+            <a:rPr lang="en-US" sz="1400" dirty="0">
+              <a:latin typeface="Bahnschrift Condensed" panose="020B0502040204020203" pitchFamily="34" charset="0"/>
+            </a:rPr>
+            <a:t>Minimum area</a:t>
+          </a:r>
+        </a:p>
+        <a:p>
+          <a:r>
+            <a:rPr lang="en-US" sz="1400">
+              <a:latin typeface="Bahnschrift Condensed" panose="020B0502040204020203" pitchFamily="34" charset="0"/>
+            </a:rPr>
+            <a:t>3px (900 m²)</a:t>
+          </a:r>
+          <a:endParaRPr lang="en-US" sz="1400" dirty="0">
+            <a:latin typeface="Bahnschrift Condensed" panose="020B0502040204020203" pitchFamily="34" charset="0"/>
+          </a:endParaRPr>
+        </a:p>
+      </dgm:t>
+    </dgm:pt>
+    <dgm:pt modelId="{F2CD17C7-4A50-47CA-9D1E-B70CDF1260FD}" type="parTrans" cxnId="{A07944BE-1CE2-4628-95C6-4714D973A9A1}">
+      <dgm:prSet/>
+      <dgm:spPr/>
+      <dgm:t>
+        <a:bodyPr/>
+        <a:lstStyle/>
+        <a:p>
+          <a:endParaRPr lang="en-US"/>
+        </a:p>
+      </dgm:t>
+    </dgm:pt>
+    <dgm:pt modelId="{668F71E2-CB3D-4782-8656-E35741811C28}" type="sibTrans" cxnId="{A07944BE-1CE2-4628-95C6-4714D973A9A1}">
+      <dgm:prSet/>
+      <dgm:spPr/>
+      <dgm:t>
+        <a:bodyPr/>
+        <a:lstStyle/>
+        <a:p>
+          <a:endParaRPr lang="en-US"/>
+        </a:p>
+      </dgm:t>
+    </dgm:pt>
+    <dgm:pt modelId="{BB9DF2E6-F6C8-4DF7-AD7A-82B33758D3CA}" type="pres">
+      <dgm:prSet presAssocID="{1087B84F-C02F-4698-94D1-CE459D9E6948}" presName="Name0" presStyleCnt="0">
+        <dgm:presLayoutVars>
+          <dgm:dir/>
+          <dgm:animLvl val="lvl"/>
+          <dgm:resizeHandles val="exact"/>
+        </dgm:presLayoutVars>
+      </dgm:prSet>
+      <dgm:spPr/>
+    </dgm:pt>
+    <dgm:pt modelId="{3C92EC2D-0AE5-4D07-B83C-93E05F3235D3}" type="pres">
+      <dgm:prSet presAssocID="{7CEFE328-F7D5-4D61-AC08-178634CDC37C}" presName="boxAndChildren" presStyleCnt="0"/>
+      <dgm:spPr/>
+    </dgm:pt>
+    <dgm:pt modelId="{FFD716B5-B651-4FFF-B9BD-0748018E9AF7}" type="pres">
+      <dgm:prSet presAssocID="{7CEFE328-F7D5-4D61-AC08-178634CDC37C}" presName="parentTextBox" presStyleLbl="node1" presStyleIdx="0" presStyleCnt="3"/>
+      <dgm:spPr/>
+    </dgm:pt>
+    <dgm:pt modelId="{7B5E8E08-5933-4496-9B92-5CC854BC1AF4}" type="pres">
+      <dgm:prSet presAssocID="{7CEFE328-F7D5-4D61-AC08-178634CDC37C}" presName="entireBox" presStyleLbl="node1" presStyleIdx="0" presStyleCnt="3"/>
+      <dgm:spPr/>
+    </dgm:pt>
+    <dgm:pt modelId="{0C686E39-8006-4DD6-BDF6-98ACD81DB259}" type="pres">
+      <dgm:prSet presAssocID="{7CEFE328-F7D5-4D61-AC08-178634CDC37C}" presName="descendantBox" presStyleCnt="0"/>
+      <dgm:spPr/>
+    </dgm:pt>
+    <dgm:pt modelId="{DC843301-E222-4FE4-8490-FFADD8DAB0AB}" type="pres">
+      <dgm:prSet presAssocID="{819CB0EF-B1C5-4DA9-8D08-15F240D32855}" presName="childTextBox" presStyleLbl="fgAccFollowNode1" presStyleIdx="0" presStyleCnt="8">
+        <dgm:presLayoutVars>
+          <dgm:bulletEnabled val="1"/>
+        </dgm:presLayoutVars>
+      </dgm:prSet>
+      <dgm:spPr/>
+    </dgm:pt>
+    <dgm:pt modelId="{FF631791-490A-4E61-98E8-57571B0DA0B3}" type="pres">
+      <dgm:prSet presAssocID="{0EEC1720-D859-4C50-8C59-F7E82CA883C5}" presName="childTextBox" presStyleLbl="fgAccFollowNode1" presStyleIdx="1" presStyleCnt="8">
+        <dgm:presLayoutVars>
+          <dgm:bulletEnabled val="1"/>
+        </dgm:presLayoutVars>
+      </dgm:prSet>
+      <dgm:spPr/>
+    </dgm:pt>
+    <dgm:pt modelId="{10DC22EA-4342-419B-87C8-5AEC9FCA1FCD}" type="pres">
+      <dgm:prSet presAssocID="{C8A334F4-33FC-44F0-A1D0-79EC944F0B18}" presName="childTextBox" presStyleLbl="fgAccFollowNode1" presStyleIdx="2" presStyleCnt="8">
+        <dgm:presLayoutVars>
+          <dgm:bulletEnabled val="1"/>
+        </dgm:presLayoutVars>
+      </dgm:prSet>
+      <dgm:spPr/>
+    </dgm:pt>
+    <dgm:pt modelId="{FDE07A64-165D-49BE-866E-C19C32B903CE}" type="pres">
+      <dgm:prSet presAssocID="{21DE3602-C588-4824-A31D-01EC453235DA}" presName="sp" presStyleCnt="0"/>
+      <dgm:spPr/>
+    </dgm:pt>
+    <dgm:pt modelId="{A74F9CE3-7BB2-42CD-9E62-86BCC44821B2}" type="pres">
+      <dgm:prSet presAssocID="{BC09EBE8-FA92-41B2-8CA0-28D929E4556D}" presName="arrowAndChildren" presStyleCnt="0"/>
+      <dgm:spPr/>
+    </dgm:pt>
+    <dgm:pt modelId="{EC27255D-863C-4D51-910F-90C8F2122C1C}" type="pres">
+      <dgm:prSet presAssocID="{BC09EBE8-FA92-41B2-8CA0-28D929E4556D}" presName="parentTextArrow" presStyleLbl="node1" presStyleIdx="0" presStyleCnt="3"/>
+      <dgm:spPr/>
+    </dgm:pt>
+    <dgm:pt modelId="{ECCBCBC0-602C-4EEE-9038-EE1C5238DBB7}" type="pres">
+      <dgm:prSet presAssocID="{BC09EBE8-FA92-41B2-8CA0-28D929E4556D}" presName="arrow" presStyleLbl="node1" presStyleIdx="1" presStyleCnt="3"/>
+      <dgm:spPr/>
+    </dgm:pt>
+    <dgm:pt modelId="{E353BD47-C480-42D5-84C9-A38BFB4D4135}" type="pres">
+      <dgm:prSet presAssocID="{BC09EBE8-FA92-41B2-8CA0-28D929E4556D}" presName="descendantArrow" presStyleCnt="0"/>
+      <dgm:spPr/>
+    </dgm:pt>
+    <dgm:pt modelId="{96243511-25C5-4D01-99E3-DDB8DD1B6D7C}" type="pres">
+      <dgm:prSet presAssocID="{9B842720-5BC2-4191-9B55-96FC50970C51}" presName="childTextArrow" presStyleLbl="fgAccFollowNode1" presStyleIdx="3" presStyleCnt="8">
+        <dgm:presLayoutVars>
+          <dgm:bulletEnabled val="1"/>
+        </dgm:presLayoutVars>
+      </dgm:prSet>
+      <dgm:spPr/>
+    </dgm:pt>
+    <dgm:pt modelId="{24DB7BC3-3B68-4596-88B8-5403081837AB}" type="pres">
+      <dgm:prSet presAssocID="{6C2F3640-533E-4124-9645-B002B64453C3}" presName="childTextArrow" presStyleLbl="fgAccFollowNode1" presStyleIdx="4" presStyleCnt="8">
+        <dgm:presLayoutVars>
+          <dgm:bulletEnabled val="1"/>
+        </dgm:presLayoutVars>
+      </dgm:prSet>
+      <dgm:spPr/>
+    </dgm:pt>
+    <dgm:pt modelId="{BD4BAE9C-3DEB-43A3-8715-DBD35AA2C0F7}" type="pres">
+      <dgm:prSet presAssocID="{DBDB76C4-48AF-47B9-B67E-EAA8A7080607}" presName="childTextArrow" presStyleLbl="fgAccFollowNode1" presStyleIdx="5" presStyleCnt="8" custLinFactNeighborX="891">
+        <dgm:presLayoutVars>
+          <dgm:bulletEnabled val="1"/>
+        </dgm:presLayoutVars>
+      </dgm:prSet>
+      <dgm:spPr/>
+    </dgm:pt>
+    <dgm:pt modelId="{B906CCC5-2E17-4E8C-AC19-8CD49713422F}" type="pres">
+      <dgm:prSet presAssocID="{437BD411-236D-4A62-99AC-AA7663C092D1}" presName="childTextArrow" presStyleLbl="fgAccFollowNode1" presStyleIdx="6" presStyleCnt="8">
+        <dgm:presLayoutVars>
+          <dgm:bulletEnabled val="1"/>
+        </dgm:presLayoutVars>
+      </dgm:prSet>
+      <dgm:spPr/>
+    </dgm:pt>
+    <dgm:pt modelId="{9E61FF6C-A883-4833-9EFE-3D83C7382012}" type="pres">
+      <dgm:prSet presAssocID="{C61A4FEF-0796-4F85-AEB0-43AC2AB29DD3}" presName="sp" presStyleCnt="0"/>
+      <dgm:spPr/>
+    </dgm:pt>
+    <dgm:pt modelId="{E0B9FD94-919F-41C3-AF5D-0395BF0622DB}" type="pres">
+      <dgm:prSet presAssocID="{39E16D4F-DFB6-4B93-8E54-EE965454A374}" presName="arrowAndChildren" presStyleCnt="0"/>
+      <dgm:spPr/>
+    </dgm:pt>
+    <dgm:pt modelId="{202A886C-974A-47EC-B474-29DFF38BC6C3}" type="pres">
+      <dgm:prSet presAssocID="{39E16D4F-DFB6-4B93-8E54-EE965454A374}" presName="parentTextArrow" presStyleLbl="node1" presStyleIdx="1" presStyleCnt="3"/>
+      <dgm:spPr/>
+    </dgm:pt>
+    <dgm:pt modelId="{64615004-EB80-47F0-B528-3DE8B993ED90}" type="pres">
+      <dgm:prSet presAssocID="{39E16D4F-DFB6-4B93-8E54-EE965454A374}" presName="arrow" presStyleLbl="node1" presStyleIdx="2" presStyleCnt="3" custScaleY="96809" custLinFactNeighborX="-8329" custLinFactNeighborY="-2017"/>
+      <dgm:spPr/>
+    </dgm:pt>
+    <dgm:pt modelId="{98F16593-6E3B-40E3-BFF2-EAF17E5F0ADA}" type="pres">
+      <dgm:prSet presAssocID="{39E16D4F-DFB6-4B93-8E54-EE965454A374}" presName="descendantArrow" presStyleCnt="0"/>
+      <dgm:spPr/>
+    </dgm:pt>
+    <dgm:pt modelId="{4A13DAFA-62EE-4906-9D77-2A491470B4F7}" type="pres">
+      <dgm:prSet presAssocID="{91A7BBE7-84AC-422A-9537-72EAE861AEEB}" presName="childTextArrow" presStyleLbl="fgAccFollowNode1" presStyleIdx="7" presStyleCnt="8">
+        <dgm:presLayoutVars>
+          <dgm:bulletEnabled val="1"/>
+        </dgm:presLayoutVars>
+      </dgm:prSet>
+      <dgm:spPr/>
+    </dgm:pt>
+  </dgm:ptLst>
+  <dgm:cxnLst>
+    <dgm:cxn modelId="{980D2403-B081-46C8-8826-7EE0D611097F}" srcId="{1087B84F-C02F-4698-94D1-CE459D9E6948}" destId="{BC09EBE8-FA92-41B2-8CA0-28D929E4556D}" srcOrd="1" destOrd="0" parTransId="{38B38864-59A6-4987-9D4F-CB61C44FC8EA}" sibTransId="{21DE3602-C588-4824-A31D-01EC453235DA}"/>
+    <dgm:cxn modelId="{957F820A-D7DF-4E27-8573-48F501172EC2}" type="presOf" srcId="{0EEC1720-D859-4C50-8C59-F7E82CA883C5}" destId="{FF631791-490A-4E61-98E8-57571B0DA0B3}" srcOrd="0" destOrd="0" presId="urn:microsoft.com/office/officeart/2005/8/layout/process4"/>
+    <dgm:cxn modelId="{6BBB6013-DBCB-4000-AB6D-6BBD20136FB6}" type="presOf" srcId="{1087B84F-C02F-4698-94D1-CE459D9E6948}" destId="{BB9DF2E6-F6C8-4DF7-AD7A-82B33758D3CA}" srcOrd="0" destOrd="0" presId="urn:microsoft.com/office/officeart/2005/8/layout/process4"/>
+    <dgm:cxn modelId="{D20C7721-BFF1-45FF-82E0-AD8FCBDF3463}" type="presOf" srcId="{39E16D4F-DFB6-4B93-8E54-EE965454A374}" destId="{64615004-EB80-47F0-B528-3DE8B993ED90}" srcOrd="1" destOrd="0" presId="urn:microsoft.com/office/officeart/2005/8/layout/process4"/>
+    <dgm:cxn modelId="{91FF742A-9C26-4127-9BED-7FD8630441EC}" type="presOf" srcId="{7CEFE328-F7D5-4D61-AC08-178634CDC37C}" destId="{FFD716B5-B651-4FFF-B9BD-0748018E9AF7}" srcOrd="0" destOrd="0" presId="urn:microsoft.com/office/officeart/2005/8/layout/process4"/>
+    <dgm:cxn modelId="{CA8BA92A-5AE9-4E13-A302-43E90698EF34}" srcId="{BC09EBE8-FA92-41B2-8CA0-28D929E4556D}" destId="{DBDB76C4-48AF-47B9-B67E-EAA8A7080607}" srcOrd="2" destOrd="0" parTransId="{A42EC9F1-091F-405B-9373-2679D57C5DB9}" sibTransId="{8A9AA200-5F5D-4393-B817-7CEAE01F6849}"/>
+    <dgm:cxn modelId="{7B0AE52F-B1B9-41E1-814A-B7A7259287C5}" type="presOf" srcId="{BC09EBE8-FA92-41B2-8CA0-28D929E4556D}" destId="{EC27255D-863C-4D51-910F-90C8F2122C1C}" srcOrd="0" destOrd="0" presId="urn:microsoft.com/office/officeart/2005/8/layout/process4"/>
+    <dgm:cxn modelId="{32DEF137-067A-4C67-B0A6-71DA03A2CF76}" srcId="{7CEFE328-F7D5-4D61-AC08-178634CDC37C}" destId="{C8A334F4-33FC-44F0-A1D0-79EC944F0B18}" srcOrd="2" destOrd="0" parTransId="{8A46D847-7C91-4D8A-9C73-CAE0A1B84595}" sibTransId="{36277F7E-BA3C-482F-8CF2-3F4A612C78BA}"/>
+    <dgm:cxn modelId="{A2BDE669-929E-4606-B99F-0F19FFDE5163}" srcId="{BC09EBE8-FA92-41B2-8CA0-28D929E4556D}" destId="{9B842720-5BC2-4191-9B55-96FC50970C51}" srcOrd="0" destOrd="0" parTransId="{92E3AB77-A4BA-4A26-95D3-B0BA36719974}" sibTransId="{1922CCE8-A111-42CD-A398-80B367770097}"/>
+    <dgm:cxn modelId="{5914226E-A6CB-4A0D-9BB8-97CC1F78391F}" srcId="{1087B84F-C02F-4698-94D1-CE459D9E6948}" destId="{39E16D4F-DFB6-4B93-8E54-EE965454A374}" srcOrd="0" destOrd="0" parTransId="{A1459550-4691-40FA-94D8-6073F5012234}" sibTransId="{C61A4FEF-0796-4F85-AEB0-43AC2AB29DD3}"/>
+    <dgm:cxn modelId="{BB1FFA52-61BD-4A8B-81C0-1ED9A2586366}" type="presOf" srcId="{C8A334F4-33FC-44F0-A1D0-79EC944F0B18}" destId="{10DC22EA-4342-419B-87C8-5AEC9FCA1FCD}" srcOrd="0" destOrd="0" presId="urn:microsoft.com/office/officeart/2005/8/layout/process4"/>
+    <dgm:cxn modelId="{FC881177-6D44-4A0A-8A79-31E976D2BE59}" type="presOf" srcId="{91A7BBE7-84AC-422A-9537-72EAE861AEEB}" destId="{4A13DAFA-62EE-4906-9D77-2A491470B4F7}" srcOrd="0" destOrd="0" presId="urn:microsoft.com/office/officeart/2005/8/layout/process4"/>
+    <dgm:cxn modelId="{D8BF8758-F953-497B-99A4-7900752082B1}" type="presOf" srcId="{9B842720-5BC2-4191-9B55-96FC50970C51}" destId="{96243511-25C5-4D01-99E3-DDB8DD1B6D7C}" srcOrd="0" destOrd="0" presId="urn:microsoft.com/office/officeart/2005/8/layout/process4"/>
+    <dgm:cxn modelId="{BAA1B258-8A2F-4253-95F7-4A3E4AAB2FBC}" srcId="{1087B84F-C02F-4698-94D1-CE459D9E6948}" destId="{7CEFE328-F7D5-4D61-AC08-178634CDC37C}" srcOrd="2" destOrd="0" parTransId="{D6A2278D-5DBC-46A7-AD97-B9D4895E7FF3}" sibTransId="{782D162B-824C-4BDB-AFB9-61E7BA7B39DE}"/>
+    <dgm:cxn modelId="{13C4ED79-2870-43F4-B801-C596F573C34E}" type="presOf" srcId="{819CB0EF-B1C5-4DA9-8D08-15F240D32855}" destId="{DC843301-E222-4FE4-8490-FFADD8DAB0AB}" srcOrd="0" destOrd="0" presId="urn:microsoft.com/office/officeart/2005/8/layout/process4"/>
+    <dgm:cxn modelId="{0BD3B291-34A3-420B-A282-3F0EF9BEEFE0}" type="presOf" srcId="{DBDB76C4-48AF-47B9-B67E-EAA8A7080607}" destId="{BD4BAE9C-3DEB-43A3-8715-DBD35AA2C0F7}" srcOrd="0" destOrd="0" presId="urn:microsoft.com/office/officeart/2005/8/layout/process4"/>
+    <dgm:cxn modelId="{D8F877B9-BE6B-49F5-9673-4B89B7300CED}" srcId="{7CEFE328-F7D5-4D61-AC08-178634CDC37C}" destId="{819CB0EF-B1C5-4DA9-8D08-15F240D32855}" srcOrd="0" destOrd="0" parTransId="{FD533074-4AAD-4454-A860-A424627A9D24}" sibTransId="{5DCAF122-439B-4926-83E1-536B35E8E52A}"/>
+    <dgm:cxn modelId="{A07944BE-1CE2-4628-95C6-4714D973A9A1}" srcId="{BC09EBE8-FA92-41B2-8CA0-28D929E4556D}" destId="{437BD411-236D-4A62-99AC-AA7663C092D1}" srcOrd="3" destOrd="0" parTransId="{F2CD17C7-4A50-47CA-9D1E-B70CDF1260FD}" sibTransId="{668F71E2-CB3D-4782-8656-E35741811C28}"/>
+    <dgm:cxn modelId="{4F56F3CD-40EE-4F58-A674-CF162F7BB760}" type="presOf" srcId="{7CEFE328-F7D5-4D61-AC08-178634CDC37C}" destId="{7B5E8E08-5933-4496-9B92-5CC854BC1AF4}" srcOrd="1" destOrd="0" presId="urn:microsoft.com/office/officeart/2005/8/layout/process4"/>
+    <dgm:cxn modelId="{F206D2CE-B3B4-4834-9BC9-85FC839329E2}" type="presOf" srcId="{39E16D4F-DFB6-4B93-8E54-EE965454A374}" destId="{202A886C-974A-47EC-B474-29DFF38BC6C3}" srcOrd="0" destOrd="0" presId="urn:microsoft.com/office/officeart/2005/8/layout/process4"/>
+    <dgm:cxn modelId="{5F2A36D2-8A59-4AC7-889A-9BF78440454E}" type="presOf" srcId="{BC09EBE8-FA92-41B2-8CA0-28D929E4556D}" destId="{ECCBCBC0-602C-4EEE-9038-EE1C5238DBB7}" srcOrd="1" destOrd="0" presId="urn:microsoft.com/office/officeart/2005/8/layout/process4"/>
+    <dgm:cxn modelId="{EFD1ACD6-D7D2-40EC-A8AC-0480B694C84A}" srcId="{39E16D4F-DFB6-4B93-8E54-EE965454A374}" destId="{91A7BBE7-84AC-422A-9537-72EAE861AEEB}" srcOrd="0" destOrd="0" parTransId="{65ED73B2-4920-49BB-8848-527016A17E58}" sibTransId="{198CDB15-06CE-4944-ADA9-02D3FF8F9102}"/>
+    <dgm:cxn modelId="{B9B3CDD9-6E7C-460C-B612-D0DCB1BDB37C}" srcId="{BC09EBE8-FA92-41B2-8CA0-28D929E4556D}" destId="{6C2F3640-533E-4124-9645-B002B64453C3}" srcOrd="1" destOrd="0" parTransId="{9558092B-10EC-4DE9-8081-6F86B460E40B}" sibTransId="{E565A1AF-9AFB-415E-B055-EA0AFB4C641A}"/>
+    <dgm:cxn modelId="{2D85D9E3-3A95-4EC1-A106-23D72DD491AB}" type="presOf" srcId="{437BD411-236D-4A62-99AC-AA7663C092D1}" destId="{B906CCC5-2E17-4E8C-AC19-8CD49713422F}" srcOrd="0" destOrd="0" presId="urn:microsoft.com/office/officeart/2005/8/layout/process4"/>
+    <dgm:cxn modelId="{4B08E6E6-4F63-47BA-A222-874AA9F84975}" srcId="{7CEFE328-F7D5-4D61-AC08-178634CDC37C}" destId="{0EEC1720-D859-4C50-8C59-F7E82CA883C5}" srcOrd="1" destOrd="0" parTransId="{6B7AA54A-5F17-4D8A-BCBE-6FCF2A6DBBEB}" sibTransId="{2622ED38-9D48-40DB-94E3-B4BE2D4FFD69}"/>
+    <dgm:cxn modelId="{3A411CEE-D498-4127-9DFA-2DE716954B52}" type="presOf" srcId="{6C2F3640-533E-4124-9645-B002B64453C3}" destId="{24DB7BC3-3B68-4596-88B8-5403081837AB}" srcOrd="0" destOrd="0" presId="urn:microsoft.com/office/officeart/2005/8/layout/process4"/>
+    <dgm:cxn modelId="{8D8AD9F7-A0FD-4FCA-B32A-3437ADD1364C}" type="presParOf" srcId="{BB9DF2E6-F6C8-4DF7-AD7A-82B33758D3CA}" destId="{3C92EC2D-0AE5-4D07-B83C-93E05F3235D3}" srcOrd="0" destOrd="0" presId="urn:microsoft.com/office/officeart/2005/8/layout/process4"/>
+    <dgm:cxn modelId="{D9425378-043C-41C1-A099-611D79378D5B}" type="presParOf" srcId="{3C92EC2D-0AE5-4D07-B83C-93E05F3235D3}" destId="{FFD716B5-B651-4FFF-B9BD-0748018E9AF7}" srcOrd="0" destOrd="0" presId="urn:microsoft.com/office/officeart/2005/8/layout/process4"/>
+    <dgm:cxn modelId="{D792DB38-D0E5-4696-80A0-4DD1B807A233}" type="presParOf" srcId="{3C92EC2D-0AE5-4D07-B83C-93E05F3235D3}" destId="{7B5E8E08-5933-4496-9B92-5CC854BC1AF4}" srcOrd="1" destOrd="0" presId="urn:microsoft.com/office/officeart/2005/8/layout/process4"/>
+    <dgm:cxn modelId="{3F0EEEF8-EC02-48AF-ADFF-9908C65190F0}" type="presParOf" srcId="{3C92EC2D-0AE5-4D07-B83C-93E05F3235D3}" destId="{0C686E39-8006-4DD6-BDF6-98ACD81DB259}" srcOrd="2" destOrd="0" presId="urn:microsoft.com/office/officeart/2005/8/layout/process4"/>
+    <dgm:cxn modelId="{0990AEC5-EBB2-46F1-A560-65A276ECAD82}" type="presParOf" srcId="{0C686E39-8006-4DD6-BDF6-98ACD81DB259}" destId="{DC843301-E222-4FE4-8490-FFADD8DAB0AB}" srcOrd="0" destOrd="0" presId="urn:microsoft.com/office/officeart/2005/8/layout/process4"/>
+    <dgm:cxn modelId="{31A31516-5F36-4A3E-A84D-42739EF17C55}" type="presParOf" srcId="{0C686E39-8006-4DD6-BDF6-98ACD81DB259}" destId="{FF631791-490A-4E61-98E8-57571B0DA0B3}" srcOrd="1" destOrd="0" presId="urn:microsoft.com/office/officeart/2005/8/layout/process4"/>
+    <dgm:cxn modelId="{064E4592-7E19-441D-BC69-823D1F0F580D}" type="presParOf" srcId="{0C686E39-8006-4DD6-BDF6-98ACD81DB259}" destId="{10DC22EA-4342-419B-87C8-5AEC9FCA1FCD}" srcOrd="2" destOrd="0" presId="urn:microsoft.com/office/officeart/2005/8/layout/process4"/>
+    <dgm:cxn modelId="{1574DC8B-7AA3-4010-8244-C27D1A144DA2}" type="presParOf" srcId="{BB9DF2E6-F6C8-4DF7-AD7A-82B33758D3CA}" destId="{FDE07A64-165D-49BE-866E-C19C32B903CE}" srcOrd="1" destOrd="0" presId="urn:microsoft.com/office/officeart/2005/8/layout/process4"/>
+    <dgm:cxn modelId="{D07D7165-1F9E-4FD2-8F72-65548B8AB7DC}" type="presParOf" srcId="{BB9DF2E6-F6C8-4DF7-AD7A-82B33758D3CA}" destId="{A74F9CE3-7BB2-42CD-9E62-86BCC44821B2}" srcOrd="2" destOrd="0" presId="urn:microsoft.com/office/officeart/2005/8/layout/process4"/>
+    <dgm:cxn modelId="{4349185E-5047-4D09-BF16-667468917142}" type="presParOf" srcId="{A74F9CE3-7BB2-42CD-9E62-86BCC44821B2}" destId="{EC27255D-863C-4D51-910F-90C8F2122C1C}" srcOrd="0" destOrd="0" presId="urn:microsoft.com/office/officeart/2005/8/layout/process4"/>
+    <dgm:cxn modelId="{42F1ADE3-4E55-45B7-8EC2-F6702920A46F}" type="presParOf" srcId="{A74F9CE3-7BB2-42CD-9E62-86BCC44821B2}" destId="{ECCBCBC0-602C-4EEE-9038-EE1C5238DBB7}" srcOrd="1" destOrd="0" presId="urn:microsoft.com/office/officeart/2005/8/layout/process4"/>
+    <dgm:cxn modelId="{034DB759-CB42-4316-BCFF-C652FC6BD62A}" type="presParOf" srcId="{A74F9CE3-7BB2-42CD-9E62-86BCC44821B2}" destId="{E353BD47-C480-42D5-84C9-A38BFB4D4135}" srcOrd="2" destOrd="0" presId="urn:microsoft.com/office/officeart/2005/8/layout/process4"/>
+    <dgm:cxn modelId="{3E5A3090-97BB-4BB5-9D86-D248ADD11619}" type="presParOf" srcId="{E353BD47-C480-42D5-84C9-A38BFB4D4135}" destId="{96243511-25C5-4D01-99E3-DDB8DD1B6D7C}" srcOrd="0" destOrd="0" presId="urn:microsoft.com/office/officeart/2005/8/layout/process4"/>
+    <dgm:cxn modelId="{BA76E42B-DEB5-40BF-BAFC-204FC6FD452A}" type="presParOf" srcId="{E353BD47-C480-42D5-84C9-A38BFB4D4135}" destId="{24DB7BC3-3B68-4596-88B8-5403081837AB}" srcOrd="1" destOrd="0" presId="urn:microsoft.com/office/officeart/2005/8/layout/process4"/>
+    <dgm:cxn modelId="{7640913E-22A4-432F-9CB6-34F8BBA3EB36}" type="presParOf" srcId="{E353BD47-C480-42D5-84C9-A38BFB4D4135}" destId="{BD4BAE9C-3DEB-43A3-8715-DBD35AA2C0F7}" srcOrd="2" destOrd="0" presId="urn:microsoft.com/office/officeart/2005/8/layout/process4"/>
+    <dgm:cxn modelId="{D7274DCE-2C02-477E-B04A-96D08C1F7AC3}" type="presParOf" srcId="{E353BD47-C480-42D5-84C9-A38BFB4D4135}" destId="{B906CCC5-2E17-4E8C-AC19-8CD49713422F}" srcOrd="3" destOrd="0" presId="urn:microsoft.com/office/officeart/2005/8/layout/process4"/>
+    <dgm:cxn modelId="{94CD2A94-BB27-498F-B47D-5FBD7DFF0C75}" type="presParOf" srcId="{BB9DF2E6-F6C8-4DF7-AD7A-82B33758D3CA}" destId="{9E61FF6C-A883-4833-9EFE-3D83C7382012}" srcOrd="3" destOrd="0" presId="urn:microsoft.com/office/officeart/2005/8/layout/process4"/>
+    <dgm:cxn modelId="{C08D0973-EC8A-4D22-A92C-9CA7BE1BA811}" type="presParOf" srcId="{BB9DF2E6-F6C8-4DF7-AD7A-82B33758D3CA}" destId="{E0B9FD94-919F-41C3-AF5D-0395BF0622DB}" srcOrd="4" destOrd="0" presId="urn:microsoft.com/office/officeart/2005/8/layout/process4"/>
+    <dgm:cxn modelId="{0F821AD3-41C6-4E07-A54B-52263937C635}" type="presParOf" srcId="{E0B9FD94-919F-41C3-AF5D-0395BF0622DB}" destId="{202A886C-974A-47EC-B474-29DFF38BC6C3}" srcOrd="0" destOrd="0" presId="urn:microsoft.com/office/officeart/2005/8/layout/process4"/>
+    <dgm:cxn modelId="{414F4B0C-8BA5-4158-A624-6F068F4D19A4}" type="presParOf" srcId="{E0B9FD94-919F-41C3-AF5D-0395BF0622DB}" destId="{64615004-EB80-47F0-B528-3DE8B993ED90}" srcOrd="1" destOrd="0" presId="urn:microsoft.com/office/officeart/2005/8/layout/process4"/>
+    <dgm:cxn modelId="{03DDD651-3D99-4E95-843C-6FCE075D4947}" type="presParOf" srcId="{E0B9FD94-919F-41C3-AF5D-0395BF0622DB}" destId="{98F16593-6E3B-40E3-BFF2-EAF17E5F0ADA}" srcOrd="2" destOrd="0" presId="urn:microsoft.com/office/officeart/2005/8/layout/process4"/>
+    <dgm:cxn modelId="{2C6DAEFD-DC93-46BF-A4FE-2213AF6F8A69}" type="presParOf" srcId="{98F16593-6E3B-40E3-BFF2-EAF17E5F0ADA}" destId="{4A13DAFA-62EE-4906-9D77-2A491470B4F7}" srcOrd="0" destOrd="0" presId="urn:microsoft.com/office/officeart/2005/8/layout/process4"/>
+  </dgm:cxnLst>
+  <dgm:bg/>
+  <dgm:whole/>
+  <dgm:extLst>
+    <a:ext uri="http://schemas.microsoft.com/office/drawing/2008/diagram">
+      <dsp:dataModelExt xmlns:dsp="http://schemas.microsoft.com/office/drawing/2008/diagram" relId="rId6" minVer="http://schemas.openxmlformats.org/drawingml/2006/diagram"/>
+    </a:ext>
+  </dgm:extLst>
+</dgm:dataModel>
+</file>
+
+<file path=ppt/diagrams/data2.xml><?xml version="1.0" encoding="utf-8"?>
 <dgm:dataModel xmlns:dgm="http://schemas.openxmlformats.org/drawingml/2006/diagram" xmlns:a="http://schemas.openxmlformats.org/drawingml/2006/main">
   <dgm:ptLst>
     <dgm:pt modelId="{1087B84F-C02F-4698-94D1-CE459D9E6948}" type="doc">
@@ -2405,7 +3893,7 @@
 </dgm:dataModel>
 </file>
 
-<file path=ppt/diagrams/data2.xml><?xml version="1.0" encoding="utf-8"?>
+<file path=ppt/diagrams/data3.xml><?xml version="1.0" encoding="utf-8"?>
 <dgm:dataModel xmlns:dgm="http://schemas.openxmlformats.org/drawingml/2006/diagram" xmlns:a="http://schemas.openxmlformats.org/drawingml/2006/main">
   <dgm:ptLst>
     <dgm:pt modelId="{1087B84F-C02F-4698-94D1-CE459D9E6948}" type="doc">
@@ -3050,6 +4538,938 @@
 </file>
 
 <file path=ppt/diagrams/drawing1.xml><?xml version="1.0" encoding="utf-8"?>
+<dsp:drawing xmlns:dgm="http://schemas.openxmlformats.org/drawingml/2006/diagram" xmlns:dsp="http://schemas.microsoft.com/office/drawing/2008/diagram" xmlns:a="http://schemas.openxmlformats.org/drawingml/2006/main">
+  <dsp:spTree>
+    <dsp:nvGrpSpPr>
+      <dsp:cNvPr id="0" name=""/>
+      <dsp:cNvGrpSpPr/>
+    </dsp:nvGrpSpPr>
+    <dsp:grpSpPr/>
+    <dsp:sp modelId="{7B5E8E08-5933-4496-9B92-5CC854BC1AF4}">
+      <dsp:nvSpPr>
+        <dsp:cNvPr id="0" name=""/>
+        <dsp:cNvSpPr/>
+      </dsp:nvSpPr>
+      <dsp:spPr>
+        <a:xfrm>
+          <a:off x="0" y="2881825"/>
+          <a:ext cx="4726133" cy="961101"/>
+        </a:xfrm>
+        <a:prstGeom prst="rect">
+          <a:avLst/>
+        </a:prstGeom>
+        <a:solidFill>
+          <a:schemeClr val="lt1">
+            <a:hueOff val="0"/>
+            <a:satOff val="0"/>
+            <a:lumOff val="0"/>
+            <a:alphaOff val="0"/>
+          </a:schemeClr>
+        </a:solidFill>
+        <a:ln w="12700" cap="flat" cmpd="sng" algn="ctr">
+          <a:solidFill>
+            <a:schemeClr val="dk1">
+              <a:shade val="80000"/>
+              <a:hueOff val="0"/>
+              <a:satOff val="0"/>
+              <a:lumOff val="0"/>
+              <a:alphaOff val="0"/>
+            </a:schemeClr>
+          </a:solidFill>
+          <a:prstDash val="solid"/>
+          <a:miter lim="800000"/>
+        </a:ln>
+        <a:effectLst/>
+      </dsp:spPr>
+      <dsp:style>
+        <a:lnRef idx="2">
+          <a:scrgbClr r="0" g="0" b="0"/>
+        </a:lnRef>
+        <a:fillRef idx="1">
+          <a:scrgbClr r="0" g="0" b="0"/>
+        </a:fillRef>
+        <a:effectRef idx="0">
+          <a:scrgbClr r="0" g="0" b="0"/>
+        </a:effectRef>
+        <a:fontRef idx="minor">
+          <a:schemeClr val="lt1"/>
+        </a:fontRef>
+      </dsp:style>
+      <dsp:txBody>
+        <a:bodyPr spcFirstLastPara="0" vert="horz" wrap="square" lIns="142240" tIns="142240" rIns="142240" bIns="142240" numCol="1" spcCol="1270" anchor="ctr" anchorCtr="0">
+          <a:noAutofit/>
+        </a:bodyPr>
+        <a:lstStyle/>
+        <a:p>
+          <a:pPr marL="0" lvl="0" indent="0" algn="ctr" defTabSz="889000">
+            <a:lnSpc>
+              <a:spcPct val="90000"/>
+            </a:lnSpc>
+            <a:spcBef>
+              <a:spcPct val="0"/>
+            </a:spcBef>
+            <a:spcAft>
+              <a:spcPct val="35000"/>
+            </a:spcAft>
+            <a:buNone/>
+          </a:pPr>
+          <a:r>
+            <a:rPr lang="en-US" sz="2000" kern="1200" dirty="0">
+              <a:latin typeface="Bahnschrift Condensed" panose="020B0502040204020203" pitchFamily="34" charset="0"/>
+            </a:rPr>
+            <a:t>Standardization and normalization of data</a:t>
+          </a:r>
+        </a:p>
+      </dsp:txBody>
+      <dsp:txXfrm>
+        <a:off x="0" y="2881825"/>
+        <a:ext cx="4726133" cy="518994"/>
+      </dsp:txXfrm>
+    </dsp:sp>
+    <dsp:sp modelId="{DC843301-E222-4FE4-8490-FFADD8DAB0AB}">
+      <dsp:nvSpPr>
+        <dsp:cNvPr id="0" name=""/>
+        <dsp:cNvSpPr/>
+      </dsp:nvSpPr>
+      <dsp:spPr>
+        <a:xfrm>
+          <a:off x="2307" y="3381598"/>
+          <a:ext cx="1573839" cy="442106"/>
+        </a:xfrm>
+        <a:prstGeom prst="rect">
+          <a:avLst/>
+        </a:prstGeom>
+        <a:solidFill>
+          <a:schemeClr val="lt1">
+            <a:alpha val="90000"/>
+            <a:tint val="40000"/>
+            <a:hueOff val="0"/>
+            <a:satOff val="0"/>
+            <a:lumOff val="0"/>
+            <a:alphaOff val="0"/>
+          </a:schemeClr>
+        </a:solidFill>
+        <a:ln w="12700" cap="flat" cmpd="sng" algn="ctr">
+          <a:solidFill>
+            <a:schemeClr val="dk1">
+              <a:alpha val="90000"/>
+              <a:hueOff val="0"/>
+              <a:satOff val="0"/>
+              <a:lumOff val="0"/>
+              <a:alphaOff val="0"/>
+            </a:schemeClr>
+          </a:solidFill>
+          <a:prstDash val="solid"/>
+          <a:miter lim="800000"/>
+        </a:ln>
+        <a:effectLst/>
+      </dsp:spPr>
+      <dsp:style>
+        <a:lnRef idx="2">
+          <a:scrgbClr r="0" g="0" b="0"/>
+        </a:lnRef>
+        <a:fillRef idx="1">
+          <a:scrgbClr r="0" g="0" b="0"/>
+        </a:fillRef>
+        <a:effectRef idx="0">
+          <a:scrgbClr r="0" g="0" b="0"/>
+        </a:effectRef>
+        <a:fontRef idx="minor"/>
+      </dsp:style>
+      <dsp:txBody>
+        <a:bodyPr spcFirstLastPara="0" vert="horz" wrap="square" lIns="99568" tIns="17780" rIns="99568" bIns="17780" numCol="1" spcCol="1270" anchor="ctr" anchorCtr="0">
+          <a:noAutofit/>
+        </a:bodyPr>
+        <a:lstStyle/>
+        <a:p>
+          <a:pPr marL="0" lvl="0" indent="0" algn="ctr" defTabSz="622300">
+            <a:lnSpc>
+              <a:spcPct val="90000"/>
+            </a:lnSpc>
+            <a:spcBef>
+              <a:spcPct val="0"/>
+            </a:spcBef>
+            <a:spcAft>
+              <a:spcPct val="35000"/>
+            </a:spcAft>
+            <a:buNone/>
+          </a:pPr>
+          <a:r>
+            <a:rPr lang="en-GB" sz="1400" kern="1200" dirty="0">
+              <a:latin typeface="Bahnschrift Condensed" panose="020B0502040204020203" pitchFamily="34" charset="0"/>
+            </a:rPr>
+            <a:t>Merge regions</a:t>
+          </a:r>
+          <a:endParaRPr lang="en-US" sz="1400" kern="1200" dirty="0">
+            <a:latin typeface="Bahnschrift Condensed" panose="020B0502040204020203" pitchFamily="34" charset="0"/>
+          </a:endParaRPr>
+        </a:p>
+      </dsp:txBody>
+      <dsp:txXfrm>
+        <a:off x="2307" y="3381598"/>
+        <a:ext cx="1573839" cy="442106"/>
+      </dsp:txXfrm>
+    </dsp:sp>
+    <dsp:sp modelId="{FF631791-490A-4E61-98E8-57571B0DA0B3}">
+      <dsp:nvSpPr>
+        <dsp:cNvPr id="0" name=""/>
+        <dsp:cNvSpPr/>
+      </dsp:nvSpPr>
+      <dsp:spPr>
+        <a:xfrm>
+          <a:off x="1576146" y="3381598"/>
+          <a:ext cx="1573839" cy="442106"/>
+        </a:xfrm>
+        <a:prstGeom prst="rect">
+          <a:avLst/>
+        </a:prstGeom>
+        <a:solidFill>
+          <a:schemeClr val="lt1">
+            <a:alpha val="90000"/>
+            <a:tint val="40000"/>
+            <a:hueOff val="0"/>
+            <a:satOff val="0"/>
+            <a:lumOff val="0"/>
+            <a:alphaOff val="0"/>
+          </a:schemeClr>
+        </a:solidFill>
+        <a:ln w="12700" cap="flat" cmpd="sng" algn="ctr">
+          <a:solidFill>
+            <a:schemeClr val="dk1">
+              <a:alpha val="90000"/>
+              <a:hueOff val="0"/>
+              <a:satOff val="0"/>
+              <a:lumOff val="0"/>
+              <a:alphaOff val="0"/>
+            </a:schemeClr>
+          </a:solidFill>
+          <a:prstDash val="solid"/>
+          <a:miter lim="800000"/>
+        </a:ln>
+        <a:effectLst/>
+      </dsp:spPr>
+      <dsp:style>
+        <a:lnRef idx="2">
+          <a:scrgbClr r="0" g="0" b="0"/>
+        </a:lnRef>
+        <a:fillRef idx="1">
+          <a:scrgbClr r="0" g="0" b="0"/>
+        </a:fillRef>
+        <a:effectRef idx="0">
+          <a:scrgbClr r="0" g="0" b="0"/>
+        </a:effectRef>
+        <a:fontRef idx="minor"/>
+      </dsp:style>
+      <dsp:txBody>
+        <a:bodyPr spcFirstLastPara="0" vert="horz" wrap="square" lIns="99568" tIns="17780" rIns="99568" bIns="17780" numCol="1" spcCol="1270" anchor="ctr" anchorCtr="0">
+          <a:noAutofit/>
+        </a:bodyPr>
+        <a:lstStyle/>
+        <a:p>
+          <a:pPr marL="0" lvl="0" indent="0" algn="ctr" defTabSz="622300">
+            <a:lnSpc>
+              <a:spcPct val="90000"/>
+            </a:lnSpc>
+            <a:spcBef>
+              <a:spcPct val="0"/>
+            </a:spcBef>
+            <a:spcAft>
+              <a:spcPct val="35000"/>
+            </a:spcAft>
+            <a:buNone/>
+          </a:pPr>
+          <a:r>
+            <a:rPr lang="en-US" sz="1400" kern="1200" dirty="0">
+              <a:latin typeface="Bahnschrift Condensed" panose="020B0502040204020203" pitchFamily="34" charset="0"/>
+            </a:rPr>
+            <a:t>Database homologation</a:t>
+          </a:r>
+        </a:p>
+      </dsp:txBody>
+      <dsp:txXfrm>
+        <a:off x="1576146" y="3381598"/>
+        <a:ext cx="1573839" cy="442106"/>
+      </dsp:txXfrm>
+    </dsp:sp>
+    <dsp:sp modelId="{10DC22EA-4342-419B-87C8-5AEC9FCA1FCD}">
+      <dsp:nvSpPr>
+        <dsp:cNvPr id="0" name=""/>
+        <dsp:cNvSpPr/>
+      </dsp:nvSpPr>
+      <dsp:spPr>
+        <a:xfrm>
+          <a:off x="3149986" y="3381598"/>
+          <a:ext cx="1573839" cy="442106"/>
+        </a:xfrm>
+        <a:prstGeom prst="rect">
+          <a:avLst/>
+        </a:prstGeom>
+        <a:solidFill>
+          <a:schemeClr val="lt1">
+            <a:alpha val="90000"/>
+            <a:tint val="40000"/>
+            <a:hueOff val="0"/>
+            <a:satOff val="0"/>
+            <a:lumOff val="0"/>
+            <a:alphaOff val="0"/>
+          </a:schemeClr>
+        </a:solidFill>
+        <a:ln w="12700" cap="flat" cmpd="sng" algn="ctr">
+          <a:solidFill>
+            <a:schemeClr val="dk1">
+              <a:alpha val="90000"/>
+              <a:hueOff val="0"/>
+              <a:satOff val="0"/>
+              <a:lumOff val="0"/>
+              <a:alphaOff val="0"/>
+            </a:schemeClr>
+          </a:solidFill>
+          <a:prstDash val="solid"/>
+          <a:miter lim="800000"/>
+        </a:ln>
+        <a:effectLst/>
+      </dsp:spPr>
+      <dsp:style>
+        <a:lnRef idx="2">
+          <a:scrgbClr r="0" g="0" b="0"/>
+        </a:lnRef>
+        <a:fillRef idx="1">
+          <a:scrgbClr r="0" g="0" b="0"/>
+        </a:fillRef>
+        <a:effectRef idx="0">
+          <a:scrgbClr r="0" g="0" b="0"/>
+        </a:effectRef>
+        <a:fontRef idx="minor"/>
+      </dsp:style>
+      <dsp:txBody>
+        <a:bodyPr spcFirstLastPara="0" vert="horz" wrap="square" lIns="99568" tIns="17780" rIns="99568" bIns="17780" numCol="1" spcCol="1270" anchor="ctr" anchorCtr="0">
+          <a:noAutofit/>
+        </a:bodyPr>
+        <a:lstStyle/>
+        <a:p>
+          <a:pPr marL="0" lvl="0" indent="0" algn="ctr" defTabSz="622300">
+            <a:lnSpc>
+              <a:spcPct val="90000"/>
+            </a:lnSpc>
+            <a:spcBef>
+              <a:spcPct val="0"/>
+            </a:spcBef>
+            <a:spcAft>
+              <a:spcPct val="35000"/>
+            </a:spcAft>
+            <a:buNone/>
+          </a:pPr>
+          <a:r>
+            <a:rPr lang="en-GB" sz="1400" kern="1200" dirty="0">
+              <a:latin typeface="Bahnschrift Condensed" panose="020B0502040204020203" pitchFamily="34" charset="0"/>
+            </a:rPr>
+            <a:t>Summary Statistics</a:t>
+          </a:r>
+          <a:endParaRPr lang="en-US" sz="1400" kern="1200" dirty="0">
+            <a:latin typeface="Bahnschrift Condensed" panose="020B0502040204020203" pitchFamily="34" charset="0"/>
+          </a:endParaRPr>
+        </a:p>
+      </dsp:txBody>
+      <dsp:txXfrm>
+        <a:off x="3149986" y="3381598"/>
+        <a:ext cx="1573839" cy="442106"/>
+      </dsp:txXfrm>
+    </dsp:sp>
+    <dsp:sp modelId="{ECCBCBC0-602C-4EEE-9038-EE1C5238DBB7}">
+      <dsp:nvSpPr>
+        <dsp:cNvPr id="0" name=""/>
+        <dsp:cNvSpPr/>
+      </dsp:nvSpPr>
+      <dsp:spPr>
+        <a:xfrm rot="10800000">
+          <a:off x="0" y="1418067"/>
+          <a:ext cx="4726133" cy="1478174"/>
+        </a:xfrm>
+        <a:prstGeom prst="upArrowCallout">
+          <a:avLst/>
+        </a:prstGeom>
+        <a:solidFill>
+          <a:schemeClr val="lt1">
+            <a:hueOff val="0"/>
+            <a:satOff val="0"/>
+            <a:lumOff val="0"/>
+            <a:alphaOff val="0"/>
+          </a:schemeClr>
+        </a:solidFill>
+        <a:ln w="12700" cap="flat" cmpd="sng" algn="ctr">
+          <a:solidFill>
+            <a:schemeClr val="dk1">
+              <a:shade val="80000"/>
+              <a:hueOff val="0"/>
+              <a:satOff val="0"/>
+              <a:lumOff val="0"/>
+              <a:alphaOff val="0"/>
+            </a:schemeClr>
+          </a:solidFill>
+          <a:prstDash val="solid"/>
+          <a:miter lim="800000"/>
+        </a:ln>
+        <a:effectLst/>
+      </dsp:spPr>
+      <dsp:style>
+        <a:lnRef idx="2">
+          <a:scrgbClr r="0" g="0" b="0"/>
+        </a:lnRef>
+        <a:fillRef idx="1">
+          <a:scrgbClr r="0" g="0" b="0"/>
+        </a:fillRef>
+        <a:effectRef idx="0">
+          <a:scrgbClr r="0" g="0" b="0"/>
+        </a:effectRef>
+        <a:fontRef idx="minor">
+          <a:schemeClr val="lt1"/>
+        </a:fontRef>
+      </dsp:style>
+      <dsp:txBody>
+        <a:bodyPr spcFirstLastPara="0" vert="horz" wrap="square" lIns="142240" tIns="142240" rIns="142240" bIns="142240" numCol="1" spcCol="1270" anchor="ctr" anchorCtr="0">
+          <a:noAutofit/>
+        </a:bodyPr>
+        <a:lstStyle/>
+        <a:p>
+          <a:pPr marL="0" lvl="0" indent="0" algn="ctr" defTabSz="889000">
+            <a:lnSpc>
+              <a:spcPct val="90000"/>
+            </a:lnSpc>
+            <a:spcBef>
+              <a:spcPct val="0"/>
+            </a:spcBef>
+            <a:spcAft>
+              <a:spcPct val="35000"/>
+            </a:spcAft>
+            <a:buNone/>
+          </a:pPr>
+          <a:r>
+            <a:rPr lang="en-US" sz="2000" kern="1200" dirty="0">
+              <a:latin typeface="Bahnschrift Condensed" panose="020B0502040204020203" pitchFamily="34" charset="0"/>
+            </a:rPr>
+            <a:t>Area filtering criteria</a:t>
+          </a:r>
+        </a:p>
+      </dsp:txBody>
+      <dsp:txXfrm rot="-10800000">
+        <a:off x="0" y="1418067"/>
+        <a:ext cx="4726133" cy="518839"/>
+      </dsp:txXfrm>
+    </dsp:sp>
+    <dsp:sp modelId="{96243511-25C5-4D01-99E3-DDB8DD1B6D7C}">
+      <dsp:nvSpPr>
+        <dsp:cNvPr id="0" name=""/>
+        <dsp:cNvSpPr/>
+      </dsp:nvSpPr>
+      <dsp:spPr>
+        <a:xfrm>
+          <a:off x="0" y="1936907"/>
+          <a:ext cx="1181533" cy="441974"/>
+        </a:xfrm>
+        <a:prstGeom prst="rect">
+          <a:avLst/>
+        </a:prstGeom>
+        <a:solidFill>
+          <a:schemeClr val="lt1">
+            <a:alpha val="90000"/>
+            <a:tint val="40000"/>
+            <a:hueOff val="0"/>
+            <a:satOff val="0"/>
+            <a:lumOff val="0"/>
+            <a:alphaOff val="0"/>
+          </a:schemeClr>
+        </a:solidFill>
+        <a:ln w="12700" cap="flat" cmpd="sng" algn="ctr">
+          <a:solidFill>
+            <a:schemeClr val="dk1">
+              <a:alpha val="90000"/>
+              <a:hueOff val="0"/>
+              <a:satOff val="0"/>
+              <a:lumOff val="0"/>
+              <a:alphaOff val="0"/>
+            </a:schemeClr>
+          </a:solidFill>
+          <a:prstDash val="solid"/>
+          <a:miter lim="800000"/>
+        </a:ln>
+        <a:effectLst/>
+      </dsp:spPr>
+      <dsp:style>
+        <a:lnRef idx="2">
+          <a:scrgbClr r="0" g="0" b="0"/>
+        </a:lnRef>
+        <a:fillRef idx="1">
+          <a:scrgbClr r="0" g="0" b="0"/>
+        </a:fillRef>
+        <a:effectRef idx="0">
+          <a:scrgbClr r="0" g="0" b="0"/>
+        </a:effectRef>
+        <a:fontRef idx="minor"/>
+      </dsp:style>
+      <dsp:txBody>
+        <a:bodyPr spcFirstLastPara="0" vert="horz" wrap="square" lIns="99568" tIns="17780" rIns="99568" bIns="17780" numCol="1" spcCol="1270" anchor="ctr" anchorCtr="0">
+          <a:noAutofit/>
+        </a:bodyPr>
+        <a:lstStyle/>
+        <a:p>
+          <a:pPr marL="0" lvl="0" indent="0" algn="ctr" defTabSz="622300">
+            <a:lnSpc>
+              <a:spcPct val="90000"/>
+            </a:lnSpc>
+            <a:spcBef>
+              <a:spcPct val="0"/>
+            </a:spcBef>
+            <a:spcAft>
+              <a:spcPct val="35000"/>
+            </a:spcAft>
+            <a:buNone/>
+          </a:pPr>
+          <a:r>
+            <a:rPr lang="en-US" sz="1400" kern="1200" dirty="0">
+              <a:latin typeface="Bahnschrift Condensed" panose="020B0502040204020203" pitchFamily="34" charset="0"/>
+            </a:rPr>
+            <a:t>Forest type</a:t>
+          </a:r>
+        </a:p>
+      </dsp:txBody>
+      <dsp:txXfrm>
+        <a:off x="0" y="1936907"/>
+        <a:ext cx="1181533" cy="441974"/>
+      </dsp:txXfrm>
+    </dsp:sp>
+    <dsp:sp modelId="{24DB7BC3-3B68-4596-88B8-5403081837AB}">
+      <dsp:nvSpPr>
+        <dsp:cNvPr id="0" name=""/>
+        <dsp:cNvSpPr/>
+      </dsp:nvSpPr>
+      <dsp:spPr>
+        <a:xfrm>
+          <a:off x="1181533" y="1936907"/>
+          <a:ext cx="1181533" cy="441974"/>
+        </a:xfrm>
+        <a:prstGeom prst="rect">
+          <a:avLst/>
+        </a:prstGeom>
+        <a:solidFill>
+          <a:schemeClr val="lt1">
+            <a:alpha val="90000"/>
+            <a:tint val="40000"/>
+            <a:hueOff val="0"/>
+            <a:satOff val="0"/>
+            <a:lumOff val="0"/>
+            <a:alphaOff val="0"/>
+          </a:schemeClr>
+        </a:solidFill>
+        <a:ln w="12700" cap="flat" cmpd="sng" algn="ctr">
+          <a:solidFill>
+            <a:schemeClr val="dk1">
+              <a:alpha val="90000"/>
+              <a:hueOff val="0"/>
+              <a:satOff val="0"/>
+              <a:lumOff val="0"/>
+              <a:alphaOff val="0"/>
+            </a:schemeClr>
+          </a:solidFill>
+          <a:prstDash val="solid"/>
+          <a:miter lim="800000"/>
+        </a:ln>
+        <a:effectLst/>
+      </dsp:spPr>
+      <dsp:style>
+        <a:lnRef idx="2">
+          <a:scrgbClr r="0" g="0" b="0"/>
+        </a:lnRef>
+        <a:fillRef idx="1">
+          <a:scrgbClr r="0" g="0" b="0"/>
+        </a:fillRef>
+        <a:effectRef idx="0">
+          <a:scrgbClr r="0" g="0" b="0"/>
+        </a:effectRef>
+        <a:fontRef idx="minor"/>
+      </dsp:style>
+      <dsp:txBody>
+        <a:bodyPr spcFirstLastPara="0" vert="horz" wrap="square" lIns="99568" tIns="17780" rIns="99568" bIns="17780" numCol="1" spcCol="1270" anchor="ctr" anchorCtr="0">
+          <a:noAutofit/>
+        </a:bodyPr>
+        <a:lstStyle/>
+        <a:p>
+          <a:pPr marL="0" lvl="0" indent="0" algn="ctr" defTabSz="622300">
+            <a:lnSpc>
+              <a:spcPct val="90000"/>
+            </a:lnSpc>
+            <a:spcBef>
+              <a:spcPct val="0"/>
+            </a:spcBef>
+            <a:spcAft>
+              <a:spcPct val="35000"/>
+            </a:spcAft>
+            <a:buNone/>
+          </a:pPr>
+          <a:r>
+            <a:rPr lang="en-US" sz="1400" kern="1200" dirty="0">
+              <a:latin typeface="Bahnschrift Condensed" panose="020B0502040204020203" pitchFamily="34" charset="0"/>
+            </a:rPr>
+            <a:t>Cover</a:t>
+          </a:r>
+        </a:p>
+      </dsp:txBody>
+      <dsp:txXfrm>
+        <a:off x="1181533" y="1936907"/>
+        <a:ext cx="1181533" cy="441974"/>
+      </dsp:txXfrm>
+    </dsp:sp>
+    <dsp:sp modelId="{BD4BAE9C-3DEB-43A3-8715-DBD35AA2C0F7}">
+      <dsp:nvSpPr>
+        <dsp:cNvPr id="0" name=""/>
+        <dsp:cNvSpPr/>
+      </dsp:nvSpPr>
+      <dsp:spPr>
+        <a:xfrm>
+          <a:off x="2373593" y="1936907"/>
+          <a:ext cx="1181533" cy="441974"/>
+        </a:xfrm>
+        <a:prstGeom prst="rect">
+          <a:avLst/>
+        </a:prstGeom>
+        <a:solidFill>
+          <a:schemeClr val="lt1">
+            <a:alpha val="90000"/>
+            <a:tint val="40000"/>
+            <a:hueOff val="0"/>
+            <a:satOff val="0"/>
+            <a:lumOff val="0"/>
+            <a:alphaOff val="0"/>
+          </a:schemeClr>
+        </a:solidFill>
+        <a:ln w="12700" cap="flat" cmpd="sng" algn="ctr">
+          <a:solidFill>
+            <a:schemeClr val="dk1">
+              <a:alpha val="90000"/>
+              <a:hueOff val="0"/>
+              <a:satOff val="0"/>
+              <a:lumOff val="0"/>
+              <a:alphaOff val="0"/>
+            </a:schemeClr>
+          </a:solidFill>
+          <a:prstDash val="solid"/>
+          <a:miter lim="800000"/>
+        </a:ln>
+        <a:effectLst/>
+      </dsp:spPr>
+      <dsp:style>
+        <a:lnRef idx="2">
+          <a:scrgbClr r="0" g="0" b="0"/>
+        </a:lnRef>
+        <a:fillRef idx="1">
+          <a:scrgbClr r="0" g="0" b="0"/>
+        </a:fillRef>
+        <a:effectRef idx="0">
+          <a:scrgbClr r="0" g="0" b="0"/>
+        </a:effectRef>
+        <a:fontRef idx="minor"/>
+      </dsp:style>
+      <dsp:txBody>
+        <a:bodyPr spcFirstLastPara="0" vert="horz" wrap="square" lIns="99568" tIns="17780" rIns="99568" bIns="17780" numCol="1" spcCol="1270" anchor="ctr" anchorCtr="0">
+          <a:noAutofit/>
+        </a:bodyPr>
+        <a:lstStyle/>
+        <a:p>
+          <a:pPr marL="0" lvl="0" indent="0" algn="ctr" defTabSz="622300">
+            <a:lnSpc>
+              <a:spcPct val="90000"/>
+            </a:lnSpc>
+            <a:spcBef>
+              <a:spcPct val="0"/>
+            </a:spcBef>
+            <a:spcAft>
+              <a:spcPct val="35000"/>
+            </a:spcAft>
+            <a:buNone/>
+          </a:pPr>
+          <a:r>
+            <a:rPr lang="en-US" sz="1400" kern="1200" dirty="0">
+              <a:latin typeface="Bahnschrift Condensed" panose="020B0502040204020203" pitchFamily="34" charset="0"/>
+            </a:rPr>
+            <a:t>Dominant species</a:t>
+          </a:r>
+        </a:p>
+      </dsp:txBody>
+      <dsp:txXfrm>
+        <a:off x="2373593" y="1936907"/>
+        <a:ext cx="1181533" cy="441974"/>
+      </dsp:txXfrm>
+    </dsp:sp>
+    <dsp:sp modelId="{B906CCC5-2E17-4E8C-AC19-8CD49713422F}">
+      <dsp:nvSpPr>
+        <dsp:cNvPr id="0" name=""/>
+        <dsp:cNvSpPr/>
+      </dsp:nvSpPr>
+      <dsp:spPr>
+        <a:xfrm>
+          <a:off x="3544599" y="1936907"/>
+          <a:ext cx="1181533" cy="441974"/>
+        </a:xfrm>
+        <a:prstGeom prst="rect">
+          <a:avLst/>
+        </a:prstGeom>
+        <a:solidFill>
+          <a:schemeClr val="lt1">
+            <a:alpha val="90000"/>
+            <a:tint val="40000"/>
+            <a:hueOff val="0"/>
+            <a:satOff val="0"/>
+            <a:lumOff val="0"/>
+            <a:alphaOff val="0"/>
+          </a:schemeClr>
+        </a:solidFill>
+        <a:ln w="12700" cap="flat" cmpd="sng" algn="ctr">
+          <a:solidFill>
+            <a:schemeClr val="dk1">
+              <a:alpha val="90000"/>
+              <a:hueOff val="0"/>
+              <a:satOff val="0"/>
+              <a:lumOff val="0"/>
+              <a:alphaOff val="0"/>
+            </a:schemeClr>
+          </a:solidFill>
+          <a:prstDash val="solid"/>
+          <a:miter lim="800000"/>
+        </a:ln>
+        <a:effectLst/>
+      </dsp:spPr>
+      <dsp:style>
+        <a:lnRef idx="2">
+          <a:scrgbClr r="0" g="0" b="0"/>
+        </a:lnRef>
+        <a:fillRef idx="1">
+          <a:scrgbClr r="0" g="0" b="0"/>
+        </a:fillRef>
+        <a:effectRef idx="0">
+          <a:scrgbClr r="0" g="0" b="0"/>
+        </a:effectRef>
+        <a:fontRef idx="minor"/>
+      </dsp:style>
+      <dsp:txBody>
+        <a:bodyPr spcFirstLastPara="0" vert="horz" wrap="square" lIns="99568" tIns="17780" rIns="99568" bIns="17780" numCol="1" spcCol="1270" anchor="ctr" anchorCtr="0">
+          <a:noAutofit/>
+        </a:bodyPr>
+        <a:lstStyle/>
+        <a:p>
+          <a:pPr marL="0" lvl="0" indent="0" algn="ctr" defTabSz="622300">
+            <a:lnSpc>
+              <a:spcPct val="90000"/>
+            </a:lnSpc>
+            <a:spcBef>
+              <a:spcPct val="0"/>
+            </a:spcBef>
+            <a:spcAft>
+              <a:spcPct val="35000"/>
+            </a:spcAft>
+            <a:buNone/>
+          </a:pPr>
+          <a:r>
+            <a:rPr lang="en-US" sz="1400" kern="1200" dirty="0">
+              <a:latin typeface="Bahnschrift Condensed" panose="020B0502040204020203" pitchFamily="34" charset="0"/>
+            </a:rPr>
+            <a:t>Minimum area</a:t>
+          </a:r>
+        </a:p>
+        <a:p>
+          <a:pPr marL="0" lvl="0" indent="0" algn="ctr" defTabSz="622300">
+            <a:lnSpc>
+              <a:spcPct val="90000"/>
+            </a:lnSpc>
+            <a:spcBef>
+              <a:spcPct val="0"/>
+            </a:spcBef>
+            <a:spcAft>
+              <a:spcPct val="35000"/>
+            </a:spcAft>
+            <a:buNone/>
+          </a:pPr>
+          <a:r>
+            <a:rPr lang="en-US" sz="1400" kern="1200">
+              <a:latin typeface="Bahnschrift Condensed" panose="020B0502040204020203" pitchFamily="34" charset="0"/>
+            </a:rPr>
+            <a:t>3px (900 m²)</a:t>
+          </a:r>
+          <a:endParaRPr lang="en-US" sz="1400" kern="1200" dirty="0">
+            <a:latin typeface="Bahnschrift Condensed" panose="020B0502040204020203" pitchFamily="34" charset="0"/>
+          </a:endParaRPr>
+        </a:p>
+      </dsp:txBody>
+      <dsp:txXfrm>
+        <a:off x="3544599" y="1936907"/>
+        <a:ext cx="1181533" cy="441974"/>
+      </dsp:txXfrm>
+    </dsp:sp>
+    <dsp:sp modelId="{64615004-EB80-47F0-B528-3DE8B993ED90}">
+      <dsp:nvSpPr>
+        <dsp:cNvPr id="0" name=""/>
+        <dsp:cNvSpPr/>
+      </dsp:nvSpPr>
+      <dsp:spPr>
+        <a:xfrm rot="10800000">
+          <a:off x="0" y="0"/>
+          <a:ext cx="4726133" cy="1431005"/>
+        </a:xfrm>
+        <a:prstGeom prst="upArrowCallout">
+          <a:avLst/>
+        </a:prstGeom>
+        <a:solidFill>
+          <a:schemeClr val="lt1">
+            <a:hueOff val="0"/>
+            <a:satOff val="0"/>
+            <a:lumOff val="0"/>
+            <a:alphaOff val="0"/>
+          </a:schemeClr>
+        </a:solidFill>
+        <a:ln w="12700" cap="flat" cmpd="sng" algn="ctr">
+          <a:solidFill>
+            <a:schemeClr val="dk1">
+              <a:shade val="80000"/>
+              <a:hueOff val="0"/>
+              <a:satOff val="0"/>
+              <a:lumOff val="0"/>
+              <a:alphaOff val="0"/>
+            </a:schemeClr>
+          </a:solidFill>
+          <a:prstDash val="solid"/>
+          <a:miter lim="800000"/>
+        </a:ln>
+        <a:effectLst/>
+      </dsp:spPr>
+      <dsp:style>
+        <a:lnRef idx="2">
+          <a:scrgbClr r="0" g="0" b="0"/>
+        </a:lnRef>
+        <a:fillRef idx="1">
+          <a:scrgbClr r="0" g="0" b="0"/>
+        </a:fillRef>
+        <a:effectRef idx="0">
+          <a:scrgbClr r="0" g="0" b="0"/>
+        </a:effectRef>
+        <a:fontRef idx="minor">
+          <a:schemeClr val="lt1"/>
+        </a:fontRef>
+      </dsp:style>
+      <dsp:txBody>
+        <a:bodyPr spcFirstLastPara="0" vert="horz" wrap="square" lIns="142240" tIns="142240" rIns="142240" bIns="142240" numCol="1" spcCol="1270" anchor="ctr" anchorCtr="0">
+          <a:noAutofit/>
+        </a:bodyPr>
+        <a:lstStyle/>
+        <a:p>
+          <a:pPr marL="0" lvl="0" indent="0" algn="ctr" defTabSz="889000">
+            <a:lnSpc>
+              <a:spcPct val="90000"/>
+            </a:lnSpc>
+            <a:spcBef>
+              <a:spcPct val="0"/>
+            </a:spcBef>
+            <a:spcAft>
+              <a:spcPct val="35000"/>
+            </a:spcAft>
+            <a:buNone/>
+          </a:pPr>
+          <a:r>
+            <a:rPr lang="en-US" sz="2000" kern="1200" dirty="0">
+              <a:latin typeface="Bahnschrift Condensed" panose="020B0502040204020203" pitchFamily="34" charset="0"/>
+            </a:rPr>
+            <a:t>Forest distribution identification</a:t>
+          </a:r>
+        </a:p>
+      </dsp:txBody>
+      <dsp:txXfrm rot="-10800000">
+        <a:off x="0" y="0"/>
+        <a:ext cx="4726133" cy="502282"/>
+      </dsp:txXfrm>
+    </dsp:sp>
+    <dsp:sp modelId="{4A13DAFA-62EE-4906-9D77-2A491470B4F7}">
+      <dsp:nvSpPr>
+        <dsp:cNvPr id="0" name=""/>
+        <dsp:cNvSpPr/>
+      </dsp:nvSpPr>
+      <dsp:spPr>
+        <a:xfrm>
+          <a:off x="0" y="496733"/>
+          <a:ext cx="4726133" cy="441974"/>
+        </a:xfrm>
+        <a:prstGeom prst="rect">
+          <a:avLst/>
+        </a:prstGeom>
+        <a:solidFill>
+          <a:schemeClr val="lt1">
+            <a:alpha val="90000"/>
+            <a:tint val="40000"/>
+            <a:hueOff val="0"/>
+            <a:satOff val="0"/>
+            <a:lumOff val="0"/>
+            <a:alphaOff val="0"/>
+          </a:schemeClr>
+        </a:solidFill>
+        <a:ln w="12700" cap="flat" cmpd="sng" algn="ctr">
+          <a:solidFill>
+            <a:schemeClr val="dk1">
+              <a:alpha val="90000"/>
+              <a:hueOff val="0"/>
+              <a:satOff val="0"/>
+              <a:lumOff val="0"/>
+              <a:alphaOff val="0"/>
+            </a:schemeClr>
+          </a:solidFill>
+          <a:prstDash val="solid"/>
+          <a:miter lim="800000"/>
+        </a:ln>
+        <a:effectLst/>
+      </dsp:spPr>
+      <dsp:style>
+        <a:lnRef idx="2">
+          <a:scrgbClr r="0" g="0" b="0"/>
+        </a:lnRef>
+        <a:fillRef idx="1">
+          <a:scrgbClr r="0" g="0" b="0"/>
+        </a:fillRef>
+        <a:effectRef idx="0">
+          <a:scrgbClr r="0" g="0" b="0"/>
+        </a:effectRef>
+        <a:fontRef idx="minor"/>
+      </dsp:style>
+      <dsp:txBody>
+        <a:bodyPr spcFirstLastPara="0" vert="horz" wrap="square" lIns="99568" tIns="17780" rIns="99568" bIns="17780" numCol="1" spcCol="1270" anchor="ctr" anchorCtr="0">
+          <a:noAutofit/>
+        </a:bodyPr>
+        <a:lstStyle/>
+        <a:p>
+          <a:pPr marL="0" lvl="0" indent="0" algn="ctr" defTabSz="622300">
+            <a:lnSpc>
+              <a:spcPct val="90000"/>
+            </a:lnSpc>
+            <a:spcBef>
+              <a:spcPct val="0"/>
+            </a:spcBef>
+            <a:spcAft>
+              <a:spcPct val="35000"/>
+            </a:spcAft>
+            <a:buNone/>
+          </a:pPr>
+          <a:r>
+            <a:rPr lang="en-US" sz="1400" kern="1200" dirty="0">
+              <a:latin typeface="Bahnschrift Condensed" panose="020B0502040204020203" pitchFamily="34" charset="0"/>
+            </a:rPr>
+            <a:t>Native vegetation resources cadaster (National Forestry Corporation, CONAF)</a:t>
+          </a:r>
+        </a:p>
+      </dsp:txBody>
+      <dsp:txXfrm>
+        <a:off x="0" y="496733"/>
+        <a:ext cx="4726133" cy="441974"/>
+      </dsp:txXfrm>
+    </dsp:sp>
+  </dsp:spTree>
+</dsp:drawing>
+</file>
+
+<file path=ppt/diagrams/drawing2.xml><?xml version="1.0" encoding="utf-8"?>
 <dsp:drawing xmlns:dgm="http://schemas.openxmlformats.org/drawingml/2006/diagram" xmlns:dsp="http://schemas.microsoft.com/office/drawing/2008/diagram" xmlns:a="http://schemas.openxmlformats.org/drawingml/2006/main">
   <dsp:spTree>
     <dsp:nvGrpSpPr>
@@ -3978,7 +6398,7 @@
 </dsp:drawing>
 </file>
 
-<file path=ppt/diagrams/drawing2.xml><?xml version="1.0" encoding="utf-8"?>
+<file path=ppt/diagrams/drawing3.xml><?xml version="1.0" encoding="utf-8"?>
 <dsp:drawing xmlns:dgm="http://schemas.openxmlformats.org/drawingml/2006/diagram" xmlns:dsp="http://schemas.microsoft.com/office/drawing/2008/diagram" xmlns:a="http://schemas.openxmlformats.org/drawingml/2006/main">
   <dsp:spTree>
     <dsp:nvGrpSpPr>
@@ -5536,6 +7956,359 @@
 </dgm:layoutDef>
 </file>
 
+<file path=ppt/diagrams/layout3.xml><?xml version="1.0" encoding="utf-8"?>
+<dgm:layoutDef xmlns:dgm="http://schemas.openxmlformats.org/drawingml/2006/diagram" xmlns:a="http://schemas.openxmlformats.org/drawingml/2006/main" uniqueId="urn:microsoft.com/office/officeart/2005/8/layout/process4">
+  <dgm:title val=""/>
+  <dgm:desc val=""/>
+  <dgm:catLst>
+    <dgm:cat type="process" pri="16000"/>
+    <dgm:cat type="list" pri="20000"/>
+  </dgm:catLst>
+  <dgm:sampData>
+    <dgm:dataModel>
+      <dgm:ptLst>
+        <dgm:pt modelId="0" type="doc"/>
+        <dgm:pt modelId="1">
+          <dgm:prSet phldr="1"/>
+        </dgm:pt>
+        <dgm:pt modelId="11">
+          <dgm:prSet phldr="1"/>
+        </dgm:pt>
+        <dgm:pt modelId="12">
+          <dgm:prSet phldr="1"/>
+        </dgm:pt>
+        <dgm:pt modelId="2">
+          <dgm:prSet phldr="1"/>
+        </dgm:pt>
+        <dgm:pt modelId="21">
+          <dgm:prSet phldr="1"/>
+        </dgm:pt>
+        <dgm:pt modelId="22">
+          <dgm:prSet phldr="1"/>
+        </dgm:pt>
+        <dgm:pt modelId="3">
+          <dgm:prSet phldr="1"/>
+        </dgm:pt>
+        <dgm:pt modelId="31">
+          <dgm:prSet phldr="1"/>
+        </dgm:pt>
+        <dgm:pt modelId="32">
+          <dgm:prSet phldr="1"/>
+        </dgm:pt>
+      </dgm:ptLst>
+      <dgm:cxnLst>
+        <dgm:cxn modelId="4" srcId="0" destId="1" srcOrd="0" destOrd="0"/>
+        <dgm:cxn modelId="5" srcId="0" destId="2" srcOrd="1" destOrd="0"/>
+        <dgm:cxn modelId="6" srcId="0" destId="3" srcOrd="2" destOrd="0"/>
+        <dgm:cxn modelId="13" srcId="1" destId="11" srcOrd="0" destOrd="0"/>
+        <dgm:cxn modelId="14" srcId="1" destId="12" srcOrd="1" destOrd="0"/>
+        <dgm:cxn modelId="23" srcId="2" destId="21" srcOrd="0" destOrd="0"/>
+        <dgm:cxn modelId="24" srcId="2" destId="22" srcOrd="1" destOrd="0"/>
+        <dgm:cxn modelId="33" srcId="3" destId="31" srcOrd="0" destOrd="0"/>
+        <dgm:cxn modelId="34" srcId="3" destId="32" srcOrd="1" destOrd="0"/>
+      </dgm:cxnLst>
+      <dgm:bg/>
+      <dgm:whole/>
+    </dgm:dataModel>
+  </dgm:sampData>
+  <dgm:styleData>
+    <dgm:dataModel>
+      <dgm:ptLst>
+        <dgm:pt modelId="0" type="doc"/>
+        <dgm:pt modelId="1"/>
+        <dgm:pt modelId="11"/>
+        <dgm:pt modelId="2"/>
+        <dgm:pt modelId="21"/>
+      </dgm:ptLst>
+      <dgm:cxnLst>
+        <dgm:cxn modelId="4" srcId="0" destId="1" srcOrd="0" destOrd="0"/>
+        <dgm:cxn modelId="5" srcId="0" destId="2" srcOrd="1" destOrd="0"/>
+        <dgm:cxn modelId="13" srcId="1" destId="11" srcOrd="0" destOrd="0"/>
+        <dgm:cxn modelId="23" srcId="2" destId="21" srcOrd="0" destOrd="0"/>
+      </dgm:cxnLst>
+      <dgm:bg/>
+      <dgm:whole/>
+    </dgm:dataModel>
+  </dgm:styleData>
+  <dgm:clrData>
+    <dgm:dataModel>
+      <dgm:ptLst>
+        <dgm:pt modelId="0" type="doc"/>
+        <dgm:pt modelId="1"/>
+        <dgm:pt modelId="11"/>
+        <dgm:pt modelId="2"/>
+        <dgm:pt modelId="21"/>
+        <dgm:pt modelId="3"/>
+        <dgm:pt modelId="31"/>
+        <dgm:pt modelId="4"/>
+        <dgm:pt modelId="41"/>
+      </dgm:ptLst>
+      <dgm:cxnLst>
+        <dgm:cxn modelId="5" srcId="0" destId="1" srcOrd="0" destOrd="0"/>
+        <dgm:cxn modelId="6" srcId="0" destId="2" srcOrd="1" destOrd="0"/>
+        <dgm:cxn modelId="7" srcId="0" destId="3" srcOrd="2" destOrd="0"/>
+        <dgm:cxn modelId="8" srcId="0" destId="4" srcOrd="3" destOrd="0"/>
+        <dgm:cxn modelId="13" srcId="1" destId="11" srcOrd="0" destOrd="0"/>
+        <dgm:cxn modelId="23" srcId="2" destId="21" srcOrd="0" destOrd="0"/>
+        <dgm:cxn modelId="33" srcId="3" destId="31" srcOrd="0" destOrd="0"/>
+        <dgm:cxn modelId="43" srcId="4" destId="41" srcOrd="0" destOrd="0"/>
+      </dgm:cxnLst>
+      <dgm:bg/>
+      <dgm:whole/>
+    </dgm:dataModel>
+  </dgm:clrData>
+  <dgm:layoutNode name="Name0">
+    <dgm:varLst>
+      <dgm:dir/>
+      <dgm:animLvl val="lvl"/>
+      <dgm:resizeHandles val="exact"/>
+    </dgm:varLst>
+    <dgm:alg type="lin">
+      <dgm:param type="linDir" val="fromB"/>
+    </dgm:alg>
+    <dgm:shape xmlns:r="http://schemas.openxmlformats.org/officeDocument/2006/relationships" r:blip="">
+      <dgm:adjLst/>
+    </dgm:shape>
+    <dgm:presOf/>
+    <dgm:constrLst>
+      <dgm:constr type="h" for="ch" forName="boxAndChildren" refType="h"/>
+      <dgm:constr type="h" for="ch" forName="arrowAndChildren" refType="h" refFor="ch" refForName="boxAndChildren" op="equ" fact="1.538"/>
+      <dgm:constr type="w" for="ch" forName="arrowAndChildren" refType="w"/>
+      <dgm:constr type="w" for="ch" forName="boxAndChildren" refType="w"/>
+      <dgm:constr type="h" for="ch" forName="sp" refType="h" fact="-0.015"/>
+      <dgm:constr type="primFontSz" for="des" forName="parentTextBox" val="65"/>
+      <dgm:constr type="primFontSz" for="des" forName="parentTextArrow" refType="primFontSz" refFor="des" refForName="parentTextBox" op="equ"/>
+      <dgm:constr type="primFontSz" for="des" forName="childTextArrow" val="65"/>
+      <dgm:constr type="primFontSz" for="des" forName="childTextBox" refType="primFontSz" refFor="des" refForName="childTextArrow" op="equ"/>
+    </dgm:constrLst>
+    <dgm:ruleLst/>
+    <dgm:forEach name="Name1" axis="ch" ptType="node" st="-1" step="-1">
+      <dgm:choose name="Name2">
+        <dgm:if name="Name3" axis="self" ptType="node" func="revPos" op="equ" val="1">
+          <dgm:layoutNode name="boxAndChildren">
+            <dgm:alg type="composite"/>
+            <dgm:shape xmlns:r="http://schemas.openxmlformats.org/officeDocument/2006/relationships" r:blip="">
+              <dgm:adjLst/>
+            </dgm:shape>
+            <dgm:presOf/>
+            <dgm:choose name="Name4">
+              <dgm:if name="Name5" axis="ch" ptType="node" func="cnt" op="gte" val="1">
+                <dgm:constrLst>
+                  <dgm:constr type="w" for="ch" forName="parentTextBox" refType="w"/>
+                  <dgm:constr type="h" for="ch" forName="parentTextBox" refType="h" fact="0.54"/>
+                  <dgm:constr type="t" for="ch" forName="parentTextBox"/>
+                  <dgm:constr type="w" for="ch" forName="entireBox" refType="w"/>
+                  <dgm:constr type="h" for="ch" forName="entireBox" refType="h"/>
+                  <dgm:constr type="w" for="ch" forName="descendantBox" refType="w"/>
+                  <dgm:constr type="b" for="ch" forName="descendantBox" refType="h" fact="0.98"/>
+                  <dgm:constr type="h" for="ch" forName="descendantBox" refType="h" fact="0.46"/>
+                </dgm:constrLst>
+              </dgm:if>
+              <dgm:else name="Name6">
+                <dgm:constrLst>
+                  <dgm:constr type="w" for="ch" forName="parentTextBox" refType="w"/>
+                  <dgm:constr type="h" for="ch" forName="parentTextBox" refType="h"/>
+                </dgm:constrLst>
+              </dgm:else>
+            </dgm:choose>
+            <dgm:ruleLst/>
+            <dgm:layoutNode name="parentTextBox">
+              <dgm:alg type="tx"/>
+              <dgm:choose name="Name7">
+                <dgm:if name="Name8" axis="ch" ptType="node" func="cnt" op="gte" val="1">
+                  <dgm:shape xmlns:r="http://schemas.openxmlformats.org/officeDocument/2006/relationships" type="rect" r:blip="" zOrderOff="1" hideGeom="1">
+                    <dgm:adjLst/>
+                  </dgm:shape>
+                </dgm:if>
+                <dgm:else name="Name9">
+                  <dgm:shape xmlns:r="http://schemas.openxmlformats.org/officeDocument/2006/relationships" type="rect" r:blip="">
+                    <dgm:adjLst/>
+                  </dgm:shape>
+                </dgm:else>
+              </dgm:choose>
+              <dgm:presOf axis="self"/>
+              <dgm:constrLst/>
+              <dgm:ruleLst>
+                <dgm:rule type="primFontSz" val="5" fact="NaN" max="NaN"/>
+              </dgm:ruleLst>
+            </dgm:layoutNode>
+            <dgm:choose name="Name10">
+              <dgm:if name="Name11" axis="ch" ptType="node" func="cnt" op="gte" val="1">
+                <dgm:layoutNode name="entireBox">
+                  <dgm:alg type="sp"/>
+                  <dgm:shape xmlns:r="http://schemas.openxmlformats.org/officeDocument/2006/relationships" type="rect" r:blip="">
+                    <dgm:adjLst/>
+                  </dgm:shape>
+                  <dgm:presOf axis="self"/>
+                  <dgm:constrLst/>
+                  <dgm:ruleLst/>
+                </dgm:layoutNode>
+                <dgm:layoutNode name="descendantBox" styleLbl="fgAccFollowNode1">
+                  <dgm:choose name="Name12">
+                    <dgm:if name="Name13" func="var" arg="dir" op="equ" val="norm">
+                      <dgm:alg type="lin"/>
+                    </dgm:if>
+                    <dgm:else name="Name14">
+                      <dgm:alg type="lin">
+                        <dgm:param type="linDir" val="fromR"/>
+                      </dgm:alg>
+                    </dgm:else>
+                  </dgm:choose>
+                  <dgm:shape xmlns:r="http://schemas.openxmlformats.org/officeDocument/2006/relationships" r:blip="">
+                    <dgm:adjLst/>
+                  </dgm:shape>
+                  <dgm:presOf/>
+                  <dgm:constrLst>
+                    <dgm:constr type="w" for="ch" forName="childTextBox" refType="w"/>
+                    <dgm:constr type="h" for="ch" forName="childTextBox" refType="h"/>
+                  </dgm:constrLst>
+                  <dgm:ruleLst/>
+                  <dgm:forEach name="Name15" axis="ch" ptType="node">
+                    <dgm:layoutNode name="childTextBox" styleLbl="fgAccFollowNode1">
+                      <dgm:varLst>
+                        <dgm:bulletEnabled val="1"/>
+                      </dgm:varLst>
+                      <dgm:alg type="tx"/>
+                      <dgm:shape xmlns:r="http://schemas.openxmlformats.org/officeDocument/2006/relationships" type="rect" r:blip="">
+                        <dgm:adjLst/>
+                      </dgm:shape>
+                      <dgm:presOf axis="desOrSelf" ptType="node"/>
+                      <dgm:constrLst>
+                        <dgm:constr type="tMarg" refType="primFontSz" fact="0.1"/>
+                        <dgm:constr type="bMarg" refType="primFontSz" fact="0.1"/>
+                      </dgm:constrLst>
+                      <dgm:ruleLst>
+                        <dgm:rule type="primFontSz" val="5" fact="NaN" max="NaN"/>
+                      </dgm:ruleLst>
+                    </dgm:layoutNode>
+                  </dgm:forEach>
+                </dgm:layoutNode>
+              </dgm:if>
+              <dgm:else name="Name16"/>
+            </dgm:choose>
+          </dgm:layoutNode>
+        </dgm:if>
+        <dgm:else name="Name17">
+          <dgm:layoutNode name="arrowAndChildren">
+            <dgm:alg type="composite"/>
+            <dgm:shape xmlns:r="http://schemas.openxmlformats.org/officeDocument/2006/relationships" r:blip="">
+              <dgm:adjLst/>
+            </dgm:shape>
+            <dgm:presOf/>
+            <dgm:choose name="Name18">
+              <dgm:if name="Name19" axis="ch" ptType="node" func="cnt" op="gte" val="1">
+                <dgm:constrLst>
+                  <dgm:constr type="w" for="ch" forName="parentTextArrow" refType="w"/>
+                  <dgm:constr type="t" for="ch" forName="parentTextArrow"/>
+                  <dgm:constr type="h" for="ch" forName="parentTextArrow" refType="h" fact="0.351"/>
+                  <dgm:constr type="w" for="ch" forName="arrow" refType="w"/>
+                  <dgm:constr type="h" for="ch" forName="arrow" refType="h"/>
+                  <dgm:constr type="w" for="ch" forName="descendantArrow" refType="w"/>
+                  <dgm:constr type="b" for="ch" forName="descendantArrow" refType="h" fact="0.65"/>
+                  <dgm:constr type="h" for="ch" forName="descendantArrow" refType="h" fact="0.299"/>
+                </dgm:constrLst>
+              </dgm:if>
+              <dgm:else name="Name20">
+                <dgm:constrLst>
+                  <dgm:constr type="w" for="ch" forName="parentTextArrow" refType="w"/>
+                  <dgm:constr type="h" for="ch" forName="parentTextArrow" refType="h"/>
+                </dgm:constrLst>
+              </dgm:else>
+            </dgm:choose>
+            <dgm:ruleLst/>
+            <dgm:layoutNode name="parentTextArrow">
+              <dgm:alg type="tx"/>
+              <dgm:choose name="Name21">
+                <dgm:if name="Name22" axis="ch" ptType="node" func="cnt" op="gte" val="1">
+                  <dgm:shape xmlns:r="http://schemas.openxmlformats.org/officeDocument/2006/relationships" type="rect" r:blip="" zOrderOff="1" hideGeom="1">
+                    <dgm:adjLst/>
+                  </dgm:shape>
+                </dgm:if>
+                <dgm:else name="Name23">
+                  <dgm:shape xmlns:r="http://schemas.openxmlformats.org/officeDocument/2006/relationships" rot="180" type="upArrowCallout" r:blip="">
+                    <dgm:adjLst/>
+                  </dgm:shape>
+                </dgm:else>
+              </dgm:choose>
+              <dgm:presOf axis="self"/>
+              <dgm:constrLst/>
+              <dgm:ruleLst>
+                <dgm:rule type="primFontSz" val="5" fact="NaN" max="NaN"/>
+              </dgm:ruleLst>
+            </dgm:layoutNode>
+            <dgm:choose name="Name24">
+              <dgm:if name="Name25" axis="ch" ptType="node" func="cnt" op="gte" val="1">
+                <dgm:layoutNode name="arrow">
+                  <dgm:alg type="sp"/>
+                  <dgm:shape xmlns:r="http://schemas.openxmlformats.org/officeDocument/2006/relationships" rot="180" type="upArrowCallout" r:blip="">
+                    <dgm:adjLst/>
+                  </dgm:shape>
+                  <dgm:presOf axis="self"/>
+                  <dgm:constrLst/>
+                  <dgm:ruleLst/>
+                </dgm:layoutNode>
+                <dgm:layoutNode name="descendantArrow">
+                  <dgm:choose name="Name26">
+                    <dgm:if name="Name27" func="var" arg="dir" op="equ" val="norm">
+                      <dgm:alg type="lin"/>
+                    </dgm:if>
+                    <dgm:else name="Name28">
+                      <dgm:alg type="lin">
+                        <dgm:param type="linDir" val="fromR"/>
+                      </dgm:alg>
+                    </dgm:else>
+                  </dgm:choose>
+                  <dgm:shape xmlns:r="http://schemas.openxmlformats.org/officeDocument/2006/relationships" r:blip="">
+                    <dgm:adjLst/>
+                  </dgm:shape>
+                  <dgm:presOf/>
+                  <dgm:constrLst>
+                    <dgm:constr type="w" for="ch" forName="childTextArrow" refType="w"/>
+                    <dgm:constr type="h" for="ch" forName="childTextArrow" refType="h"/>
+                  </dgm:constrLst>
+                  <dgm:ruleLst/>
+                  <dgm:forEach name="Name29" axis="ch" ptType="node">
+                    <dgm:layoutNode name="childTextArrow" styleLbl="fgAccFollowNode1">
+                      <dgm:varLst>
+                        <dgm:bulletEnabled val="1"/>
+                      </dgm:varLst>
+                      <dgm:alg type="tx"/>
+                      <dgm:shape xmlns:r="http://schemas.openxmlformats.org/officeDocument/2006/relationships" type="rect" r:blip="">
+                        <dgm:adjLst/>
+                      </dgm:shape>
+                      <dgm:presOf axis="desOrSelf" ptType="node"/>
+                      <dgm:constrLst>
+                        <dgm:constr type="tMarg" refType="primFontSz" fact="0.1"/>
+                        <dgm:constr type="bMarg" refType="primFontSz" fact="0.1"/>
+                      </dgm:constrLst>
+                      <dgm:ruleLst>
+                        <dgm:rule type="primFontSz" val="5" fact="NaN" max="NaN"/>
+                      </dgm:ruleLst>
+                    </dgm:layoutNode>
+                  </dgm:forEach>
+                </dgm:layoutNode>
+              </dgm:if>
+              <dgm:else name="Name30"/>
+            </dgm:choose>
+          </dgm:layoutNode>
+        </dgm:else>
+      </dgm:choose>
+      <dgm:forEach name="Name31" axis="precedSib" ptType="sibTrans" st="-1" cnt="1">
+        <dgm:layoutNode name="sp">
+          <dgm:alg type="sp"/>
+          <dgm:shape xmlns:r="http://schemas.openxmlformats.org/officeDocument/2006/relationships" r:blip="">
+            <dgm:adjLst/>
+          </dgm:shape>
+          <dgm:presOf axis="self"/>
+          <dgm:constrLst/>
+          <dgm:ruleLst/>
+        </dgm:layoutNode>
+      </dgm:forEach>
+    </dgm:forEach>
+  </dgm:layoutNode>
+</dgm:layoutDef>
+</file>
+
 <file path=ppt/diagrams/quickStyle1.xml><?xml version="1.0" encoding="utf-8"?>
 <dgm:styleDef xmlns:dgm="http://schemas.openxmlformats.org/drawingml/2006/diagram" xmlns:a="http://schemas.openxmlformats.org/drawingml/2006/main" uniqueId="urn:microsoft.com/office/officeart/2005/8/quickstyle/simple1">
   <dgm:title val=""/>
@@ -6571,6 +9344,1040 @@
 </file>
 
 <file path=ppt/diagrams/quickStyle2.xml><?xml version="1.0" encoding="utf-8"?>
+<dgm:styleDef xmlns:dgm="http://schemas.openxmlformats.org/drawingml/2006/diagram" xmlns:a="http://schemas.openxmlformats.org/drawingml/2006/main" uniqueId="urn:microsoft.com/office/officeart/2005/8/quickstyle/simple1">
+  <dgm:title val=""/>
+  <dgm:desc val=""/>
+  <dgm:catLst>
+    <dgm:cat type="simple" pri="10100"/>
+  </dgm:catLst>
+  <dgm:scene3d>
+    <a:camera prst="orthographicFront"/>
+    <a:lightRig rig="threePt" dir="t"/>
+  </dgm:scene3d>
+  <dgm:styleLbl name="node0">
+    <dgm:scene3d>
+      <a:camera prst="orthographicFront"/>
+      <a:lightRig rig="threePt" dir="t"/>
+    </dgm:scene3d>
+    <dgm:sp3d/>
+    <dgm:txPr/>
+    <dgm:style>
+      <a:lnRef idx="2">
+        <a:scrgbClr r="0" g="0" b="0"/>
+      </a:lnRef>
+      <a:fillRef idx="1">
+        <a:scrgbClr r="0" g="0" b="0"/>
+      </a:fillRef>
+      <a:effectRef idx="0">
+        <a:scrgbClr r="0" g="0" b="0"/>
+      </a:effectRef>
+      <a:fontRef idx="minor">
+        <a:schemeClr val="lt1"/>
+      </a:fontRef>
+    </dgm:style>
+  </dgm:styleLbl>
+  <dgm:styleLbl name="lnNode1">
+    <dgm:scene3d>
+      <a:camera prst="orthographicFront"/>
+      <a:lightRig rig="threePt" dir="t"/>
+    </dgm:scene3d>
+    <dgm:sp3d/>
+    <dgm:txPr/>
+    <dgm:style>
+      <a:lnRef idx="2">
+        <a:scrgbClr r="0" g="0" b="0"/>
+      </a:lnRef>
+      <a:fillRef idx="1">
+        <a:scrgbClr r="0" g="0" b="0"/>
+      </a:fillRef>
+      <a:effectRef idx="0">
+        <a:scrgbClr r="0" g="0" b="0"/>
+      </a:effectRef>
+      <a:fontRef idx="minor">
+        <a:schemeClr val="lt1"/>
+      </a:fontRef>
+    </dgm:style>
+  </dgm:styleLbl>
+  <dgm:styleLbl name="vennNode1">
+    <dgm:scene3d>
+      <a:camera prst="orthographicFront"/>
+      <a:lightRig rig="threePt" dir="t"/>
+    </dgm:scene3d>
+    <dgm:sp3d/>
+    <dgm:txPr/>
+    <dgm:style>
+      <a:lnRef idx="2">
+        <a:scrgbClr r="0" g="0" b="0"/>
+      </a:lnRef>
+      <a:fillRef idx="1">
+        <a:scrgbClr r="0" g="0" b="0"/>
+      </a:fillRef>
+      <a:effectRef idx="0">
+        <a:scrgbClr r="0" g="0" b="0"/>
+      </a:effectRef>
+      <a:fontRef idx="minor">
+        <a:schemeClr val="tx1"/>
+      </a:fontRef>
+    </dgm:style>
+  </dgm:styleLbl>
+  <dgm:styleLbl name="alignNode1">
+    <dgm:scene3d>
+      <a:camera prst="orthographicFront"/>
+      <a:lightRig rig="threePt" dir="t"/>
+    </dgm:scene3d>
+    <dgm:sp3d/>
+    <dgm:txPr/>
+    <dgm:style>
+      <a:lnRef idx="2">
+        <a:scrgbClr r="0" g="0" b="0"/>
+      </a:lnRef>
+      <a:fillRef idx="1">
+        <a:scrgbClr r="0" g="0" b="0"/>
+      </a:fillRef>
+      <a:effectRef idx="0">
+        <a:scrgbClr r="0" g="0" b="0"/>
+      </a:effectRef>
+      <a:fontRef idx="minor">
+        <a:schemeClr val="lt1"/>
+      </a:fontRef>
+    </dgm:style>
+  </dgm:styleLbl>
+  <dgm:styleLbl name="node1">
+    <dgm:scene3d>
+      <a:camera prst="orthographicFront"/>
+      <a:lightRig rig="threePt" dir="t"/>
+    </dgm:scene3d>
+    <dgm:sp3d/>
+    <dgm:txPr/>
+    <dgm:style>
+      <a:lnRef idx="2">
+        <a:scrgbClr r="0" g="0" b="0"/>
+      </a:lnRef>
+      <a:fillRef idx="1">
+        <a:scrgbClr r="0" g="0" b="0"/>
+      </a:fillRef>
+      <a:effectRef idx="0">
+        <a:scrgbClr r="0" g="0" b="0"/>
+      </a:effectRef>
+      <a:fontRef idx="minor">
+        <a:schemeClr val="lt1"/>
+      </a:fontRef>
+    </dgm:style>
+  </dgm:styleLbl>
+  <dgm:styleLbl name="node2">
+    <dgm:scene3d>
+      <a:camera prst="orthographicFront"/>
+      <a:lightRig rig="threePt" dir="t"/>
+    </dgm:scene3d>
+    <dgm:sp3d/>
+    <dgm:txPr/>
+    <dgm:style>
+      <a:lnRef idx="2">
+        <a:scrgbClr r="0" g="0" b="0"/>
+      </a:lnRef>
+      <a:fillRef idx="1">
+        <a:scrgbClr r="0" g="0" b="0"/>
+      </a:fillRef>
+      <a:effectRef idx="0">
+        <a:scrgbClr r="0" g="0" b="0"/>
+      </a:effectRef>
+      <a:fontRef idx="minor">
+        <a:schemeClr val="lt1"/>
+      </a:fontRef>
+    </dgm:style>
+  </dgm:styleLbl>
+  <dgm:styleLbl name="node3">
+    <dgm:scene3d>
+      <a:camera prst="orthographicFront"/>
+      <a:lightRig rig="threePt" dir="t"/>
+    </dgm:scene3d>
+    <dgm:sp3d/>
+    <dgm:txPr/>
+    <dgm:style>
+      <a:lnRef idx="2">
+        <a:scrgbClr r="0" g="0" b="0"/>
+      </a:lnRef>
+      <a:fillRef idx="1">
+        <a:scrgbClr r="0" g="0" b="0"/>
+      </a:fillRef>
+      <a:effectRef idx="0">
+        <a:scrgbClr r="0" g="0" b="0"/>
+      </a:effectRef>
+      <a:fontRef idx="minor">
+        <a:schemeClr val="lt1"/>
+      </a:fontRef>
+    </dgm:style>
+  </dgm:styleLbl>
+  <dgm:styleLbl name="node4">
+    <dgm:scene3d>
+      <a:camera prst="orthographicFront"/>
+      <a:lightRig rig="threePt" dir="t"/>
+    </dgm:scene3d>
+    <dgm:sp3d/>
+    <dgm:txPr/>
+    <dgm:style>
+      <a:lnRef idx="2">
+        <a:scrgbClr r="0" g="0" b="0"/>
+      </a:lnRef>
+      <a:fillRef idx="1">
+        <a:scrgbClr r="0" g="0" b="0"/>
+      </a:fillRef>
+      <a:effectRef idx="0">
+        <a:scrgbClr r="0" g="0" b="0"/>
+      </a:effectRef>
+      <a:fontRef idx="minor">
+        <a:schemeClr val="lt1"/>
+      </a:fontRef>
+    </dgm:style>
+  </dgm:styleLbl>
+  <dgm:styleLbl name="fgImgPlace1">
+    <dgm:scene3d>
+      <a:camera prst="orthographicFront"/>
+      <a:lightRig rig="threePt" dir="t"/>
+    </dgm:scene3d>
+    <dgm:sp3d/>
+    <dgm:txPr/>
+    <dgm:style>
+      <a:lnRef idx="2">
+        <a:scrgbClr r="0" g="0" b="0"/>
+      </a:lnRef>
+      <a:fillRef idx="1">
+        <a:scrgbClr r="0" g="0" b="0"/>
+      </a:fillRef>
+      <a:effectRef idx="0">
+        <a:scrgbClr r="0" g="0" b="0"/>
+      </a:effectRef>
+      <a:fontRef idx="minor"/>
+    </dgm:style>
+  </dgm:styleLbl>
+  <dgm:styleLbl name="alignImgPlace1">
+    <dgm:scene3d>
+      <a:camera prst="orthographicFront"/>
+      <a:lightRig rig="threePt" dir="t"/>
+    </dgm:scene3d>
+    <dgm:sp3d/>
+    <dgm:txPr/>
+    <dgm:style>
+      <a:lnRef idx="2">
+        <a:scrgbClr r="0" g="0" b="0"/>
+      </a:lnRef>
+      <a:fillRef idx="1">
+        <a:scrgbClr r="0" g="0" b="0"/>
+      </a:fillRef>
+      <a:effectRef idx="0">
+        <a:scrgbClr r="0" g="0" b="0"/>
+      </a:effectRef>
+      <a:fontRef idx="minor"/>
+    </dgm:style>
+  </dgm:styleLbl>
+  <dgm:styleLbl name="bgImgPlace1">
+    <dgm:scene3d>
+      <a:camera prst="orthographicFront"/>
+      <a:lightRig rig="threePt" dir="t"/>
+    </dgm:scene3d>
+    <dgm:sp3d/>
+    <dgm:txPr/>
+    <dgm:style>
+      <a:lnRef idx="2">
+        <a:scrgbClr r="0" g="0" b="0"/>
+      </a:lnRef>
+      <a:fillRef idx="1">
+        <a:scrgbClr r="0" g="0" b="0"/>
+      </a:fillRef>
+      <a:effectRef idx="0">
+        <a:scrgbClr r="0" g="0" b="0"/>
+      </a:effectRef>
+      <a:fontRef idx="minor"/>
+    </dgm:style>
+  </dgm:styleLbl>
+  <dgm:styleLbl name="sibTrans2D1">
+    <dgm:scene3d>
+      <a:camera prst="orthographicFront"/>
+      <a:lightRig rig="threePt" dir="t"/>
+    </dgm:scene3d>
+    <dgm:sp3d/>
+    <dgm:txPr/>
+    <dgm:style>
+      <a:lnRef idx="0">
+        <a:scrgbClr r="0" g="0" b="0"/>
+      </a:lnRef>
+      <a:fillRef idx="1">
+        <a:scrgbClr r="0" g="0" b="0"/>
+      </a:fillRef>
+      <a:effectRef idx="0">
+        <a:scrgbClr r="0" g="0" b="0"/>
+      </a:effectRef>
+      <a:fontRef idx="minor">
+        <a:schemeClr val="lt1"/>
+      </a:fontRef>
+    </dgm:style>
+  </dgm:styleLbl>
+  <dgm:styleLbl name="fgSibTrans2D1">
+    <dgm:scene3d>
+      <a:camera prst="orthographicFront"/>
+      <a:lightRig rig="threePt" dir="t"/>
+    </dgm:scene3d>
+    <dgm:sp3d/>
+    <dgm:txPr/>
+    <dgm:style>
+      <a:lnRef idx="0">
+        <a:scrgbClr r="0" g="0" b="0"/>
+      </a:lnRef>
+      <a:fillRef idx="1">
+        <a:scrgbClr r="0" g="0" b="0"/>
+      </a:fillRef>
+      <a:effectRef idx="0">
+        <a:scrgbClr r="0" g="0" b="0"/>
+      </a:effectRef>
+      <a:fontRef idx="minor">
+        <a:schemeClr val="lt1"/>
+      </a:fontRef>
+    </dgm:style>
+  </dgm:styleLbl>
+  <dgm:styleLbl name="bgSibTrans2D1">
+    <dgm:scene3d>
+      <a:camera prst="orthographicFront"/>
+      <a:lightRig rig="threePt" dir="t"/>
+    </dgm:scene3d>
+    <dgm:sp3d/>
+    <dgm:txPr/>
+    <dgm:style>
+      <a:lnRef idx="0">
+        <a:scrgbClr r="0" g="0" b="0"/>
+      </a:lnRef>
+      <a:fillRef idx="1">
+        <a:scrgbClr r="0" g="0" b="0"/>
+      </a:fillRef>
+      <a:effectRef idx="0">
+        <a:scrgbClr r="0" g="0" b="0"/>
+      </a:effectRef>
+      <a:fontRef idx="minor">
+        <a:schemeClr val="lt1"/>
+      </a:fontRef>
+    </dgm:style>
+  </dgm:styleLbl>
+  <dgm:styleLbl name="sibTrans1D1">
+    <dgm:scene3d>
+      <a:camera prst="orthographicFront"/>
+      <a:lightRig rig="threePt" dir="t"/>
+    </dgm:scene3d>
+    <dgm:sp3d/>
+    <dgm:txPr/>
+    <dgm:style>
+      <a:lnRef idx="1">
+        <a:scrgbClr r="0" g="0" b="0"/>
+      </a:lnRef>
+      <a:fillRef idx="0">
+        <a:scrgbClr r="0" g="0" b="0"/>
+      </a:fillRef>
+      <a:effectRef idx="0">
+        <a:scrgbClr r="0" g="0" b="0"/>
+      </a:effectRef>
+      <a:fontRef idx="minor"/>
+    </dgm:style>
+  </dgm:styleLbl>
+  <dgm:styleLbl name="callout">
+    <dgm:scene3d>
+      <a:camera prst="orthographicFront"/>
+      <a:lightRig rig="threePt" dir="t"/>
+    </dgm:scene3d>
+    <dgm:sp3d/>
+    <dgm:txPr/>
+    <dgm:style>
+      <a:lnRef idx="2">
+        <a:scrgbClr r="0" g="0" b="0"/>
+      </a:lnRef>
+      <a:fillRef idx="1">
+        <a:scrgbClr r="0" g="0" b="0"/>
+      </a:fillRef>
+      <a:effectRef idx="0">
+        <a:scrgbClr r="0" g="0" b="0"/>
+      </a:effectRef>
+      <a:fontRef idx="minor"/>
+    </dgm:style>
+  </dgm:styleLbl>
+  <dgm:styleLbl name="asst0">
+    <dgm:scene3d>
+      <a:camera prst="orthographicFront"/>
+      <a:lightRig rig="threePt" dir="t"/>
+    </dgm:scene3d>
+    <dgm:sp3d/>
+    <dgm:txPr/>
+    <dgm:style>
+      <a:lnRef idx="2">
+        <a:scrgbClr r="0" g="0" b="0"/>
+      </a:lnRef>
+      <a:fillRef idx="1">
+        <a:scrgbClr r="0" g="0" b="0"/>
+      </a:fillRef>
+      <a:effectRef idx="0">
+        <a:scrgbClr r="0" g="0" b="0"/>
+      </a:effectRef>
+      <a:fontRef idx="minor">
+        <a:schemeClr val="lt1"/>
+      </a:fontRef>
+    </dgm:style>
+  </dgm:styleLbl>
+  <dgm:styleLbl name="asst1">
+    <dgm:scene3d>
+      <a:camera prst="orthographicFront"/>
+      <a:lightRig rig="threePt" dir="t"/>
+    </dgm:scene3d>
+    <dgm:sp3d/>
+    <dgm:txPr/>
+    <dgm:style>
+      <a:lnRef idx="2">
+        <a:scrgbClr r="0" g="0" b="0"/>
+      </a:lnRef>
+      <a:fillRef idx="1">
+        <a:scrgbClr r="0" g="0" b="0"/>
+      </a:fillRef>
+      <a:effectRef idx="0">
+        <a:scrgbClr r="0" g="0" b="0"/>
+      </a:effectRef>
+      <a:fontRef idx="minor">
+        <a:schemeClr val="lt1"/>
+      </a:fontRef>
+    </dgm:style>
+  </dgm:styleLbl>
+  <dgm:styleLbl name="asst2">
+    <dgm:scene3d>
+      <a:camera prst="orthographicFront"/>
+      <a:lightRig rig="threePt" dir="t"/>
+    </dgm:scene3d>
+    <dgm:sp3d/>
+    <dgm:txPr/>
+    <dgm:style>
+      <a:lnRef idx="2">
+        <a:scrgbClr r="0" g="0" b="0"/>
+      </a:lnRef>
+      <a:fillRef idx="1">
+        <a:scrgbClr r="0" g="0" b="0"/>
+      </a:fillRef>
+      <a:effectRef idx="0">
+        <a:scrgbClr r="0" g="0" b="0"/>
+      </a:effectRef>
+      <a:fontRef idx="minor">
+        <a:schemeClr val="lt1"/>
+      </a:fontRef>
+    </dgm:style>
+  </dgm:styleLbl>
+  <dgm:styleLbl name="asst3">
+    <dgm:scene3d>
+      <a:camera prst="orthographicFront"/>
+      <a:lightRig rig="threePt" dir="t"/>
+    </dgm:scene3d>
+    <dgm:sp3d/>
+    <dgm:txPr/>
+    <dgm:style>
+      <a:lnRef idx="2">
+        <a:scrgbClr r="0" g="0" b="0"/>
+      </a:lnRef>
+      <a:fillRef idx="1">
+        <a:scrgbClr r="0" g="0" b="0"/>
+      </a:fillRef>
+      <a:effectRef idx="0">
+        <a:scrgbClr r="0" g="0" b="0"/>
+      </a:effectRef>
+      <a:fontRef idx="minor">
+        <a:schemeClr val="lt1"/>
+      </a:fontRef>
+    </dgm:style>
+  </dgm:styleLbl>
+  <dgm:styleLbl name="asst4">
+    <dgm:scene3d>
+      <a:camera prst="orthographicFront"/>
+      <a:lightRig rig="threePt" dir="t"/>
+    </dgm:scene3d>
+    <dgm:sp3d/>
+    <dgm:txPr/>
+    <dgm:style>
+      <a:lnRef idx="2">
+        <a:scrgbClr r="0" g="0" b="0"/>
+      </a:lnRef>
+      <a:fillRef idx="1">
+        <a:scrgbClr r="0" g="0" b="0"/>
+      </a:fillRef>
+      <a:effectRef idx="0">
+        <a:scrgbClr r="0" g="0" b="0"/>
+      </a:effectRef>
+      <a:fontRef idx="minor">
+        <a:schemeClr val="lt1"/>
+      </a:fontRef>
+    </dgm:style>
+  </dgm:styleLbl>
+  <dgm:styleLbl name="parChTrans2D1">
+    <dgm:scene3d>
+      <a:camera prst="orthographicFront"/>
+      <a:lightRig rig="threePt" dir="t"/>
+    </dgm:scene3d>
+    <dgm:sp3d/>
+    <dgm:txPr/>
+    <dgm:style>
+      <a:lnRef idx="2">
+        <a:scrgbClr r="0" g="0" b="0"/>
+      </a:lnRef>
+      <a:fillRef idx="1">
+        <a:scrgbClr r="0" g="0" b="0"/>
+      </a:fillRef>
+      <a:effectRef idx="0">
+        <a:scrgbClr r="0" g="0" b="0"/>
+      </a:effectRef>
+      <a:fontRef idx="minor">
+        <a:schemeClr val="lt1"/>
+      </a:fontRef>
+    </dgm:style>
+  </dgm:styleLbl>
+  <dgm:styleLbl name="parChTrans2D2">
+    <dgm:scene3d>
+      <a:camera prst="orthographicFront"/>
+      <a:lightRig rig="threePt" dir="t"/>
+    </dgm:scene3d>
+    <dgm:sp3d/>
+    <dgm:txPr/>
+    <dgm:style>
+      <a:lnRef idx="2">
+        <a:scrgbClr r="0" g="0" b="0"/>
+      </a:lnRef>
+      <a:fillRef idx="1">
+        <a:scrgbClr r="0" g="0" b="0"/>
+      </a:fillRef>
+      <a:effectRef idx="0">
+        <a:scrgbClr r="0" g="0" b="0"/>
+      </a:effectRef>
+      <a:fontRef idx="minor">
+        <a:schemeClr val="lt1"/>
+      </a:fontRef>
+    </dgm:style>
+  </dgm:styleLbl>
+  <dgm:styleLbl name="parChTrans2D3">
+    <dgm:scene3d>
+      <a:camera prst="orthographicFront"/>
+      <a:lightRig rig="threePt" dir="t"/>
+    </dgm:scene3d>
+    <dgm:sp3d/>
+    <dgm:txPr/>
+    <dgm:style>
+      <a:lnRef idx="2">
+        <a:scrgbClr r="0" g="0" b="0"/>
+      </a:lnRef>
+      <a:fillRef idx="1">
+        <a:scrgbClr r="0" g="0" b="0"/>
+      </a:fillRef>
+      <a:effectRef idx="0">
+        <a:scrgbClr r="0" g="0" b="0"/>
+      </a:effectRef>
+      <a:fontRef idx="minor">
+        <a:schemeClr val="lt1"/>
+      </a:fontRef>
+    </dgm:style>
+  </dgm:styleLbl>
+  <dgm:styleLbl name="parChTrans2D4">
+    <dgm:scene3d>
+      <a:camera prst="orthographicFront"/>
+      <a:lightRig rig="threePt" dir="t"/>
+    </dgm:scene3d>
+    <dgm:sp3d/>
+    <dgm:txPr/>
+    <dgm:style>
+      <a:lnRef idx="2">
+        <a:scrgbClr r="0" g="0" b="0"/>
+      </a:lnRef>
+      <a:fillRef idx="1">
+        <a:scrgbClr r="0" g="0" b="0"/>
+      </a:fillRef>
+      <a:effectRef idx="0">
+        <a:scrgbClr r="0" g="0" b="0"/>
+      </a:effectRef>
+      <a:fontRef idx="minor">
+        <a:schemeClr val="lt1"/>
+      </a:fontRef>
+    </dgm:style>
+  </dgm:styleLbl>
+  <dgm:styleLbl name="parChTrans1D1">
+    <dgm:scene3d>
+      <a:camera prst="orthographicFront"/>
+      <a:lightRig rig="threePt" dir="t"/>
+    </dgm:scene3d>
+    <dgm:sp3d/>
+    <dgm:txPr/>
+    <dgm:style>
+      <a:lnRef idx="2">
+        <a:scrgbClr r="0" g="0" b="0"/>
+      </a:lnRef>
+      <a:fillRef idx="0">
+        <a:scrgbClr r="0" g="0" b="0"/>
+      </a:fillRef>
+      <a:effectRef idx="0">
+        <a:scrgbClr r="0" g="0" b="0"/>
+      </a:effectRef>
+      <a:fontRef idx="minor"/>
+    </dgm:style>
+  </dgm:styleLbl>
+  <dgm:styleLbl name="parChTrans1D2">
+    <dgm:scene3d>
+      <a:camera prst="orthographicFront"/>
+      <a:lightRig rig="threePt" dir="t"/>
+    </dgm:scene3d>
+    <dgm:sp3d/>
+    <dgm:txPr/>
+    <dgm:style>
+      <a:lnRef idx="2">
+        <a:scrgbClr r="0" g="0" b="0"/>
+      </a:lnRef>
+      <a:fillRef idx="0">
+        <a:scrgbClr r="0" g="0" b="0"/>
+      </a:fillRef>
+      <a:effectRef idx="0">
+        <a:scrgbClr r="0" g="0" b="0"/>
+      </a:effectRef>
+      <a:fontRef idx="minor"/>
+    </dgm:style>
+  </dgm:styleLbl>
+  <dgm:styleLbl name="parChTrans1D3">
+    <dgm:scene3d>
+      <a:camera prst="orthographicFront"/>
+      <a:lightRig rig="threePt" dir="t"/>
+    </dgm:scene3d>
+    <dgm:sp3d/>
+    <dgm:txPr/>
+    <dgm:style>
+      <a:lnRef idx="2">
+        <a:scrgbClr r="0" g="0" b="0"/>
+      </a:lnRef>
+      <a:fillRef idx="0">
+        <a:scrgbClr r="0" g="0" b="0"/>
+      </a:fillRef>
+      <a:effectRef idx="0">
+        <a:scrgbClr r="0" g="0" b="0"/>
+      </a:effectRef>
+      <a:fontRef idx="minor"/>
+    </dgm:style>
+  </dgm:styleLbl>
+  <dgm:styleLbl name="parChTrans1D4">
+    <dgm:scene3d>
+      <a:camera prst="orthographicFront"/>
+      <a:lightRig rig="threePt" dir="t"/>
+    </dgm:scene3d>
+    <dgm:sp3d/>
+    <dgm:txPr/>
+    <dgm:style>
+      <a:lnRef idx="2">
+        <a:scrgbClr r="0" g="0" b="0"/>
+      </a:lnRef>
+      <a:fillRef idx="0">
+        <a:scrgbClr r="0" g="0" b="0"/>
+      </a:fillRef>
+      <a:effectRef idx="0">
+        <a:scrgbClr r="0" g="0" b="0"/>
+      </a:effectRef>
+      <a:fontRef idx="minor"/>
+    </dgm:style>
+  </dgm:styleLbl>
+  <dgm:styleLbl name="fgAcc1">
+    <dgm:scene3d>
+      <a:camera prst="orthographicFront"/>
+      <a:lightRig rig="threePt" dir="t"/>
+    </dgm:scene3d>
+    <dgm:sp3d/>
+    <dgm:txPr/>
+    <dgm:style>
+      <a:lnRef idx="2">
+        <a:scrgbClr r="0" g="0" b="0"/>
+      </a:lnRef>
+      <a:fillRef idx="1">
+        <a:scrgbClr r="0" g="0" b="0"/>
+      </a:fillRef>
+      <a:effectRef idx="0">
+        <a:scrgbClr r="0" g="0" b="0"/>
+      </a:effectRef>
+      <a:fontRef idx="minor"/>
+    </dgm:style>
+  </dgm:styleLbl>
+  <dgm:styleLbl name="conFgAcc1">
+    <dgm:scene3d>
+      <a:camera prst="orthographicFront"/>
+      <a:lightRig rig="threePt" dir="t"/>
+    </dgm:scene3d>
+    <dgm:sp3d/>
+    <dgm:txPr/>
+    <dgm:style>
+      <a:lnRef idx="2">
+        <a:scrgbClr r="0" g="0" b="0"/>
+      </a:lnRef>
+      <a:fillRef idx="1">
+        <a:scrgbClr r="0" g="0" b="0"/>
+      </a:fillRef>
+      <a:effectRef idx="0">
+        <a:scrgbClr r="0" g="0" b="0"/>
+      </a:effectRef>
+      <a:fontRef idx="minor"/>
+    </dgm:style>
+  </dgm:styleLbl>
+  <dgm:styleLbl name="alignAcc1">
+    <dgm:scene3d>
+      <a:camera prst="orthographicFront"/>
+      <a:lightRig rig="threePt" dir="t"/>
+    </dgm:scene3d>
+    <dgm:sp3d/>
+    <dgm:txPr/>
+    <dgm:style>
+      <a:lnRef idx="2">
+        <a:scrgbClr r="0" g="0" b="0"/>
+      </a:lnRef>
+      <a:fillRef idx="1">
+        <a:scrgbClr r="0" g="0" b="0"/>
+      </a:fillRef>
+      <a:effectRef idx="0">
+        <a:scrgbClr r="0" g="0" b="0"/>
+      </a:effectRef>
+      <a:fontRef idx="minor"/>
+    </dgm:style>
+  </dgm:styleLbl>
+  <dgm:styleLbl name="trAlignAcc1">
+    <dgm:scene3d>
+      <a:camera prst="orthographicFront"/>
+      <a:lightRig rig="threePt" dir="t"/>
+    </dgm:scene3d>
+    <dgm:sp3d/>
+    <dgm:txPr/>
+    <dgm:style>
+      <a:lnRef idx="1">
+        <a:scrgbClr r="0" g="0" b="0"/>
+      </a:lnRef>
+      <a:fillRef idx="1">
+        <a:scrgbClr r="0" g="0" b="0"/>
+      </a:fillRef>
+      <a:effectRef idx="0">
+        <a:scrgbClr r="0" g="0" b="0"/>
+      </a:effectRef>
+      <a:fontRef idx="minor"/>
+    </dgm:style>
+  </dgm:styleLbl>
+  <dgm:styleLbl name="bgAcc1">
+    <dgm:scene3d>
+      <a:camera prst="orthographicFront"/>
+      <a:lightRig rig="threePt" dir="t"/>
+    </dgm:scene3d>
+    <dgm:sp3d/>
+    <dgm:txPr/>
+    <dgm:style>
+      <a:lnRef idx="2">
+        <a:scrgbClr r="0" g="0" b="0"/>
+      </a:lnRef>
+      <a:fillRef idx="1">
+        <a:scrgbClr r="0" g="0" b="0"/>
+      </a:fillRef>
+      <a:effectRef idx="0">
+        <a:scrgbClr r="0" g="0" b="0"/>
+      </a:effectRef>
+      <a:fontRef idx="minor"/>
+    </dgm:style>
+  </dgm:styleLbl>
+  <dgm:styleLbl name="solidFgAcc1">
+    <dgm:scene3d>
+      <a:camera prst="orthographicFront"/>
+      <a:lightRig rig="threePt" dir="t"/>
+    </dgm:scene3d>
+    <dgm:sp3d/>
+    <dgm:txPr/>
+    <dgm:style>
+      <a:lnRef idx="2">
+        <a:scrgbClr r="0" g="0" b="0"/>
+      </a:lnRef>
+      <a:fillRef idx="1">
+        <a:scrgbClr r="0" g="0" b="0"/>
+      </a:fillRef>
+      <a:effectRef idx="0">
+        <a:scrgbClr r="0" g="0" b="0"/>
+      </a:effectRef>
+      <a:fontRef idx="minor"/>
+    </dgm:style>
+  </dgm:styleLbl>
+  <dgm:styleLbl name="solidAlignAcc1">
+    <dgm:scene3d>
+      <a:camera prst="orthographicFront"/>
+      <a:lightRig rig="threePt" dir="t"/>
+    </dgm:scene3d>
+    <dgm:sp3d/>
+    <dgm:txPr/>
+    <dgm:style>
+      <a:lnRef idx="2">
+        <a:scrgbClr r="0" g="0" b="0"/>
+      </a:lnRef>
+      <a:fillRef idx="1">
+        <a:scrgbClr r="0" g="0" b="0"/>
+      </a:fillRef>
+      <a:effectRef idx="0">
+        <a:scrgbClr r="0" g="0" b="0"/>
+      </a:effectRef>
+      <a:fontRef idx="minor"/>
+    </dgm:style>
+  </dgm:styleLbl>
+  <dgm:styleLbl name="solidBgAcc1">
+    <dgm:scene3d>
+      <a:camera prst="orthographicFront"/>
+      <a:lightRig rig="threePt" dir="t"/>
+    </dgm:scene3d>
+    <dgm:sp3d/>
+    <dgm:txPr/>
+    <dgm:style>
+      <a:lnRef idx="2">
+        <a:scrgbClr r="0" g="0" b="0"/>
+      </a:lnRef>
+      <a:fillRef idx="1">
+        <a:scrgbClr r="0" g="0" b="0"/>
+      </a:fillRef>
+      <a:effectRef idx="0">
+        <a:scrgbClr r="0" g="0" b="0"/>
+      </a:effectRef>
+      <a:fontRef idx="minor"/>
+    </dgm:style>
+  </dgm:styleLbl>
+  <dgm:styleLbl name="fgAccFollowNode1">
+    <dgm:scene3d>
+      <a:camera prst="orthographicFront"/>
+      <a:lightRig rig="threePt" dir="t"/>
+    </dgm:scene3d>
+    <dgm:sp3d/>
+    <dgm:txPr/>
+    <dgm:style>
+      <a:lnRef idx="2">
+        <a:scrgbClr r="0" g="0" b="0"/>
+      </a:lnRef>
+      <a:fillRef idx="1">
+        <a:scrgbClr r="0" g="0" b="0"/>
+      </a:fillRef>
+      <a:effectRef idx="0">
+        <a:scrgbClr r="0" g="0" b="0"/>
+      </a:effectRef>
+      <a:fontRef idx="minor"/>
+    </dgm:style>
+  </dgm:styleLbl>
+  <dgm:styleLbl name="alignAccFollowNode1">
+    <dgm:scene3d>
+      <a:camera prst="orthographicFront"/>
+      <a:lightRig rig="threePt" dir="t"/>
+    </dgm:scene3d>
+    <dgm:sp3d/>
+    <dgm:txPr/>
+    <dgm:style>
+      <a:lnRef idx="2">
+        <a:scrgbClr r="0" g="0" b="0"/>
+      </a:lnRef>
+      <a:fillRef idx="1">
+        <a:scrgbClr r="0" g="0" b="0"/>
+      </a:fillRef>
+      <a:effectRef idx="0">
+        <a:scrgbClr r="0" g="0" b="0"/>
+      </a:effectRef>
+      <a:fontRef idx="minor"/>
+    </dgm:style>
+  </dgm:styleLbl>
+  <dgm:styleLbl name="bgAccFollowNode1">
+    <dgm:scene3d>
+      <a:camera prst="orthographicFront"/>
+      <a:lightRig rig="threePt" dir="t"/>
+    </dgm:scene3d>
+    <dgm:sp3d/>
+    <dgm:txPr/>
+    <dgm:style>
+      <a:lnRef idx="2">
+        <a:scrgbClr r="0" g="0" b="0"/>
+      </a:lnRef>
+      <a:fillRef idx="1">
+        <a:scrgbClr r="0" g="0" b="0"/>
+      </a:fillRef>
+      <a:effectRef idx="0">
+        <a:scrgbClr r="0" g="0" b="0"/>
+      </a:effectRef>
+      <a:fontRef idx="minor"/>
+    </dgm:style>
+  </dgm:styleLbl>
+  <dgm:styleLbl name="fgAcc0">
+    <dgm:scene3d>
+      <a:camera prst="orthographicFront"/>
+      <a:lightRig rig="threePt" dir="t"/>
+    </dgm:scene3d>
+    <dgm:sp3d/>
+    <dgm:txPr/>
+    <dgm:style>
+      <a:lnRef idx="2">
+        <a:scrgbClr r="0" g="0" b="0"/>
+      </a:lnRef>
+      <a:fillRef idx="1">
+        <a:scrgbClr r="0" g="0" b="0"/>
+      </a:fillRef>
+      <a:effectRef idx="0">
+        <a:scrgbClr r="0" g="0" b="0"/>
+      </a:effectRef>
+      <a:fontRef idx="minor"/>
+    </dgm:style>
+  </dgm:styleLbl>
+  <dgm:styleLbl name="fgAcc2">
+    <dgm:scene3d>
+      <a:camera prst="orthographicFront"/>
+      <a:lightRig rig="threePt" dir="t"/>
+    </dgm:scene3d>
+    <dgm:sp3d/>
+    <dgm:txPr/>
+    <dgm:style>
+      <a:lnRef idx="2">
+        <a:scrgbClr r="0" g="0" b="0"/>
+      </a:lnRef>
+      <a:fillRef idx="1">
+        <a:scrgbClr r="0" g="0" b="0"/>
+      </a:fillRef>
+      <a:effectRef idx="0">
+        <a:scrgbClr r="0" g="0" b="0"/>
+      </a:effectRef>
+      <a:fontRef idx="minor"/>
+    </dgm:style>
+  </dgm:styleLbl>
+  <dgm:styleLbl name="fgAcc3">
+    <dgm:scene3d>
+      <a:camera prst="orthographicFront"/>
+      <a:lightRig rig="threePt" dir="t"/>
+    </dgm:scene3d>
+    <dgm:sp3d/>
+    <dgm:txPr/>
+    <dgm:style>
+      <a:lnRef idx="2">
+        <a:scrgbClr r="0" g="0" b="0"/>
+      </a:lnRef>
+      <a:fillRef idx="1">
+        <a:scrgbClr r="0" g="0" b="0"/>
+      </a:fillRef>
+      <a:effectRef idx="0">
+        <a:scrgbClr r="0" g="0" b="0"/>
+      </a:effectRef>
+      <a:fontRef idx="minor"/>
+    </dgm:style>
+  </dgm:styleLbl>
+  <dgm:styleLbl name="fgAcc4">
+    <dgm:scene3d>
+      <a:camera prst="orthographicFront"/>
+      <a:lightRig rig="threePt" dir="t"/>
+    </dgm:scene3d>
+    <dgm:sp3d/>
+    <dgm:txPr/>
+    <dgm:style>
+      <a:lnRef idx="2">
+        <a:scrgbClr r="0" g="0" b="0"/>
+      </a:lnRef>
+      <a:fillRef idx="1">
+        <a:scrgbClr r="0" g="0" b="0"/>
+      </a:fillRef>
+      <a:effectRef idx="0">
+        <a:scrgbClr r="0" g="0" b="0"/>
+      </a:effectRef>
+      <a:fontRef idx="minor"/>
+    </dgm:style>
+  </dgm:styleLbl>
+  <dgm:styleLbl name="bgShp">
+    <dgm:scene3d>
+      <a:camera prst="orthographicFront"/>
+      <a:lightRig rig="threePt" dir="t"/>
+    </dgm:scene3d>
+    <dgm:sp3d/>
+    <dgm:txPr/>
+    <dgm:style>
+      <a:lnRef idx="0">
+        <a:scrgbClr r="0" g="0" b="0"/>
+      </a:lnRef>
+      <a:fillRef idx="1">
+        <a:scrgbClr r="0" g="0" b="0"/>
+      </a:fillRef>
+      <a:effectRef idx="0">
+        <a:scrgbClr r="0" g="0" b="0"/>
+      </a:effectRef>
+      <a:fontRef idx="minor"/>
+    </dgm:style>
+  </dgm:styleLbl>
+  <dgm:styleLbl name="dkBgShp">
+    <dgm:scene3d>
+      <a:camera prst="orthographicFront"/>
+      <a:lightRig rig="threePt" dir="t"/>
+    </dgm:scene3d>
+    <dgm:sp3d/>
+    <dgm:txPr/>
+    <dgm:style>
+      <a:lnRef idx="0">
+        <a:scrgbClr r="0" g="0" b="0"/>
+      </a:lnRef>
+      <a:fillRef idx="1">
+        <a:scrgbClr r="0" g="0" b="0"/>
+      </a:fillRef>
+      <a:effectRef idx="0">
+        <a:scrgbClr r="0" g="0" b="0"/>
+      </a:effectRef>
+      <a:fontRef idx="minor"/>
+    </dgm:style>
+  </dgm:styleLbl>
+  <dgm:styleLbl name="trBgShp">
+    <dgm:scene3d>
+      <a:camera prst="orthographicFront"/>
+      <a:lightRig rig="threePt" dir="t"/>
+    </dgm:scene3d>
+    <dgm:sp3d/>
+    <dgm:txPr/>
+    <dgm:style>
+      <a:lnRef idx="0">
+        <a:scrgbClr r="0" g="0" b="0"/>
+      </a:lnRef>
+      <a:fillRef idx="1">
+        <a:scrgbClr r="0" g="0" b="0"/>
+      </a:fillRef>
+      <a:effectRef idx="0">
+        <a:scrgbClr r="0" g="0" b="0"/>
+      </a:effectRef>
+      <a:fontRef idx="minor"/>
+    </dgm:style>
+  </dgm:styleLbl>
+  <dgm:styleLbl name="fgShp">
+    <dgm:scene3d>
+      <a:camera prst="orthographicFront"/>
+      <a:lightRig rig="threePt" dir="t"/>
+    </dgm:scene3d>
+    <dgm:sp3d/>
+    <dgm:txPr/>
+    <dgm:style>
+      <a:lnRef idx="2">
+        <a:scrgbClr r="0" g="0" b="0"/>
+      </a:lnRef>
+      <a:fillRef idx="1">
+        <a:scrgbClr r="0" g="0" b="0"/>
+      </a:fillRef>
+      <a:effectRef idx="0">
+        <a:scrgbClr r="0" g="0" b="0"/>
+      </a:effectRef>
+      <a:fontRef idx="minor"/>
+    </dgm:style>
+  </dgm:styleLbl>
+  <dgm:styleLbl name="revTx">
+    <dgm:scene3d>
+      <a:camera prst="orthographicFront"/>
+      <a:lightRig rig="threePt" dir="t"/>
+    </dgm:scene3d>
+    <dgm:sp3d/>
+    <dgm:txPr/>
+    <dgm:style>
+      <a:lnRef idx="0">
+        <a:scrgbClr r="0" g="0" b="0"/>
+      </a:lnRef>
+      <a:fillRef idx="0">
+        <a:scrgbClr r="0" g="0" b="0"/>
+      </a:fillRef>
+      <a:effectRef idx="0">
+        <a:scrgbClr r="0" g="0" b="0"/>
+      </a:effectRef>
+      <a:fontRef idx="minor"/>
+    </dgm:style>
+  </dgm:styleLbl>
+</dgm:styleDef>
+</file>
+
+<file path=ppt/diagrams/quickStyle3.xml><?xml version="1.0" encoding="utf-8"?>
 <dgm:styleDef xmlns:dgm="http://schemas.openxmlformats.org/drawingml/2006/diagram" xmlns:a="http://schemas.openxmlformats.org/drawingml/2006/main" uniqueId="urn:microsoft.com/office/officeart/2005/8/quickstyle/simple1">
   <dgm:title val=""/>
   <dgm:desc val=""/>
@@ -7751,7 +11558,7 @@
           <a:p>
             <a:fld id="{9D0D92BC-42A9-434B-8530-ADBF4485E407}" type="datetimeFigureOut">
               <a:rPr lang="en-US" smtClean="0"/>
-              <a:t>10/3/2024</a:t>
+              <a:t>10/15/2024</a:t>
             </a:fld>
             <a:endParaRPr lang="en-US"/>
           </a:p>
@@ -7949,7 +11756,7 @@
           <a:p>
             <a:fld id="{9D0D92BC-42A9-434B-8530-ADBF4485E407}" type="datetimeFigureOut">
               <a:rPr lang="en-US" smtClean="0"/>
-              <a:t>10/3/2024</a:t>
+              <a:t>10/15/2024</a:t>
             </a:fld>
             <a:endParaRPr lang="en-US"/>
           </a:p>
@@ -8157,7 +11964,7 @@
           <a:p>
             <a:fld id="{9D0D92BC-42A9-434B-8530-ADBF4485E407}" type="datetimeFigureOut">
               <a:rPr lang="en-US" smtClean="0"/>
-              <a:t>10/3/2024</a:t>
+              <a:t>10/15/2024</a:t>
             </a:fld>
             <a:endParaRPr lang="en-US"/>
           </a:p>
@@ -8355,7 +12162,7 @@
           <a:p>
             <a:fld id="{9D0D92BC-42A9-434B-8530-ADBF4485E407}" type="datetimeFigureOut">
               <a:rPr lang="en-US" smtClean="0"/>
-              <a:t>10/3/2024</a:t>
+              <a:t>10/15/2024</a:t>
             </a:fld>
             <a:endParaRPr lang="en-US"/>
           </a:p>
@@ -8630,7 +12437,7 @@
           <a:p>
             <a:fld id="{9D0D92BC-42A9-434B-8530-ADBF4485E407}" type="datetimeFigureOut">
               <a:rPr lang="en-US" smtClean="0"/>
-              <a:t>10/3/2024</a:t>
+              <a:t>10/15/2024</a:t>
             </a:fld>
             <a:endParaRPr lang="en-US"/>
           </a:p>
@@ -8895,7 +12702,7 @@
           <a:p>
             <a:fld id="{9D0D92BC-42A9-434B-8530-ADBF4485E407}" type="datetimeFigureOut">
               <a:rPr lang="en-US" smtClean="0"/>
-              <a:t>10/3/2024</a:t>
+              <a:t>10/15/2024</a:t>
             </a:fld>
             <a:endParaRPr lang="en-US"/>
           </a:p>
@@ -9307,7 +13114,7 @@
           <a:p>
             <a:fld id="{9D0D92BC-42A9-434B-8530-ADBF4485E407}" type="datetimeFigureOut">
               <a:rPr lang="en-US" smtClean="0"/>
-              <a:t>10/3/2024</a:t>
+              <a:t>10/15/2024</a:t>
             </a:fld>
             <a:endParaRPr lang="en-US"/>
           </a:p>
@@ -9448,7 +13255,7 @@
           <a:p>
             <a:fld id="{9D0D92BC-42A9-434B-8530-ADBF4485E407}" type="datetimeFigureOut">
               <a:rPr lang="en-US" smtClean="0"/>
-              <a:t>10/3/2024</a:t>
+              <a:t>10/15/2024</a:t>
             </a:fld>
             <a:endParaRPr lang="en-US"/>
           </a:p>
@@ -9561,7 +13368,7 @@
           <a:p>
             <a:fld id="{9D0D92BC-42A9-434B-8530-ADBF4485E407}" type="datetimeFigureOut">
               <a:rPr lang="en-US" smtClean="0"/>
-              <a:t>10/3/2024</a:t>
+              <a:t>10/15/2024</a:t>
             </a:fld>
             <a:endParaRPr lang="en-US"/>
           </a:p>
@@ -9872,7 +13679,7 @@
           <a:p>
             <a:fld id="{9D0D92BC-42A9-434B-8530-ADBF4485E407}" type="datetimeFigureOut">
               <a:rPr lang="en-US" smtClean="0"/>
-              <a:t>10/3/2024</a:t>
+              <a:t>10/15/2024</a:t>
             </a:fld>
             <a:endParaRPr lang="en-US"/>
           </a:p>
@@ -10160,7 +13967,7 @@
           <a:p>
             <a:fld id="{9D0D92BC-42A9-434B-8530-ADBF4485E407}" type="datetimeFigureOut">
               <a:rPr lang="en-US" smtClean="0"/>
-              <a:t>10/3/2024</a:t>
+              <a:t>10/15/2024</a:t>
             </a:fld>
             <a:endParaRPr lang="en-US"/>
           </a:p>
@@ -10408,7 +14215,7 @@
             <a:fld id="{9D0D92BC-42A9-434B-8530-ADBF4485E407}" type="datetimeFigureOut">
               <a:rPr lang="en-US" smtClean="0"/>
               <a:pPr/>
-              <a:t>10/3/2024</a:t>
+              <a:t>10/15/2024</a:t>
             </a:fld>
             <a:endParaRPr lang="en-US" dirty="0"/>
           </a:p>
@@ -10956,17 +14763,17 @@
         </p:nvSpPr>
         <p:spPr>
           <a:xfrm>
-            <a:off x="7264302" y="2198466"/>
-            <a:ext cx="3757507" cy="1425728"/>
+            <a:off x="6999212" y="2294965"/>
+            <a:ext cx="4357315" cy="1677106"/>
           </a:xfrm>
         </p:spPr>
         <p:txBody>
           <a:bodyPr anchor="b">
-            <a:normAutofit/>
+            <a:normAutofit fontScale="90000"/>
           </a:bodyPr>
           <a:lstStyle/>
           <a:p>
-            <a:pPr algn="ctr">
+            <a:pPr>
               <a:lnSpc>
                 <a:spcPct val="110000"/>
               </a:lnSpc>
@@ -10975,7 +14782,31 @@
               <a:rPr lang="en-US" sz="2600" dirty="0">
                 <a:latin typeface="Bahnschrift SemiBold Condensed" panose="020B0502040204020203" pitchFamily="34" charset="0"/>
               </a:rPr>
-              <a:t>Ch.1: Disturbance analysis for Central-South Chile</a:t>
+              <a:t>Ch.1 Spectral Resilience dynamics: Responses of </a:t>
+            </a:r>
+            <a:r>
+              <a:rPr lang="en-US" sz="2600" i="1" dirty="0">
+                <a:latin typeface="Bahnschrift SemiBold Condensed" panose="020B0502040204020203" pitchFamily="34" charset="0"/>
+              </a:rPr>
+              <a:t>Sclerophyllous</a:t>
+            </a:r>
+            <a:r>
+              <a:rPr lang="en-US" sz="2600" dirty="0">
+                <a:latin typeface="Bahnschrift SemiBold Condensed" panose="020B0502040204020203" pitchFamily="34" charset="0"/>
+              </a:rPr>
+              <a:t> and </a:t>
+            </a:r>
+            <a:r>
+              <a:rPr lang="en-US" sz="2600" i="1" dirty="0">
+                <a:latin typeface="Bahnschrift SemiBold Condensed" panose="020B0502040204020203" pitchFamily="34" charset="0"/>
+              </a:rPr>
+              <a:t>Nothofagus</a:t>
+            </a:r>
+            <a:r>
+              <a:rPr lang="en-US" sz="2600" dirty="0">
+                <a:latin typeface="Bahnschrift SemiBold Condensed" panose="020B0502040204020203" pitchFamily="34" charset="0"/>
+              </a:rPr>
+              <a:t> Forest to droughts and fires in Central Chile.</a:t>
             </a:r>
           </a:p>
         </p:txBody>
@@ -11692,6 +15523,202 @@
         </p:nvSpPr>
         <p:spPr>
           <a:xfrm>
+            <a:off x="-1" y="1209566"/>
+            <a:ext cx="5783179" cy="1569660"/>
+          </a:xfrm>
+          <a:prstGeom prst="rect">
+            <a:avLst/>
+          </a:prstGeom>
+          <a:noFill/>
+        </p:spPr>
+        <p:txBody>
+          <a:bodyPr wrap="square" rtlCol="0">
+            <a:spAutoFit/>
+          </a:bodyPr>
+          <a:lstStyle/>
+          <a:p>
+            <a:pPr marL="342900" indent="-342900">
+              <a:buFont typeface="Arial" panose="020B0604020202020204" pitchFamily="34" charset="0"/>
+              <a:buChar char="•"/>
+            </a:pPr>
+            <a:r>
+              <a:rPr lang="en-US" sz="2400" i="1" dirty="0">
+                <a:solidFill>
+                  <a:schemeClr val="bg1"/>
+                </a:solidFill>
+                <a:latin typeface="Bahnschrift Condensed" panose="020B0502040204020203" pitchFamily="34" charset="0"/>
+              </a:rPr>
+              <a:t>Sclerophyllous</a:t>
+            </a:r>
+            <a:r>
+              <a:rPr lang="en-US" sz="2400" dirty="0">
+                <a:solidFill>
+                  <a:schemeClr val="bg1"/>
+                </a:solidFill>
+                <a:latin typeface="Bahnschrift Condensed" panose="020B0502040204020203" pitchFamily="34" charset="0"/>
+              </a:rPr>
+              <a:t> and </a:t>
+            </a:r>
+            <a:r>
+              <a:rPr lang="en-US" sz="2400" i="1" dirty="0">
+                <a:solidFill>
+                  <a:schemeClr val="bg1"/>
+                </a:solidFill>
+                <a:latin typeface="Bahnschrift Condensed" panose="020B0502040204020203" pitchFamily="34" charset="0"/>
+              </a:rPr>
+              <a:t>Nothofagus macrocarpa</a:t>
+            </a:r>
+            <a:r>
+              <a:rPr lang="en-US" sz="2400" dirty="0">
+                <a:solidFill>
+                  <a:schemeClr val="bg1"/>
+                </a:solidFill>
+                <a:latin typeface="Bahnschrift Condensed" panose="020B0502040204020203" pitchFamily="34" charset="0"/>
+              </a:rPr>
+              <a:t> forest</a:t>
+            </a:r>
+          </a:p>
+          <a:p>
+            <a:pPr marL="342900" indent="-342900">
+              <a:buFont typeface="Arial" panose="020B0604020202020204" pitchFamily="34" charset="0"/>
+              <a:buChar char="•"/>
+            </a:pPr>
+            <a:r>
+              <a:rPr lang="en-US" sz="2400" dirty="0">
+                <a:solidFill>
+                  <a:schemeClr val="bg1"/>
+                </a:solidFill>
+                <a:latin typeface="Bahnschrift Condensed" panose="020B0502040204020203" pitchFamily="34" charset="0"/>
+              </a:rPr>
+              <a:t>Cadaster and Evaluation of Native Vegetative Resources of Chile (2013 - 2019)</a:t>
+            </a:r>
+          </a:p>
+          <a:p>
+            <a:pPr marL="342900" indent="-342900">
+              <a:buFont typeface="Arial" panose="020B0604020202020204" pitchFamily="34" charset="0"/>
+              <a:buChar char="•"/>
+            </a:pPr>
+            <a:endParaRPr lang="en-US" sz="2400" dirty="0">
+              <a:solidFill>
+                <a:schemeClr val="bg1"/>
+              </a:solidFill>
+              <a:latin typeface="Bahnschrift Condensed" panose="020B0502040204020203" pitchFamily="34" charset="0"/>
+            </a:endParaRPr>
+          </a:p>
+        </p:txBody>
+      </p:sp>
+      <p:graphicFrame>
+        <p:nvGraphicFramePr>
+          <p:cNvPr id="18" name="Diagram 17">
+            <a:extLst>
+              <a:ext uri="{FF2B5EF4-FFF2-40B4-BE49-F238E27FC236}">
+                <a16:creationId xmlns:a16="http://schemas.microsoft.com/office/drawing/2014/main" id="{0E541D99-7C0D-8F6C-5F89-84A7ADA4D646}"/>
+              </a:ext>
+            </a:extLst>
+          </p:cNvPr>
+          <p:cNvGraphicFramePr/>
+          <p:nvPr>
+            <p:extLst>
+              <p:ext uri="{D42A27DB-BD31-4B8C-83A1-F6EECF244321}">
+                <p14:modId xmlns:p14="http://schemas.microsoft.com/office/powerpoint/2010/main" val="1246909924"/>
+              </p:ext>
+            </p:extLst>
+          </p:nvPr>
+        </p:nvGraphicFramePr>
+        <p:xfrm>
+          <a:off x="528521" y="2622033"/>
+          <a:ext cx="4726133" cy="3844406"/>
+        </p:xfrm>
+        <a:graphic>
+          <a:graphicData uri="http://schemas.openxmlformats.org/drawingml/2006/diagram">
+            <dgm:relIds xmlns:dgm="http://schemas.openxmlformats.org/drawingml/2006/diagram" xmlns:r="http://schemas.openxmlformats.org/officeDocument/2006/relationships" r:dm="rId2" r:lo="rId3" r:qs="rId4" r:cs="rId5"/>
+          </a:graphicData>
+        </a:graphic>
+      </p:graphicFrame>
+    </p:spTree>
+    <p:extLst>
+      <p:ext uri="{BB962C8B-B14F-4D97-AF65-F5344CB8AC3E}">
+        <p14:creationId xmlns:p14="http://schemas.microsoft.com/office/powerpoint/2010/main" val="4161646221"/>
+      </p:ext>
+    </p:extLst>
+  </p:cSld>
+  <p:clrMapOvr>
+    <a:masterClrMapping/>
+  </p:clrMapOvr>
+</p:sld>
+</file>
+
+<file path=ppt/slides/slide3.xml><?xml version="1.0" encoding="utf-8"?>
+<p:sld xmlns:a="http://schemas.openxmlformats.org/drawingml/2006/main" xmlns:r="http://schemas.openxmlformats.org/officeDocument/2006/relationships" xmlns:p="http://schemas.openxmlformats.org/presentationml/2006/main">
+  <p:cSld>
+    <p:spTree>
+      <p:nvGrpSpPr>
+        <p:cNvPr id="1" name=""/>
+        <p:cNvGrpSpPr/>
+        <p:nvPr/>
+      </p:nvGrpSpPr>
+      <p:grpSpPr>
+        <a:xfrm>
+          <a:off x="0" y="0"/>
+          <a:ext cx="0" cy="0"/>
+          <a:chOff x="0" y="0"/>
+          <a:chExt cx="0" cy="0"/>
+        </a:xfrm>
+      </p:grpSpPr>
+      <p:sp>
+        <p:nvSpPr>
+          <p:cNvPr id="2" name="TextBox 1">
+            <a:extLst>
+              <a:ext uri="{FF2B5EF4-FFF2-40B4-BE49-F238E27FC236}">
+                <a16:creationId xmlns:a16="http://schemas.microsoft.com/office/drawing/2014/main" id="{5CB74323-5CCE-59FB-7458-23863CD15D1D}"/>
+              </a:ext>
+            </a:extLst>
+          </p:cNvPr>
+          <p:cNvSpPr txBox="1"/>
+          <p:nvPr/>
+        </p:nvSpPr>
+        <p:spPr>
+          <a:xfrm>
+            <a:off x="0" y="277091"/>
+            <a:ext cx="12191999" cy="707886"/>
+          </a:xfrm>
+          <a:prstGeom prst="rect">
+            <a:avLst/>
+          </a:prstGeom>
+          <a:noFill/>
+        </p:spPr>
+        <p:txBody>
+          <a:bodyPr wrap="square" rtlCol="0">
+            <a:spAutoFit/>
+          </a:bodyPr>
+          <a:lstStyle/>
+          <a:p>
+            <a:r>
+              <a:rPr lang="en-US" sz="4000" dirty="0">
+                <a:solidFill>
+                  <a:schemeClr val="bg1"/>
+                </a:solidFill>
+                <a:latin typeface="Bahnschrift SemiBold Condensed" panose="020B0502040204020203" pitchFamily="34" charset="0"/>
+              </a:rPr>
+              <a:t>Study area</a:t>
+            </a:r>
+          </a:p>
+        </p:txBody>
+      </p:sp>
+      <p:sp>
+        <p:nvSpPr>
+          <p:cNvPr id="3" name="TextBox 2">
+            <a:extLst>
+              <a:ext uri="{FF2B5EF4-FFF2-40B4-BE49-F238E27FC236}">
+                <a16:creationId xmlns:a16="http://schemas.microsoft.com/office/drawing/2014/main" id="{0D39107E-1776-7F06-C3F0-BBFF9F08862A}"/>
+              </a:ext>
+            </a:extLst>
+          </p:cNvPr>
+          <p:cNvSpPr txBox="1"/>
+          <p:nvPr/>
+        </p:nvSpPr>
+        <p:spPr>
+          <a:xfrm>
             <a:off x="0" y="1233053"/>
             <a:ext cx="5597236" cy="954107"/>
           </a:xfrm>
@@ -11711,13 +15738,40 @@
               <a:buChar char="•"/>
             </a:pPr>
             <a:r>
+              <a:rPr lang="en-US" sz="2800" i="1" dirty="0">
+                <a:solidFill>
+                  <a:schemeClr val="bg1"/>
+                </a:solidFill>
+                <a:latin typeface="Bahnschrift Condensed" panose="020B0502040204020203" pitchFamily="34" charset="0"/>
+              </a:rPr>
+              <a:t>Sclerophyllous</a:t>
+            </a:r>
+            <a:r>
               <a:rPr lang="en-US" sz="2800" dirty="0">
                 <a:solidFill>
                   <a:schemeClr val="bg1"/>
                 </a:solidFill>
                 <a:latin typeface="Bahnschrift Condensed" panose="020B0502040204020203" pitchFamily="34" charset="0"/>
               </a:rPr>
-              <a:t>Sclerophyllous and Nothofagus macrocarpa forest</a:t>
+              <a:t> and </a:t>
+            </a:r>
+            <a:r>
+              <a:rPr lang="en-US" sz="2800" i="1" dirty="0">
+                <a:solidFill>
+                  <a:schemeClr val="bg1"/>
+                </a:solidFill>
+                <a:latin typeface="Bahnschrift Condensed" panose="020B0502040204020203" pitchFamily="34" charset="0"/>
+              </a:rPr>
+              <a:t>Nothofagus macrocarpa</a:t>
+            </a:r>
+            <a:r>
+              <a:rPr lang="en-US" sz="2800" dirty="0">
+                <a:solidFill>
+                  <a:schemeClr val="bg1"/>
+                </a:solidFill>
+                <a:latin typeface="Bahnschrift Condensed" panose="020B0502040204020203" pitchFamily="34" charset="0"/>
+              </a:rPr>
+              <a:t> forest</a:t>
             </a:r>
           </a:p>
         </p:txBody>
@@ -11732,13 +15786,7 @@
             </a:extLst>
           </p:cNvPr>
           <p:cNvGraphicFramePr/>
-          <p:nvPr>
-            <p:extLst>
-              <p:ext uri="{D42A27DB-BD31-4B8C-83A1-F6EECF244321}">
-                <p14:modId xmlns:p14="http://schemas.microsoft.com/office/powerpoint/2010/main" val="1174803656"/>
-              </p:ext>
-            </p:extLst>
-          </p:nvPr>
+          <p:nvPr/>
         </p:nvGraphicFramePr>
         <p:xfrm>
           <a:off x="7315812" y="1120048"/>
@@ -12034,7 +16082,7 @@
     </p:spTree>
     <p:extLst>
       <p:ext uri="{BB962C8B-B14F-4D97-AF65-F5344CB8AC3E}">
-        <p14:creationId xmlns:p14="http://schemas.microsoft.com/office/powerpoint/2010/main" val="4161646221"/>
+        <p14:creationId xmlns:p14="http://schemas.microsoft.com/office/powerpoint/2010/main" val="181767296"/>
       </p:ext>
     </p:extLst>
   </p:cSld>
@@ -12044,7 +16092,7 @@
 </p:sld>
 </file>
 
-<file path=ppt/slides/slide3.xml><?xml version="1.0" encoding="utf-8"?>
+<file path=ppt/slides/slide4.xml><?xml version="1.0" encoding="utf-8"?>
 <p:sld xmlns:a="http://schemas.openxmlformats.org/drawingml/2006/main" xmlns:r="http://schemas.openxmlformats.org/officeDocument/2006/relationships" xmlns:p="http://schemas.openxmlformats.org/presentationml/2006/main">
   <p:cSld>
     <p:spTree>

</xml_diff>

<commit_message>
change filtering area to 2700
</commit_message>
<xml_diff>
--- a/ppt_graphics/01_dist_Chp1_JoseLastra_general_progress_20241003.pptx
+++ b/ppt_graphics/01_dist_Chp1_JoseLastra_general_progress_20241003.pptx
@@ -2992,14 +2992,11 @@
         </a:p>
         <a:p>
           <a:r>
-            <a:rPr lang="en-US" sz="1400">
+            <a:rPr lang="en-US" sz="1400" dirty="0">
               <a:latin typeface="Bahnschrift Condensed" panose="020B0502040204020203" pitchFamily="34" charset="0"/>
             </a:rPr>
-            <a:t>3px (900 m²)</a:t>
+            <a:t>3px (2700 m²)</a:t>
           </a:r>
-          <a:endParaRPr lang="en-US" sz="1400" dirty="0">
-            <a:latin typeface="Bahnschrift Condensed" panose="020B0502040204020203" pitchFamily="34" charset="0"/>
-          </a:endParaRPr>
         </a:p>
       </dgm:t>
     </dgm:pt>
@@ -3210,7 +3207,7 @@
   <dgm:whole/>
   <dgm:extLst>
     <a:ext uri="http://schemas.microsoft.com/office/drawing/2008/diagram">
-      <dsp:dataModelExt xmlns:dsp="http://schemas.microsoft.com/office/drawing/2008/diagram" relId="rId6" minVer="http://schemas.openxmlformats.org/drawingml/2006/diagram"/>
+      <dsp:dataModelExt xmlns:dsp="http://schemas.microsoft.com/office/drawing/2008/diagram" relId="rId7" minVer="http://schemas.openxmlformats.org/drawingml/2006/diagram"/>
     </a:ext>
   </dgm:extLst>
 </dgm:dataModel>
@@ -5288,14 +5285,11 @@
             <a:buNone/>
           </a:pPr>
           <a:r>
-            <a:rPr lang="en-US" sz="1400" kern="1200">
+            <a:rPr lang="en-US" sz="1400" kern="1200" dirty="0">
               <a:latin typeface="Bahnschrift Condensed" panose="020B0502040204020203" pitchFamily="34" charset="0"/>
             </a:rPr>
-            <a:t>3px (900 m²)</a:t>
+            <a:t>3px (2700 m²)</a:t>
           </a:r>
-          <a:endParaRPr lang="en-US" sz="1400" kern="1200" dirty="0">
-            <a:latin typeface="Bahnschrift Condensed" panose="020B0502040204020203" pitchFamily="34" charset="0"/>
-          </a:endParaRPr>
         </a:p>
       </dsp:txBody>
       <dsp:txXfrm>
@@ -11558,7 +11552,7 @@
           <a:p>
             <a:fld id="{9D0D92BC-42A9-434B-8530-ADBF4485E407}" type="datetimeFigureOut">
               <a:rPr lang="en-US" smtClean="0"/>
-              <a:t>10/15/2024</a:t>
+              <a:t>10/16/2024</a:t>
             </a:fld>
             <a:endParaRPr lang="en-US"/>
           </a:p>
@@ -11756,7 +11750,7 @@
           <a:p>
             <a:fld id="{9D0D92BC-42A9-434B-8530-ADBF4485E407}" type="datetimeFigureOut">
               <a:rPr lang="en-US" smtClean="0"/>
-              <a:t>10/15/2024</a:t>
+              <a:t>10/16/2024</a:t>
             </a:fld>
             <a:endParaRPr lang="en-US"/>
           </a:p>
@@ -11964,7 +11958,7 @@
           <a:p>
             <a:fld id="{9D0D92BC-42A9-434B-8530-ADBF4485E407}" type="datetimeFigureOut">
               <a:rPr lang="en-US" smtClean="0"/>
-              <a:t>10/15/2024</a:t>
+              <a:t>10/16/2024</a:t>
             </a:fld>
             <a:endParaRPr lang="en-US"/>
           </a:p>
@@ -12162,7 +12156,7 @@
           <a:p>
             <a:fld id="{9D0D92BC-42A9-434B-8530-ADBF4485E407}" type="datetimeFigureOut">
               <a:rPr lang="en-US" smtClean="0"/>
-              <a:t>10/15/2024</a:t>
+              <a:t>10/16/2024</a:t>
             </a:fld>
             <a:endParaRPr lang="en-US"/>
           </a:p>
@@ -12437,7 +12431,7 @@
           <a:p>
             <a:fld id="{9D0D92BC-42A9-434B-8530-ADBF4485E407}" type="datetimeFigureOut">
               <a:rPr lang="en-US" smtClean="0"/>
-              <a:t>10/15/2024</a:t>
+              <a:t>10/16/2024</a:t>
             </a:fld>
             <a:endParaRPr lang="en-US"/>
           </a:p>
@@ -12702,7 +12696,7 @@
           <a:p>
             <a:fld id="{9D0D92BC-42A9-434B-8530-ADBF4485E407}" type="datetimeFigureOut">
               <a:rPr lang="en-US" smtClean="0"/>
-              <a:t>10/15/2024</a:t>
+              <a:t>10/16/2024</a:t>
             </a:fld>
             <a:endParaRPr lang="en-US"/>
           </a:p>
@@ -13114,7 +13108,7 @@
           <a:p>
             <a:fld id="{9D0D92BC-42A9-434B-8530-ADBF4485E407}" type="datetimeFigureOut">
               <a:rPr lang="en-US" smtClean="0"/>
-              <a:t>10/15/2024</a:t>
+              <a:t>10/16/2024</a:t>
             </a:fld>
             <a:endParaRPr lang="en-US"/>
           </a:p>
@@ -13255,7 +13249,7 @@
           <a:p>
             <a:fld id="{9D0D92BC-42A9-434B-8530-ADBF4485E407}" type="datetimeFigureOut">
               <a:rPr lang="en-US" smtClean="0"/>
-              <a:t>10/15/2024</a:t>
+              <a:t>10/16/2024</a:t>
             </a:fld>
             <a:endParaRPr lang="en-US"/>
           </a:p>
@@ -13368,7 +13362,7 @@
           <a:p>
             <a:fld id="{9D0D92BC-42A9-434B-8530-ADBF4485E407}" type="datetimeFigureOut">
               <a:rPr lang="en-US" smtClean="0"/>
-              <a:t>10/15/2024</a:t>
+              <a:t>10/16/2024</a:t>
             </a:fld>
             <a:endParaRPr lang="en-US"/>
           </a:p>
@@ -13679,7 +13673,7 @@
           <a:p>
             <a:fld id="{9D0D92BC-42A9-434B-8530-ADBF4485E407}" type="datetimeFigureOut">
               <a:rPr lang="en-US" smtClean="0"/>
-              <a:t>10/15/2024</a:t>
+              <a:t>10/16/2024</a:t>
             </a:fld>
             <a:endParaRPr lang="en-US"/>
           </a:p>
@@ -13967,7 +13961,7 @@
           <a:p>
             <a:fld id="{9D0D92BC-42A9-434B-8530-ADBF4485E407}" type="datetimeFigureOut">
               <a:rPr lang="en-US" smtClean="0"/>
-              <a:t>10/15/2024</a:t>
+              <a:t>10/16/2024</a:t>
             </a:fld>
             <a:endParaRPr lang="en-US"/>
           </a:p>
@@ -14215,7 +14209,7 @@
             <a:fld id="{9D0D92BC-42A9-434B-8530-ADBF4485E407}" type="datetimeFigureOut">
               <a:rPr lang="en-US" smtClean="0"/>
               <a:pPr/>
-              <a:t>10/15/2024</a:t>
+              <a:t>10/16/2024</a:t>
             </a:fld>
             <a:endParaRPr lang="en-US" dirty="0"/>
           </a:p>
@@ -15469,6 +15463,42 @@
           <a:chExt cx="0" cy="0"/>
         </a:xfrm>
       </p:grpSpPr>
+      <p:pic>
+        <p:nvPicPr>
+          <p:cNvPr id="7" name="Picture 6" descr="A graph with green and orange bars&#10;&#10;Description automatically generated">
+            <a:extLst>
+              <a:ext uri="{FF2B5EF4-FFF2-40B4-BE49-F238E27FC236}">
+                <a16:creationId xmlns:a16="http://schemas.microsoft.com/office/drawing/2014/main" id="{DA161606-0ECA-6B9D-18A9-07842A0F8553}"/>
+              </a:ext>
+            </a:extLst>
+          </p:cNvPr>
+          <p:cNvPicPr>
+            <a:picLocks noChangeAspect="1"/>
+          </p:cNvPicPr>
+          <p:nvPr/>
+        </p:nvPicPr>
+        <p:blipFill>
+          <a:blip r:embed="rId2">
+            <a:extLst>
+              <a:ext uri="{28A0092B-C50C-407E-A947-70E740481C1C}">
+                <a14:useLocalDpi xmlns:a14="http://schemas.microsoft.com/office/drawing/2010/main" val="0"/>
+              </a:ext>
+            </a:extLst>
+          </a:blip>
+          <a:stretch>
+            <a:fillRect/>
+          </a:stretch>
+        </p:blipFill>
+        <p:spPr>
+          <a:xfrm>
+            <a:off x="6766990" y="125867"/>
+            <a:ext cx="5385706" cy="6732133"/>
+          </a:xfrm>
+          <a:prstGeom prst="rect">
+            <a:avLst/>
+          </a:prstGeom>
+        </p:spPr>
+      </p:pic>
       <p:sp>
         <p:nvSpPr>
           <p:cNvPr id="2" name="TextBox 1">
@@ -15620,7 +15650,7 @@
           <p:nvPr>
             <p:extLst>
               <p:ext uri="{D42A27DB-BD31-4B8C-83A1-F6EECF244321}">
-                <p14:modId xmlns:p14="http://schemas.microsoft.com/office/powerpoint/2010/main" val="3309825328"/>
+                <p14:modId xmlns:p14="http://schemas.microsoft.com/office/powerpoint/2010/main" val="1233373024"/>
               </p:ext>
             </p:extLst>
           </p:nvPr>
@@ -15631,46 +15661,10 @@
         </p:xfrm>
         <a:graphic>
           <a:graphicData uri="http://schemas.openxmlformats.org/drawingml/2006/diagram">
-            <dgm:relIds xmlns:dgm="http://schemas.openxmlformats.org/drawingml/2006/diagram" xmlns:r="http://schemas.openxmlformats.org/officeDocument/2006/relationships" r:dm="rId2" r:lo="rId3" r:qs="rId4" r:cs="rId5"/>
+            <dgm:relIds xmlns:dgm="http://schemas.openxmlformats.org/drawingml/2006/diagram" xmlns:r="http://schemas.openxmlformats.org/officeDocument/2006/relationships" r:dm="rId3" r:lo="rId4" r:qs="rId5" r:cs="rId6"/>
           </a:graphicData>
         </a:graphic>
       </p:graphicFrame>
-      <p:pic>
-        <p:nvPicPr>
-          <p:cNvPr id="5" name="Picture 4" descr="A graph with green and orange bars&#10;&#10;Description automatically generated">
-            <a:extLst>
-              <a:ext uri="{FF2B5EF4-FFF2-40B4-BE49-F238E27FC236}">
-                <a16:creationId xmlns:a16="http://schemas.microsoft.com/office/drawing/2014/main" id="{956784DD-AD2D-ECD9-528E-F2C9D035A783}"/>
-              </a:ext>
-            </a:extLst>
-          </p:cNvPr>
-          <p:cNvPicPr>
-            <a:picLocks noChangeAspect="1"/>
-          </p:cNvPicPr>
-          <p:nvPr/>
-        </p:nvPicPr>
-        <p:blipFill>
-          <a:blip r:embed="rId7">
-            <a:extLst>
-              <a:ext uri="{28A0092B-C50C-407E-A947-70E740481C1C}">
-                <a14:useLocalDpi xmlns:a14="http://schemas.microsoft.com/office/drawing/2010/main" val="0"/>
-              </a:ext>
-            </a:extLst>
-          </a:blip>
-          <a:stretch>
-            <a:fillRect/>
-          </a:stretch>
-        </p:blipFill>
-        <p:spPr>
-          <a:xfrm>
-            <a:off x="6793832" y="141909"/>
-            <a:ext cx="5259344" cy="6574181"/>
-          </a:xfrm>
-          <a:prstGeom prst="rect">
-            <a:avLst/>
-          </a:prstGeom>
-        </p:spPr>
-      </p:pic>
       <p:sp>
         <p:nvSpPr>
           <p:cNvPr id="6" name="Rectangle 5">

</xml_diff>